<commit_message>
[framework] adding openLteMac fils document
Change description:
    1. complete openLteMac design details.
    2. Adding openLteMac files.
    3. Adding todo.txt
</commit_message>
<xml_diff>
--- a/Doc/openlte_MAC_ARCH_.pptx
+++ b/Doc/openlte_MAC_ARCH_.pptx
@@ -112,7 +112,7 @@
   </p:defaultTextStyle>
   <p:extLst>
     <p:ext uri="{EFAFB233-063F-42B5-8137-9DF3F51BA10A}">
-      <p15:sldGuideLst xmlns:p15="http://schemas.microsoft.com/office/powerpoint/2012/main">
+      <p15:sldGuideLst xmlns:p15="http://schemas.microsoft.com/office/powerpoint/2012/main" xmlns="">
         <p15:guide id="1" orient="horz" pos="2160" userDrawn="1">
           <p15:clr>
             <a:srgbClr val="A4A3A4"/>
@@ -134,53 +134,12 @@
   <p:cmAuthor id="1" name="Bharath Shivanand" initials="BS" lastIdx="2" clrIdx="0">
     <p:extLst>
       <p:ext uri="{19B8F6BF-5375-455C-9EA6-DF929625EA0E}">
-        <p15:presenceInfo xmlns:p15="http://schemas.microsoft.com/office/powerpoint/2012/main" userId="S::bharath.shivanand@mavenir.com::bcbf12d7-3cdb-4b7c-9fd9-6689d2b20986" providerId="AD"/>
+        <p15:presenceInfo xmlns:p15="http://schemas.microsoft.com/office/powerpoint/2012/main" xmlns="" userId="S::bharath.shivanand@mavenir.com::bcbf12d7-3cdb-4b7c-9fd9-6689d2b20986" providerId="AD"/>
       </p:ext>
     </p:extLst>
   </p:cmAuthor>
+  <p:cmAuthor id="2" name="BHARATH T S" initials="" lastIdx="0" clrIdx="1"/>
 </p:cmAuthorLst>
-</file>
-
-<file path=ppt/comments/comment1.xml><?xml version="1.0" encoding="utf-8"?>
-<p:cmLst xmlns:a="http://schemas.openxmlformats.org/drawingml/2006/main" xmlns:r="http://schemas.openxmlformats.org/officeDocument/2006/relationships" xmlns:p="http://schemas.openxmlformats.org/presentationml/2006/main">
-  <p:cm authorId="1" dt="2020-03-05T22:46:25.928" idx="2">
-    <p:pos x="10" y="10"/>
-    <p:text>Application architechture</p:text>
-    <p:extLst>
-      <p:ext uri="{C676402C-5697-4E1C-873F-D02D1690AC5C}">
-        <p15:threadingInfo xmlns:p15="http://schemas.microsoft.com/office/powerpoint/2012/main" timeZoneBias="-330"/>
-      </p:ext>
-    </p:extLst>
-  </p:cm>
-</p:cmLst>
-</file>
-
-<file path=ppt/comments/comment2.xml><?xml version="1.0" encoding="utf-8"?>
-<p:cmLst xmlns:a="http://schemas.openxmlformats.org/drawingml/2006/main" xmlns:r="http://schemas.openxmlformats.org/officeDocument/2006/relationships" xmlns:p="http://schemas.openxmlformats.org/presentationml/2006/main">
-  <p:cm authorId="1" dt="2020-03-05T22:45:55.999" idx="1">
-    <p:pos x="10" y="10"/>
-    <p:text>TTI scheduling flow per cell</p:text>
-    <p:extLst>
-      <p:ext uri="{C676402C-5697-4E1C-873F-D02D1690AC5C}">
-        <p15:threadingInfo xmlns:p15="http://schemas.microsoft.com/office/powerpoint/2012/main" timeZoneBias="-330"/>
-      </p:ext>
-    </p:extLst>
-  </p:cm>
-</p:cmLst>
-</file>
-
-<file path=ppt/comments/comment3.xml><?xml version="1.0" encoding="utf-8"?>
-<p:cmLst xmlns:a="http://schemas.openxmlformats.org/drawingml/2006/main" xmlns:r="http://schemas.openxmlformats.org/officeDocument/2006/relationships" xmlns:p="http://schemas.openxmlformats.org/presentationml/2006/main">
-  <p:cm authorId="1" dt="2020-03-05T22:46:25.928" idx="2">
-    <p:pos x="10" y="10"/>
-    <p:text>Application architechture</p:text>
-    <p:extLst>
-      <p:ext uri="{C676402C-5697-4E1C-873F-D02D1690AC5C}">
-        <p15:threadingInfo xmlns:p15="http://schemas.microsoft.com/office/powerpoint/2012/main" timeZoneBias="-330"/>
-      </p:ext>
-    </p:extLst>
-  </p:cm>
-</p:cmLst>
 </file>
 
 <file path=ppt/notesMasters/notesMaster1.xml><?xml version="1.0" encoding="utf-8"?>
@@ -265,7 +224,7 @@
           <a:p>
             <a:fld id="{C003959C-7E25-4F4C-9CC4-26B348A86E86}" type="datetimeFigureOut">
               <a:rPr lang="en-US" smtClean="0"/>
-              <a:t>3/7/2020</a:t>
+              <a:t>3/7/20</a:t>
             </a:fld>
             <a:endParaRPr lang="en-US"/>
           </a:p>
@@ -722,7 +681,7 @@
           <p:cNvPr id="2" name="Title 1">
             <a:extLst>
               <a:ext uri="{FF2B5EF4-FFF2-40B4-BE49-F238E27FC236}">
-                <a16:creationId xmlns:a16="http://schemas.microsoft.com/office/drawing/2014/main" id="{7DE481E1-9E3D-4437-9A74-F2C76424E5A5}"/>
+                <a16:creationId xmlns:a16="http://schemas.microsoft.com/office/drawing/2014/main" xmlns="" id="{7DE481E1-9E3D-4437-9A74-F2C76424E5A5}"/>
               </a:ext>
             </a:extLst>
           </p:cNvPr>
@@ -759,7 +718,7 @@
           <p:cNvPr id="3" name="Subtitle 2">
             <a:extLst>
               <a:ext uri="{FF2B5EF4-FFF2-40B4-BE49-F238E27FC236}">
-                <a16:creationId xmlns:a16="http://schemas.microsoft.com/office/drawing/2014/main" id="{4D5AFFF1-6AD0-4D61-A0BD-EE042CFB6FF0}"/>
+                <a16:creationId xmlns:a16="http://schemas.microsoft.com/office/drawing/2014/main" xmlns="" id="{4D5AFFF1-6AD0-4D61-A0BD-EE042CFB6FF0}"/>
               </a:ext>
             </a:extLst>
           </p:cNvPr>
@@ -829,7 +788,7 @@
           <p:cNvPr id="4" name="Date Placeholder 3">
             <a:extLst>
               <a:ext uri="{FF2B5EF4-FFF2-40B4-BE49-F238E27FC236}">
-                <a16:creationId xmlns:a16="http://schemas.microsoft.com/office/drawing/2014/main" id="{7F111171-6BB8-4145-97F6-87A6EAC54E47}"/>
+                <a16:creationId xmlns:a16="http://schemas.microsoft.com/office/drawing/2014/main" xmlns="" id="{7F111171-6BB8-4145-97F6-87A6EAC54E47}"/>
               </a:ext>
             </a:extLst>
           </p:cNvPr>
@@ -847,7 +806,7 @@
           <a:p>
             <a:fld id="{E17AFC74-BA76-4616-BA7A-CECDE503B0F5}" type="datetimeFigureOut">
               <a:rPr lang="en-US" smtClean="0"/>
-              <a:t>3/7/2020</a:t>
+              <a:t>3/7/20</a:t>
             </a:fld>
             <a:endParaRPr lang="en-US"/>
           </a:p>
@@ -858,7 +817,7 @@
           <p:cNvPr id="5" name="Footer Placeholder 4">
             <a:extLst>
               <a:ext uri="{FF2B5EF4-FFF2-40B4-BE49-F238E27FC236}">
-                <a16:creationId xmlns:a16="http://schemas.microsoft.com/office/drawing/2014/main" id="{995A7846-C4D5-4953-8DF7-65C581DB9E84}"/>
+                <a16:creationId xmlns:a16="http://schemas.microsoft.com/office/drawing/2014/main" xmlns="" id="{995A7846-C4D5-4953-8DF7-65C581DB9E84}"/>
               </a:ext>
             </a:extLst>
           </p:cNvPr>
@@ -883,7 +842,7 @@
           <p:cNvPr id="6" name="Slide Number Placeholder 5">
             <a:extLst>
               <a:ext uri="{FF2B5EF4-FFF2-40B4-BE49-F238E27FC236}">
-                <a16:creationId xmlns:a16="http://schemas.microsoft.com/office/drawing/2014/main" id="{5EF94128-40BC-40E2-86CA-E2F28EFC54EE}"/>
+                <a16:creationId xmlns:a16="http://schemas.microsoft.com/office/drawing/2014/main" xmlns="" id="{5EF94128-40BC-40E2-86CA-E2F28EFC54EE}"/>
               </a:ext>
             </a:extLst>
           </p:cNvPr>
@@ -942,7 +901,7 @@
           <p:cNvPr id="2" name="Title 1">
             <a:extLst>
               <a:ext uri="{FF2B5EF4-FFF2-40B4-BE49-F238E27FC236}">
-                <a16:creationId xmlns:a16="http://schemas.microsoft.com/office/drawing/2014/main" id="{4289E8CE-C3BE-4408-9E33-3342BEAF6873}"/>
+                <a16:creationId xmlns:a16="http://schemas.microsoft.com/office/drawing/2014/main" xmlns="" id="{4289E8CE-C3BE-4408-9E33-3342BEAF6873}"/>
               </a:ext>
             </a:extLst>
           </p:cNvPr>
@@ -970,7 +929,7 @@
           <p:cNvPr id="3" name="Vertical Text Placeholder 2">
             <a:extLst>
               <a:ext uri="{FF2B5EF4-FFF2-40B4-BE49-F238E27FC236}">
-                <a16:creationId xmlns:a16="http://schemas.microsoft.com/office/drawing/2014/main" id="{C6B79719-788D-4CF9-8E25-132F1AE8E8C5}"/>
+                <a16:creationId xmlns:a16="http://schemas.microsoft.com/office/drawing/2014/main" xmlns="" id="{C6B79719-788D-4CF9-8E25-132F1AE8E8C5}"/>
               </a:ext>
             </a:extLst>
           </p:cNvPr>
@@ -1027,7 +986,7 @@
           <p:cNvPr id="4" name="Date Placeholder 3">
             <a:extLst>
               <a:ext uri="{FF2B5EF4-FFF2-40B4-BE49-F238E27FC236}">
-                <a16:creationId xmlns:a16="http://schemas.microsoft.com/office/drawing/2014/main" id="{58D6467A-9271-4D40-A5A3-D08E999AF5AC}"/>
+                <a16:creationId xmlns:a16="http://schemas.microsoft.com/office/drawing/2014/main" xmlns="" id="{58D6467A-9271-4D40-A5A3-D08E999AF5AC}"/>
               </a:ext>
             </a:extLst>
           </p:cNvPr>
@@ -1045,7 +1004,7 @@
           <a:p>
             <a:fld id="{E17AFC74-BA76-4616-BA7A-CECDE503B0F5}" type="datetimeFigureOut">
               <a:rPr lang="en-US" smtClean="0"/>
-              <a:t>3/7/2020</a:t>
+              <a:t>3/7/20</a:t>
             </a:fld>
             <a:endParaRPr lang="en-US"/>
           </a:p>
@@ -1056,7 +1015,7 @@
           <p:cNvPr id="5" name="Footer Placeholder 4">
             <a:extLst>
               <a:ext uri="{FF2B5EF4-FFF2-40B4-BE49-F238E27FC236}">
-                <a16:creationId xmlns:a16="http://schemas.microsoft.com/office/drawing/2014/main" id="{15C928F4-75F7-445A-B9D1-DB508B168292}"/>
+                <a16:creationId xmlns:a16="http://schemas.microsoft.com/office/drawing/2014/main" xmlns="" id="{15C928F4-75F7-445A-B9D1-DB508B168292}"/>
               </a:ext>
             </a:extLst>
           </p:cNvPr>
@@ -1081,7 +1040,7 @@
           <p:cNvPr id="6" name="Slide Number Placeholder 5">
             <a:extLst>
               <a:ext uri="{FF2B5EF4-FFF2-40B4-BE49-F238E27FC236}">
-                <a16:creationId xmlns:a16="http://schemas.microsoft.com/office/drawing/2014/main" id="{B2E5C3E4-2F60-4DFD-A9C4-4DC332E8297B}"/>
+                <a16:creationId xmlns:a16="http://schemas.microsoft.com/office/drawing/2014/main" xmlns="" id="{B2E5C3E4-2F60-4DFD-A9C4-4DC332E8297B}"/>
               </a:ext>
             </a:extLst>
           </p:cNvPr>
@@ -1140,7 +1099,7 @@
           <p:cNvPr id="2" name="Vertical Title 1">
             <a:extLst>
               <a:ext uri="{FF2B5EF4-FFF2-40B4-BE49-F238E27FC236}">
-                <a16:creationId xmlns:a16="http://schemas.microsoft.com/office/drawing/2014/main" id="{28F46B16-63A6-4399-81C8-7064A01B5DD5}"/>
+                <a16:creationId xmlns:a16="http://schemas.microsoft.com/office/drawing/2014/main" xmlns="" id="{28F46B16-63A6-4399-81C8-7064A01B5DD5}"/>
               </a:ext>
             </a:extLst>
           </p:cNvPr>
@@ -1173,7 +1132,7 @@
           <p:cNvPr id="3" name="Vertical Text Placeholder 2">
             <a:extLst>
               <a:ext uri="{FF2B5EF4-FFF2-40B4-BE49-F238E27FC236}">
-                <a16:creationId xmlns:a16="http://schemas.microsoft.com/office/drawing/2014/main" id="{44F924A9-0044-46DE-8731-BDC0483A57E0}"/>
+                <a16:creationId xmlns:a16="http://schemas.microsoft.com/office/drawing/2014/main" xmlns="" id="{44F924A9-0044-46DE-8731-BDC0483A57E0}"/>
               </a:ext>
             </a:extLst>
           </p:cNvPr>
@@ -1235,7 +1194,7 @@
           <p:cNvPr id="4" name="Date Placeholder 3">
             <a:extLst>
               <a:ext uri="{FF2B5EF4-FFF2-40B4-BE49-F238E27FC236}">
-                <a16:creationId xmlns:a16="http://schemas.microsoft.com/office/drawing/2014/main" id="{C5C8B323-827B-4AE2-912F-2AE01BFFD16B}"/>
+                <a16:creationId xmlns:a16="http://schemas.microsoft.com/office/drawing/2014/main" xmlns="" id="{C5C8B323-827B-4AE2-912F-2AE01BFFD16B}"/>
               </a:ext>
             </a:extLst>
           </p:cNvPr>
@@ -1253,7 +1212,7 @@
           <a:p>
             <a:fld id="{E17AFC74-BA76-4616-BA7A-CECDE503B0F5}" type="datetimeFigureOut">
               <a:rPr lang="en-US" smtClean="0"/>
-              <a:t>3/7/2020</a:t>
+              <a:t>3/7/20</a:t>
             </a:fld>
             <a:endParaRPr lang="en-US"/>
           </a:p>
@@ -1264,7 +1223,7 @@
           <p:cNvPr id="5" name="Footer Placeholder 4">
             <a:extLst>
               <a:ext uri="{FF2B5EF4-FFF2-40B4-BE49-F238E27FC236}">
-                <a16:creationId xmlns:a16="http://schemas.microsoft.com/office/drawing/2014/main" id="{9F3089B6-2E8C-4332-8990-593A06CC15E9}"/>
+                <a16:creationId xmlns:a16="http://schemas.microsoft.com/office/drawing/2014/main" xmlns="" id="{9F3089B6-2E8C-4332-8990-593A06CC15E9}"/>
               </a:ext>
             </a:extLst>
           </p:cNvPr>
@@ -1289,7 +1248,7 @@
           <p:cNvPr id="6" name="Slide Number Placeholder 5">
             <a:extLst>
               <a:ext uri="{FF2B5EF4-FFF2-40B4-BE49-F238E27FC236}">
-                <a16:creationId xmlns:a16="http://schemas.microsoft.com/office/drawing/2014/main" id="{40DFF309-DA53-4F11-BE15-D5AD8F0A383A}"/>
+                <a16:creationId xmlns:a16="http://schemas.microsoft.com/office/drawing/2014/main" xmlns="" id="{40DFF309-DA53-4F11-BE15-D5AD8F0A383A}"/>
               </a:ext>
             </a:extLst>
           </p:cNvPr>
@@ -1348,7 +1307,7 @@
           <p:cNvPr id="2" name="Title 1">
             <a:extLst>
               <a:ext uri="{FF2B5EF4-FFF2-40B4-BE49-F238E27FC236}">
-                <a16:creationId xmlns:a16="http://schemas.microsoft.com/office/drawing/2014/main" id="{E2810A14-21AF-40E6-A955-390EE16626FB}"/>
+                <a16:creationId xmlns:a16="http://schemas.microsoft.com/office/drawing/2014/main" xmlns="" id="{E2810A14-21AF-40E6-A955-390EE16626FB}"/>
               </a:ext>
             </a:extLst>
           </p:cNvPr>
@@ -1376,7 +1335,7 @@
           <p:cNvPr id="3" name="Content Placeholder 2">
             <a:extLst>
               <a:ext uri="{FF2B5EF4-FFF2-40B4-BE49-F238E27FC236}">
-                <a16:creationId xmlns:a16="http://schemas.microsoft.com/office/drawing/2014/main" id="{EDD1484E-9FAD-4389-9FC2-174E732D0B0B}"/>
+                <a16:creationId xmlns:a16="http://schemas.microsoft.com/office/drawing/2014/main" xmlns="" id="{EDD1484E-9FAD-4389-9FC2-174E732D0B0B}"/>
               </a:ext>
             </a:extLst>
           </p:cNvPr>
@@ -1433,7 +1392,7 @@
           <p:cNvPr id="4" name="Date Placeholder 3">
             <a:extLst>
               <a:ext uri="{FF2B5EF4-FFF2-40B4-BE49-F238E27FC236}">
-                <a16:creationId xmlns:a16="http://schemas.microsoft.com/office/drawing/2014/main" id="{12F75B34-2F50-44E8-8C23-C2024ACB3672}"/>
+                <a16:creationId xmlns:a16="http://schemas.microsoft.com/office/drawing/2014/main" xmlns="" id="{12F75B34-2F50-44E8-8C23-C2024ACB3672}"/>
               </a:ext>
             </a:extLst>
           </p:cNvPr>
@@ -1451,7 +1410,7 @@
           <a:p>
             <a:fld id="{E17AFC74-BA76-4616-BA7A-CECDE503B0F5}" type="datetimeFigureOut">
               <a:rPr lang="en-US" smtClean="0"/>
-              <a:t>3/7/2020</a:t>
+              <a:t>3/7/20</a:t>
             </a:fld>
             <a:endParaRPr lang="en-US"/>
           </a:p>
@@ -1462,7 +1421,7 @@
           <p:cNvPr id="5" name="Footer Placeholder 4">
             <a:extLst>
               <a:ext uri="{FF2B5EF4-FFF2-40B4-BE49-F238E27FC236}">
-                <a16:creationId xmlns:a16="http://schemas.microsoft.com/office/drawing/2014/main" id="{FFF1E1F0-34E0-4381-AD78-998D5D7BFC23}"/>
+                <a16:creationId xmlns:a16="http://schemas.microsoft.com/office/drawing/2014/main" xmlns="" id="{FFF1E1F0-34E0-4381-AD78-998D5D7BFC23}"/>
               </a:ext>
             </a:extLst>
           </p:cNvPr>
@@ -1487,7 +1446,7 @@
           <p:cNvPr id="6" name="Slide Number Placeholder 5">
             <a:extLst>
               <a:ext uri="{FF2B5EF4-FFF2-40B4-BE49-F238E27FC236}">
-                <a16:creationId xmlns:a16="http://schemas.microsoft.com/office/drawing/2014/main" id="{59301AA1-4CF2-4F29-BE2E-DE951B694C49}"/>
+                <a16:creationId xmlns:a16="http://schemas.microsoft.com/office/drawing/2014/main" xmlns="" id="{59301AA1-4CF2-4F29-BE2E-DE951B694C49}"/>
               </a:ext>
             </a:extLst>
           </p:cNvPr>
@@ -1546,7 +1505,7 @@
           <p:cNvPr id="2" name="Title 1">
             <a:extLst>
               <a:ext uri="{FF2B5EF4-FFF2-40B4-BE49-F238E27FC236}">
-                <a16:creationId xmlns:a16="http://schemas.microsoft.com/office/drawing/2014/main" id="{E9C8311B-1A4D-4654-A241-9653E7583C7E}"/>
+                <a16:creationId xmlns:a16="http://schemas.microsoft.com/office/drawing/2014/main" xmlns="" id="{E9C8311B-1A4D-4654-A241-9653E7583C7E}"/>
               </a:ext>
             </a:extLst>
           </p:cNvPr>
@@ -1583,7 +1542,7 @@
           <p:cNvPr id="3" name="Text Placeholder 2">
             <a:extLst>
               <a:ext uri="{FF2B5EF4-FFF2-40B4-BE49-F238E27FC236}">
-                <a16:creationId xmlns:a16="http://schemas.microsoft.com/office/drawing/2014/main" id="{BFFE9427-6BA2-4D13-9F1E-860288E9B2F7}"/>
+                <a16:creationId xmlns:a16="http://schemas.microsoft.com/office/drawing/2014/main" xmlns="" id="{BFFE9427-6BA2-4D13-9F1E-860288E9B2F7}"/>
               </a:ext>
             </a:extLst>
           </p:cNvPr>
@@ -1708,7 +1667,7 @@
           <p:cNvPr id="4" name="Date Placeholder 3">
             <a:extLst>
               <a:ext uri="{FF2B5EF4-FFF2-40B4-BE49-F238E27FC236}">
-                <a16:creationId xmlns:a16="http://schemas.microsoft.com/office/drawing/2014/main" id="{55AC3518-AF78-4642-A09D-4DBFE044BD70}"/>
+                <a16:creationId xmlns:a16="http://schemas.microsoft.com/office/drawing/2014/main" xmlns="" id="{55AC3518-AF78-4642-A09D-4DBFE044BD70}"/>
               </a:ext>
             </a:extLst>
           </p:cNvPr>
@@ -1726,7 +1685,7 @@
           <a:p>
             <a:fld id="{E17AFC74-BA76-4616-BA7A-CECDE503B0F5}" type="datetimeFigureOut">
               <a:rPr lang="en-US" smtClean="0"/>
-              <a:t>3/7/2020</a:t>
+              <a:t>3/7/20</a:t>
             </a:fld>
             <a:endParaRPr lang="en-US"/>
           </a:p>
@@ -1737,7 +1696,7 @@
           <p:cNvPr id="5" name="Footer Placeholder 4">
             <a:extLst>
               <a:ext uri="{FF2B5EF4-FFF2-40B4-BE49-F238E27FC236}">
-                <a16:creationId xmlns:a16="http://schemas.microsoft.com/office/drawing/2014/main" id="{0DFEFF44-FD20-4486-9239-B67F9B356334}"/>
+                <a16:creationId xmlns:a16="http://schemas.microsoft.com/office/drawing/2014/main" xmlns="" id="{0DFEFF44-FD20-4486-9239-B67F9B356334}"/>
               </a:ext>
             </a:extLst>
           </p:cNvPr>
@@ -1762,7 +1721,7 @@
           <p:cNvPr id="6" name="Slide Number Placeholder 5">
             <a:extLst>
               <a:ext uri="{FF2B5EF4-FFF2-40B4-BE49-F238E27FC236}">
-                <a16:creationId xmlns:a16="http://schemas.microsoft.com/office/drawing/2014/main" id="{9C71DB16-7997-4BF6-93BA-8D35CDEFA327}"/>
+                <a16:creationId xmlns:a16="http://schemas.microsoft.com/office/drawing/2014/main" xmlns="" id="{9C71DB16-7997-4BF6-93BA-8D35CDEFA327}"/>
               </a:ext>
             </a:extLst>
           </p:cNvPr>
@@ -1821,7 +1780,7 @@
           <p:cNvPr id="2" name="Title 1">
             <a:extLst>
               <a:ext uri="{FF2B5EF4-FFF2-40B4-BE49-F238E27FC236}">
-                <a16:creationId xmlns:a16="http://schemas.microsoft.com/office/drawing/2014/main" id="{53B11278-7FDD-48DA-8026-A265E37E067A}"/>
+                <a16:creationId xmlns:a16="http://schemas.microsoft.com/office/drawing/2014/main" xmlns="" id="{53B11278-7FDD-48DA-8026-A265E37E067A}"/>
               </a:ext>
             </a:extLst>
           </p:cNvPr>
@@ -1849,7 +1808,7 @@
           <p:cNvPr id="3" name="Content Placeholder 2">
             <a:extLst>
               <a:ext uri="{FF2B5EF4-FFF2-40B4-BE49-F238E27FC236}">
-                <a16:creationId xmlns:a16="http://schemas.microsoft.com/office/drawing/2014/main" id="{D052A852-0427-4A60-9BAD-C25190EBAC75}"/>
+                <a16:creationId xmlns:a16="http://schemas.microsoft.com/office/drawing/2014/main" xmlns="" id="{D052A852-0427-4A60-9BAD-C25190EBAC75}"/>
               </a:ext>
             </a:extLst>
           </p:cNvPr>
@@ -1911,7 +1870,7 @@
           <p:cNvPr id="4" name="Content Placeholder 3">
             <a:extLst>
               <a:ext uri="{FF2B5EF4-FFF2-40B4-BE49-F238E27FC236}">
-                <a16:creationId xmlns:a16="http://schemas.microsoft.com/office/drawing/2014/main" id="{5E441582-A9F7-4AD6-BA4B-4DB8F2566342}"/>
+                <a16:creationId xmlns:a16="http://schemas.microsoft.com/office/drawing/2014/main" xmlns="" id="{5E441582-A9F7-4AD6-BA4B-4DB8F2566342}"/>
               </a:ext>
             </a:extLst>
           </p:cNvPr>
@@ -1973,7 +1932,7 @@
           <p:cNvPr id="5" name="Date Placeholder 4">
             <a:extLst>
               <a:ext uri="{FF2B5EF4-FFF2-40B4-BE49-F238E27FC236}">
-                <a16:creationId xmlns:a16="http://schemas.microsoft.com/office/drawing/2014/main" id="{946AC31C-78A7-41CF-A96E-84FD50F6EBEF}"/>
+                <a16:creationId xmlns:a16="http://schemas.microsoft.com/office/drawing/2014/main" xmlns="" id="{946AC31C-78A7-41CF-A96E-84FD50F6EBEF}"/>
               </a:ext>
             </a:extLst>
           </p:cNvPr>
@@ -1991,7 +1950,7 @@
           <a:p>
             <a:fld id="{E17AFC74-BA76-4616-BA7A-CECDE503B0F5}" type="datetimeFigureOut">
               <a:rPr lang="en-US" smtClean="0"/>
-              <a:t>3/7/2020</a:t>
+              <a:t>3/7/20</a:t>
             </a:fld>
             <a:endParaRPr lang="en-US"/>
           </a:p>
@@ -2002,7 +1961,7 @@
           <p:cNvPr id="6" name="Footer Placeholder 5">
             <a:extLst>
               <a:ext uri="{FF2B5EF4-FFF2-40B4-BE49-F238E27FC236}">
-                <a16:creationId xmlns:a16="http://schemas.microsoft.com/office/drawing/2014/main" id="{A7D6337D-FEEA-462E-822D-6743548C5754}"/>
+                <a16:creationId xmlns:a16="http://schemas.microsoft.com/office/drawing/2014/main" xmlns="" id="{A7D6337D-FEEA-462E-822D-6743548C5754}"/>
               </a:ext>
             </a:extLst>
           </p:cNvPr>
@@ -2027,7 +1986,7 @@
           <p:cNvPr id="7" name="Slide Number Placeholder 6">
             <a:extLst>
               <a:ext uri="{FF2B5EF4-FFF2-40B4-BE49-F238E27FC236}">
-                <a16:creationId xmlns:a16="http://schemas.microsoft.com/office/drawing/2014/main" id="{A0B283E8-955A-477B-AECE-2C23FF234744}"/>
+                <a16:creationId xmlns:a16="http://schemas.microsoft.com/office/drawing/2014/main" xmlns="" id="{A0B283E8-955A-477B-AECE-2C23FF234744}"/>
               </a:ext>
             </a:extLst>
           </p:cNvPr>
@@ -2086,7 +2045,7 @@
           <p:cNvPr id="2" name="Title 1">
             <a:extLst>
               <a:ext uri="{FF2B5EF4-FFF2-40B4-BE49-F238E27FC236}">
-                <a16:creationId xmlns:a16="http://schemas.microsoft.com/office/drawing/2014/main" id="{2CC37430-B105-41BE-A242-F8F000149426}"/>
+                <a16:creationId xmlns:a16="http://schemas.microsoft.com/office/drawing/2014/main" xmlns="" id="{2CC37430-B105-41BE-A242-F8F000149426}"/>
               </a:ext>
             </a:extLst>
           </p:cNvPr>
@@ -2119,7 +2078,7 @@
           <p:cNvPr id="3" name="Text Placeholder 2">
             <a:extLst>
               <a:ext uri="{FF2B5EF4-FFF2-40B4-BE49-F238E27FC236}">
-                <a16:creationId xmlns:a16="http://schemas.microsoft.com/office/drawing/2014/main" id="{31789FBD-54C2-408A-A815-61161CA9939C}"/>
+                <a16:creationId xmlns:a16="http://schemas.microsoft.com/office/drawing/2014/main" xmlns="" id="{31789FBD-54C2-408A-A815-61161CA9939C}"/>
               </a:ext>
             </a:extLst>
           </p:cNvPr>
@@ -2190,7 +2149,7 @@
           <p:cNvPr id="4" name="Content Placeholder 3">
             <a:extLst>
               <a:ext uri="{FF2B5EF4-FFF2-40B4-BE49-F238E27FC236}">
-                <a16:creationId xmlns:a16="http://schemas.microsoft.com/office/drawing/2014/main" id="{1CACE2D4-C795-4465-B937-257792769FFF}"/>
+                <a16:creationId xmlns:a16="http://schemas.microsoft.com/office/drawing/2014/main" xmlns="" id="{1CACE2D4-C795-4465-B937-257792769FFF}"/>
               </a:ext>
             </a:extLst>
           </p:cNvPr>
@@ -2252,7 +2211,7 @@
           <p:cNvPr id="5" name="Text Placeholder 4">
             <a:extLst>
               <a:ext uri="{FF2B5EF4-FFF2-40B4-BE49-F238E27FC236}">
-                <a16:creationId xmlns:a16="http://schemas.microsoft.com/office/drawing/2014/main" id="{87ABE465-E96C-42DC-899C-79AE5D918907}"/>
+                <a16:creationId xmlns:a16="http://schemas.microsoft.com/office/drawing/2014/main" xmlns="" id="{87ABE465-E96C-42DC-899C-79AE5D918907}"/>
               </a:ext>
             </a:extLst>
           </p:cNvPr>
@@ -2323,7 +2282,7 @@
           <p:cNvPr id="6" name="Content Placeholder 5">
             <a:extLst>
               <a:ext uri="{FF2B5EF4-FFF2-40B4-BE49-F238E27FC236}">
-                <a16:creationId xmlns:a16="http://schemas.microsoft.com/office/drawing/2014/main" id="{8E5C82F5-D471-4180-9758-E3654545C0EE}"/>
+                <a16:creationId xmlns:a16="http://schemas.microsoft.com/office/drawing/2014/main" xmlns="" id="{8E5C82F5-D471-4180-9758-E3654545C0EE}"/>
               </a:ext>
             </a:extLst>
           </p:cNvPr>
@@ -2385,7 +2344,7 @@
           <p:cNvPr id="7" name="Date Placeholder 6">
             <a:extLst>
               <a:ext uri="{FF2B5EF4-FFF2-40B4-BE49-F238E27FC236}">
-                <a16:creationId xmlns:a16="http://schemas.microsoft.com/office/drawing/2014/main" id="{F4B68CF1-604C-4E8E-BE94-910F68FA7FAC}"/>
+                <a16:creationId xmlns:a16="http://schemas.microsoft.com/office/drawing/2014/main" xmlns="" id="{F4B68CF1-604C-4E8E-BE94-910F68FA7FAC}"/>
               </a:ext>
             </a:extLst>
           </p:cNvPr>
@@ -2403,7 +2362,7 @@
           <a:p>
             <a:fld id="{E17AFC74-BA76-4616-BA7A-CECDE503B0F5}" type="datetimeFigureOut">
               <a:rPr lang="en-US" smtClean="0"/>
-              <a:t>3/7/2020</a:t>
+              <a:t>3/7/20</a:t>
             </a:fld>
             <a:endParaRPr lang="en-US"/>
           </a:p>
@@ -2414,7 +2373,7 @@
           <p:cNvPr id="8" name="Footer Placeholder 7">
             <a:extLst>
               <a:ext uri="{FF2B5EF4-FFF2-40B4-BE49-F238E27FC236}">
-                <a16:creationId xmlns:a16="http://schemas.microsoft.com/office/drawing/2014/main" id="{2DC38E8E-D850-461F-A27D-6A1471277AE4}"/>
+                <a16:creationId xmlns:a16="http://schemas.microsoft.com/office/drawing/2014/main" xmlns="" id="{2DC38E8E-D850-461F-A27D-6A1471277AE4}"/>
               </a:ext>
             </a:extLst>
           </p:cNvPr>
@@ -2439,7 +2398,7 @@
           <p:cNvPr id="9" name="Slide Number Placeholder 8">
             <a:extLst>
               <a:ext uri="{FF2B5EF4-FFF2-40B4-BE49-F238E27FC236}">
-                <a16:creationId xmlns:a16="http://schemas.microsoft.com/office/drawing/2014/main" id="{2693504A-2BE4-4709-A1DD-766077EEA8DC}"/>
+                <a16:creationId xmlns:a16="http://schemas.microsoft.com/office/drawing/2014/main" xmlns="" id="{2693504A-2BE4-4709-A1DD-766077EEA8DC}"/>
               </a:ext>
             </a:extLst>
           </p:cNvPr>
@@ -2498,7 +2457,7 @@
           <p:cNvPr id="2" name="Title 1">
             <a:extLst>
               <a:ext uri="{FF2B5EF4-FFF2-40B4-BE49-F238E27FC236}">
-                <a16:creationId xmlns:a16="http://schemas.microsoft.com/office/drawing/2014/main" id="{CA77337B-9E78-4479-837A-82565794DEA6}"/>
+                <a16:creationId xmlns:a16="http://schemas.microsoft.com/office/drawing/2014/main" xmlns="" id="{CA77337B-9E78-4479-837A-82565794DEA6}"/>
               </a:ext>
             </a:extLst>
           </p:cNvPr>
@@ -2526,7 +2485,7 @@
           <p:cNvPr id="3" name="Date Placeholder 2">
             <a:extLst>
               <a:ext uri="{FF2B5EF4-FFF2-40B4-BE49-F238E27FC236}">
-                <a16:creationId xmlns:a16="http://schemas.microsoft.com/office/drawing/2014/main" id="{F45AA7D2-E6A5-40A4-9F8F-95D32E847AB3}"/>
+                <a16:creationId xmlns:a16="http://schemas.microsoft.com/office/drawing/2014/main" xmlns="" id="{F45AA7D2-E6A5-40A4-9F8F-95D32E847AB3}"/>
               </a:ext>
             </a:extLst>
           </p:cNvPr>
@@ -2544,7 +2503,7 @@
           <a:p>
             <a:fld id="{E17AFC74-BA76-4616-BA7A-CECDE503B0F5}" type="datetimeFigureOut">
               <a:rPr lang="en-US" smtClean="0"/>
-              <a:t>3/7/2020</a:t>
+              <a:t>3/7/20</a:t>
             </a:fld>
             <a:endParaRPr lang="en-US"/>
           </a:p>
@@ -2555,7 +2514,7 @@
           <p:cNvPr id="4" name="Footer Placeholder 3">
             <a:extLst>
               <a:ext uri="{FF2B5EF4-FFF2-40B4-BE49-F238E27FC236}">
-                <a16:creationId xmlns:a16="http://schemas.microsoft.com/office/drawing/2014/main" id="{D0062612-3328-4A52-ACDD-3B8EDE0BE45C}"/>
+                <a16:creationId xmlns:a16="http://schemas.microsoft.com/office/drawing/2014/main" xmlns="" id="{D0062612-3328-4A52-ACDD-3B8EDE0BE45C}"/>
               </a:ext>
             </a:extLst>
           </p:cNvPr>
@@ -2580,7 +2539,7 @@
           <p:cNvPr id="5" name="Slide Number Placeholder 4">
             <a:extLst>
               <a:ext uri="{FF2B5EF4-FFF2-40B4-BE49-F238E27FC236}">
-                <a16:creationId xmlns:a16="http://schemas.microsoft.com/office/drawing/2014/main" id="{4913D660-7141-4EEE-BB86-7AE29C8BACFA}"/>
+                <a16:creationId xmlns:a16="http://schemas.microsoft.com/office/drawing/2014/main" xmlns="" id="{4913D660-7141-4EEE-BB86-7AE29C8BACFA}"/>
               </a:ext>
             </a:extLst>
           </p:cNvPr>
@@ -2639,7 +2598,7 @@
           <p:cNvPr id="2" name="Date Placeholder 1">
             <a:extLst>
               <a:ext uri="{FF2B5EF4-FFF2-40B4-BE49-F238E27FC236}">
-                <a16:creationId xmlns:a16="http://schemas.microsoft.com/office/drawing/2014/main" id="{B8D955A9-8EA7-4838-8499-FB44B2EBAEE5}"/>
+                <a16:creationId xmlns:a16="http://schemas.microsoft.com/office/drawing/2014/main" xmlns="" id="{B8D955A9-8EA7-4838-8499-FB44B2EBAEE5}"/>
               </a:ext>
             </a:extLst>
           </p:cNvPr>
@@ -2657,7 +2616,7 @@
           <a:p>
             <a:fld id="{E17AFC74-BA76-4616-BA7A-CECDE503B0F5}" type="datetimeFigureOut">
               <a:rPr lang="en-US" smtClean="0"/>
-              <a:t>3/7/2020</a:t>
+              <a:t>3/7/20</a:t>
             </a:fld>
             <a:endParaRPr lang="en-US"/>
           </a:p>
@@ -2668,7 +2627,7 @@
           <p:cNvPr id="3" name="Footer Placeholder 2">
             <a:extLst>
               <a:ext uri="{FF2B5EF4-FFF2-40B4-BE49-F238E27FC236}">
-                <a16:creationId xmlns:a16="http://schemas.microsoft.com/office/drawing/2014/main" id="{D2412C79-ACAD-4993-B5F7-801F870400E4}"/>
+                <a16:creationId xmlns:a16="http://schemas.microsoft.com/office/drawing/2014/main" xmlns="" id="{D2412C79-ACAD-4993-B5F7-801F870400E4}"/>
               </a:ext>
             </a:extLst>
           </p:cNvPr>
@@ -2693,7 +2652,7 @@
           <p:cNvPr id="4" name="Slide Number Placeholder 3">
             <a:extLst>
               <a:ext uri="{FF2B5EF4-FFF2-40B4-BE49-F238E27FC236}">
-                <a16:creationId xmlns:a16="http://schemas.microsoft.com/office/drawing/2014/main" id="{B1DD775A-674D-4B4F-AF32-670A8BD3EA75}"/>
+                <a16:creationId xmlns:a16="http://schemas.microsoft.com/office/drawing/2014/main" xmlns="" id="{B1DD775A-674D-4B4F-AF32-670A8BD3EA75}"/>
               </a:ext>
             </a:extLst>
           </p:cNvPr>
@@ -2752,7 +2711,7 @@
           <p:cNvPr id="2" name="Title 1">
             <a:extLst>
               <a:ext uri="{FF2B5EF4-FFF2-40B4-BE49-F238E27FC236}">
-                <a16:creationId xmlns:a16="http://schemas.microsoft.com/office/drawing/2014/main" id="{FC656E31-9B0D-4D67-9AA5-F0C4AED0DBF8}"/>
+                <a16:creationId xmlns:a16="http://schemas.microsoft.com/office/drawing/2014/main" xmlns="" id="{FC656E31-9B0D-4D67-9AA5-F0C4AED0DBF8}"/>
               </a:ext>
             </a:extLst>
           </p:cNvPr>
@@ -2789,7 +2748,7 @@
           <p:cNvPr id="3" name="Content Placeholder 2">
             <a:extLst>
               <a:ext uri="{FF2B5EF4-FFF2-40B4-BE49-F238E27FC236}">
-                <a16:creationId xmlns:a16="http://schemas.microsoft.com/office/drawing/2014/main" id="{DC4715E1-3A50-4688-BC09-08181917B25F}"/>
+                <a16:creationId xmlns:a16="http://schemas.microsoft.com/office/drawing/2014/main" xmlns="" id="{DC4715E1-3A50-4688-BC09-08181917B25F}"/>
               </a:ext>
             </a:extLst>
           </p:cNvPr>
@@ -2879,7 +2838,7 @@
           <p:cNvPr id="4" name="Text Placeholder 3">
             <a:extLst>
               <a:ext uri="{FF2B5EF4-FFF2-40B4-BE49-F238E27FC236}">
-                <a16:creationId xmlns:a16="http://schemas.microsoft.com/office/drawing/2014/main" id="{DED48F40-EBC9-4DFA-A4F7-B4EB68C44B90}"/>
+                <a16:creationId xmlns:a16="http://schemas.microsoft.com/office/drawing/2014/main" xmlns="" id="{DED48F40-EBC9-4DFA-A4F7-B4EB68C44B90}"/>
               </a:ext>
             </a:extLst>
           </p:cNvPr>
@@ -2950,7 +2909,7 @@
           <p:cNvPr id="5" name="Date Placeholder 4">
             <a:extLst>
               <a:ext uri="{FF2B5EF4-FFF2-40B4-BE49-F238E27FC236}">
-                <a16:creationId xmlns:a16="http://schemas.microsoft.com/office/drawing/2014/main" id="{3CA8FA49-0A3B-42CB-A484-222897EA0033}"/>
+                <a16:creationId xmlns:a16="http://schemas.microsoft.com/office/drawing/2014/main" xmlns="" id="{3CA8FA49-0A3B-42CB-A484-222897EA0033}"/>
               </a:ext>
             </a:extLst>
           </p:cNvPr>
@@ -2968,7 +2927,7 @@
           <a:p>
             <a:fld id="{E17AFC74-BA76-4616-BA7A-CECDE503B0F5}" type="datetimeFigureOut">
               <a:rPr lang="en-US" smtClean="0"/>
-              <a:t>3/7/2020</a:t>
+              <a:t>3/7/20</a:t>
             </a:fld>
             <a:endParaRPr lang="en-US"/>
           </a:p>
@@ -2979,7 +2938,7 @@
           <p:cNvPr id="6" name="Footer Placeholder 5">
             <a:extLst>
               <a:ext uri="{FF2B5EF4-FFF2-40B4-BE49-F238E27FC236}">
-                <a16:creationId xmlns:a16="http://schemas.microsoft.com/office/drawing/2014/main" id="{E0C59385-08F8-4D9E-967A-390B7AE05712}"/>
+                <a16:creationId xmlns:a16="http://schemas.microsoft.com/office/drawing/2014/main" xmlns="" id="{E0C59385-08F8-4D9E-967A-390B7AE05712}"/>
               </a:ext>
             </a:extLst>
           </p:cNvPr>
@@ -3004,7 +2963,7 @@
           <p:cNvPr id="7" name="Slide Number Placeholder 6">
             <a:extLst>
               <a:ext uri="{FF2B5EF4-FFF2-40B4-BE49-F238E27FC236}">
-                <a16:creationId xmlns:a16="http://schemas.microsoft.com/office/drawing/2014/main" id="{89CD3BA7-5B9B-4B7A-9968-08D67A452439}"/>
+                <a16:creationId xmlns:a16="http://schemas.microsoft.com/office/drawing/2014/main" xmlns="" id="{89CD3BA7-5B9B-4B7A-9968-08D67A452439}"/>
               </a:ext>
             </a:extLst>
           </p:cNvPr>
@@ -3063,7 +3022,7 @@
           <p:cNvPr id="2" name="Title 1">
             <a:extLst>
               <a:ext uri="{FF2B5EF4-FFF2-40B4-BE49-F238E27FC236}">
-                <a16:creationId xmlns:a16="http://schemas.microsoft.com/office/drawing/2014/main" id="{61D70207-9414-4010-BD46-1707DFA90694}"/>
+                <a16:creationId xmlns:a16="http://schemas.microsoft.com/office/drawing/2014/main" xmlns="" id="{61D70207-9414-4010-BD46-1707DFA90694}"/>
               </a:ext>
             </a:extLst>
           </p:cNvPr>
@@ -3100,7 +3059,7 @@
           <p:cNvPr id="3" name="Picture Placeholder 2">
             <a:extLst>
               <a:ext uri="{FF2B5EF4-FFF2-40B4-BE49-F238E27FC236}">
-                <a16:creationId xmlns:a16="http://schemas.microsoft.com/office/drawing/2014/main" id="{27CAC20E-A73C-4A04-9D5B-E48F1C52CF24}"/>
+                <a16:creationId xmlns:a16="http://schemas.microsoft.com/office/drawing/2014/main" xmlns="" id="{27CAC20E-A73C-4A04-9D5B-E48F1C52CF24}"/>
               </a:ext>
             </a:extLst>
           </p:cNvPr>
@@ -3167,7 +3126,7 @@
           <p:cNvPr id="4" name="Text Placeholder 3">
             <a:extLst>
               <a:ext uri="{FF2B5EF4-FFF2-40B4-BE49-F238E27FC236}">
-                <a16:creationId xmlns:a16="http://schemas.microsoft.com/office/drawing/2014/main" id="{5C2216ED-70D6-44A8-B5EC-DC76728E47A3}"/>
+                <a16:creationId xmlns:a16="http://schemas.microsoft.com/office/drawing/2014/main" xmlns="" id="{5C2216ED-70D6-44A8-B5EC-DC76728E47A3}"/>
               </a:ext>
             </a:extLst>
           </p:cNvPr>
@@ -3238,7 +3197,7 @@
           <p:cNvPr id="5" name="Date Placeholder 4">
             <a:extLst>
               <a:ext uri="{FF2B5EF4-FFF2-40B4-BE49-F238E27FC236}">
-                <a16:creationId xmlns:a16="http://schemas.microsoft.com/office/drawing/2014/main" id="{5D0F5E1D-4D13-4D10-9534-D58C031956E5}"/>
+                <a16:creationId xmlns:a16="http://schemas.microsoft.com/office/drawing/2014/main" xmlns="" id="{5D0F5E1D-4D13-4D10-9534-D58C031956E5}"/>
               </a:ext>
             </a:extLst>
           </p:cNvPr>
@@ -3256,7 +3215,7 @@
           <a:p>
             <a:fld id="{E17AFC74-BA76-4616-BA7A-CECDE503B0F5}" type="datetimeFigureOut">
               <a:rPr lang="en-US" smtClean="0"/>
-              <a:t>3/7/2020</a:t>
+              <a:t>3/7/20</a:t>
             </a:fld>
             <a:endParaRPr lang="en-US"/>
           </a:p>
@@ -3267,7 +3226,7 @@
           <p:cNvPr id="6" name="Footer Placeholder 5">
             <a:extLst>
               <a:ext uri="{FF2B5EF4-FFF2-40B4-BE49-F238E27FC236}">
-                <a16:creationId xmlns:a16="http://schemas.microsoft.com/office/drawing/2014/main" id="{E9161032-8AAB-45B8-A1FA-D7FA5D437969}"/>
+                <a16:creationId xmlns:a16="http://schemas.microsoft.com/office/drawing/2014/main" xmlns="" id="{E9161032-8AAB-45B8-A1FA-D7FA5D437969}"/>
               </a:ext>
             </a:extLst>
           </p:cNvPr>
@@ -3292,7 +3251,7 @@
           <p:cNvPr id="7" name="Slide Number Placeholder 6">
             <a:extLst>
               <a:ext uri="{FF2B5EF4-FFF2-40B4-BE49-F238E27FC236}">
-                <a16:creationId xmlns:a16="http://schemas.microsoft.com/office/drawing/2014/main" id="{E5A15C1E-F743-4EF6-919C-E506AC9D015F}"/>
+                <a16:creationId xmlns:a16="http://schemas.microsoft.com/office/drawing/2014/main" xmlns="" id="{E5A15C1E-F743-4EF6-919C-E506AC9D015F}"/>
               </a:ext>
             </a:extLst>
           </p:cNvPr>
@@ -3356,7 +3315,7 @@
           <p:cNvPr id="2" name="Title Placeholder 1">
             <a:extLst>
               <a:ext uri="{FF2B5EF4-FFF2-40B4-BE49-F238E27FC236}">
-                <a16:creationId xmlns:a16="http://schemas.microsoft.com/office/drawing/2014/main" id="{8A621B9F-851D-4B7D-9DF6-B5155DB2989D}"/>
+                <a16:creationId xmlns:a16="http://schemas.microsoft.com/office/drawing/2014/main" xmlns="" id="{8A621B9F-851D-4B7D-9DF6-B5155DB2989D}"/>
               </a:ext>
             </a:extLst>
           </p:cNvPr>
@@ -3394,7 +3353,7 @@
           <p:cNvPr id="3" name="Text Placeholder 2">
             <a:extLst>
               <a:ext uri="{FF2B5EF4-FFF2-40B4-BE49-F238E27FC236}">
-                <a16:creationId xmlns:a16="http://schemas.microsoft.com/office/drawing/2014/main" id="{F4F76326-32F7-45B0-A78B-BC76791F822B}"/>
+                <a16:creationId xmlns:a16="http://schemas.microsoft.com/office/drawing/2014/main" xmlns="" id="{F4F76326-32F7-45B0-A78B-BC76791F822B}"/>
               </a:ext>
             </a:extLst>
           </p:cNvPr>
@@ -3461,7 +3420,7 @@
           <p:cNvPr id="4" name="Date Placeholder 3">
             <a:extLst>
               <a:ext uri="{FF2B5EF4-FFF2-40B4-BE49-F238E27FC236}">
-                <a16:creationId xmlns:a16="http://schemas.microsoft.com/office/drawing/2014/main" id="{A669DC44-9F4F-40A1-ABBA-7AF93FD7E283}"/>
+                <a16:creationId xmlns:a16="http://schemas.microsoft.com/office/drawing/2014/main" xmlns="" id="{A669DC44-9F4F-40A1-ABBA-7AF93FD7E283}"/>
               </a:ext>
             </a:extLst>
           </p:cNvPr>
@@ -3497,7 +3456,7 @@
           <a:p>
             <a:fld id="{E17AFC74-BA76-4616-BA7A-CECDE503B0F5}" type="datetimeFigureOut">
               <a:rPr lang="en-US" smtClean="0"/>
-              <a:t>3/7/2020</a:t>
+              <a:t>3/7/20</a:t>
             </a:fld>
             <a:endParaRPr lang="en-US"/>
           </a:p>
@@ -3508,7 +3467,7 @@
           <p:cNvPr id="5" name="Footer Placeholder 4">
             <a:extLst>
               <a:ext uri="{FF2B5EF4-FFF2-40B4-BE49-F238E27FC236}">
-                <a16:creationId xmlns:a16="http://schemas.microsoft.com/office/drawing/2014/main" id="{605B4720-09DE-4175-B50B-0710151DF646}"/>
+                <a16:creationId xmlns:a16="http://schemas.microsoft.com/office/drawing/2014/main" xmlns="" id="{605B4720-09DE-4175-B50B-0710151DF646}"/>
               </a:ext>
             </a:extLst>
           </p:cNvPr>
@@ -3551,7 +3510,7 @@
           <p:cNvPr id="6" name="Slide Number Placeholder 5">
             <a:extLst>
               <a:ext uri="{FF2B5EF4-FFF2-40B4-BE49-F238E27FC236}">
-                <a16:creationId xmlns:a16="http://schemas.microsoft.com/office/drawing/2014/main" id="{E69C885A-E9C0-467F-ACCF-1BBEB3FB1F96}"/>
+                <a16:creationId xmlns:a16="http://schemas.microsoft.com/office/drawing/2014/main" xmlns="" id="{E69C885A-E9C0-467F-ACCF-1BBEB3FB1F96}"/>
               </a:ext>
             </a:extLst>
           </p:cNvPr>
@@ -3919,7 +3878,7 @@
           <p:cNvPr id="6" name="Rectangle 5">
             <a:extLst>
               <a:ext uri="{FF2B5EF4-FFF2-40B4-BE49-F238E27FC236}">
-                <a16:creationId xmlns:a16="http://schemas.microsoft.com/office/drawing/2014/main" id="{793DA067-D425-4A50-994D-52DB5946AA31}"/>
+                <a16:creationId xmlns:a16="http://schemas.microsoft.com/office/drawing/2014/main" xmlns="" id="{793DA067-D425-4A50-994D-52DB5946AA31}"/>
               </a:ext>
             </a:extLst>
           </p:cNvPr>
@@ -3965,7 +3924,7 @@
           <p:cNvPr id="10" name="Straight Arrow Connector 9">
             <a:extLst>
               <a:ext uri="{FF2B5EF4-FFF2-40B4-BE49-F238E27FC236}">
-                <a16:creationId xmlns:a16="http://schemas.microsoft.com/office/drawing/2014/main" id="{A89C22DD-226C-46F2-816E-D54E3CBF4E86}"/>
+                <a16:creationId xmlns:a16="http://schemas.microsoft.com/office/drawing/2014/main" xmlns="" id="{A89C22DD-226C-46F2-816E-D54E3CBF4E86}"/>
               </a:ext>
             </a:extLst>
           </p:cNvPr>
@@ -4006,7 +3965,7 @@
           <p:cNvPr id="47" name="Rectangle 46">
             <a:extLst>
               <a:ext uri="{FF2B5EF4-FFF2-40B4-BE49-F238E27FC236}">
-                <a16:creationId xmlns:a16="http://schemas.microsoft.com/office/drawing/2014/main" id="{F12AF9E8-72B3-49C2-A806-D7A997233D9B}"/>
+                <a16:creationId xmlns:a16="http://schemas.microsoft.com/office/drawing/2014/main" xmlns="" id="{F12AF9E8-72B3-49C2-A806-D7A997233D9B}"/>
               </a:ext>
             </a:extLst>
           </p:cNvPr>
@@ -4054,7 +4013,7 @@
           <p:cNvPr id="50" name="Rectangle 49">
             <a:extLst>
               <a:ext uri="{FF2B5EF4-FFF2-40B4-BE49-F238E27FC236}">
-                <a16:creationId xmlns:a16="http://schemas.microsoft.com/office/drawing/2014/main" id="{72BA8D96-D1B3-403E-B40C-4B015061F610}"/>
+                <a16:creationId xmlns:a16="http://schemas.microsoft.com/office/drawing/2014/main" xmlns="" id="{72BA8D96-D1B3-403E-B40C-4B015061F610}"/>
               </a:ext>
             </a:extLst>
           </p:cNvPr>
@@ -4102,7 +4061,7 @@
           <p:cNvPr id="52" name="Rectangle 51">
             <a:extLst>
               <a:ext uri="{FF2B5EF4-FFF2-40B4-BE49-F238E27FC236}">
-                <a16:creationId xmlns:a16="http://schemas.microsoft.com/office/drawing/2014/main" id="{DA80DDF8-DEA8-4759-B1BD-161F83A1C3BA}"/>
+                <a16:creationId xmlns:a16="http://schemas.microsoft.com/office/drawing/2014/main" xmlns="" id="{DA80DDF8-DEA8-4759-B1BD-161F83A1C3BA}"/>
               </a:ext>
             </a:extLst>
           </p:cNvPr>
@@ -4151,7 +4110,7 @@
           <p:cNvPr id="69" name="Rectangle 68">
             <a:extLst>
               <a:ext uri="{FF2B5EF4-FFF2-40B4-BE49-F238E27FC236}">
-                <a16:creationId xmlns:a16="http://schemas.microsoft.com/office/drawing/2014/main" id="{C5B82377-0FED-49E6-BE0F-D5411E16A4A5}"/>
+                <a16:creationId xmlns:a16="http://schemas.microsoft.com/office/drawing/2014/main" xmlns="" id="{C5B82377-0FED-49E6-BE0F-D5411E16A4A5}"/>
               </a:ext>
             </a:extLst>
           </p:cNvPr>
@@ -4197,7 +4156,7 @@
           <p:cNvPr id="74" name="Straight Arrow Connector 73">
             <a:extLst>
               <a:ext uri="{FF2B5EF4-FFF2-40B4-BE49-F238E27FC236}">
-                <a16:creationId xmlns:a16="http://schemas.microsoft.com/office/drawing/2014/main" id="{AAD42AEF-07BF-4FE1-9672-F6D121CC24F0}"/>
+                <a16:creationId xmlns:a16="http://schemas.microsoft.com/office/drawing/2014/main" xmlns="" id="{AAD42AEF-07BF-4FE1-9672-F6D121CC24F0}"/>
               </a:ext>
             </a:extLst>
           </p:cNvPr>
@@ -4238,7 +4197,7 @@
           <p:cNvPr id="76" name="Straight Arrow Connector 75">
             <a:extLst>
               <a:ext uri="{FF2B5EF4-FFF2-40B4-BE49-F238E27FC236}">
-                <a16:creationId xmlns:a16="http://schemas.microsoft.com/office/drawing/2014/main" id="{17045DD4-B8EC-4B8C-BC24-B58B2F1EF817}"/>
+                <a16:creationId xmlns:a16="http://schemas.microsoft.com/office/drawing/2014/main" xmlns="" id="{17045DD4-B8EC-4B8C-BC24-B58B2F1EF817}"/>
               </a:ext>
             </a:extLst>
           </p:cNvPr>
@@ -4279,7 +4238,7 @@
           <p:cNvPr id="77" name="Straight Arrow Connector 76">
             <a:extLst>
               <a:ext uri="{FF2B5EF4-FFF2-40B4-BE49-F238E27FC236}">
-                <a16:creationId xmlns:a16="http://schemas.microsoft.com/office/drawing/2014/main" id="{11B6D741-997A-4987-8F36-31EBE39C2307}"/>
+                <a16:creationId xmlns:a16="http://schemas.microsoft.com/office/drawing/2014/main" xmlns="" id="{11B6D741-997A-4987-8F36-31EBE39C2307}"/>
               </a:ext>
             </a:extLst>
           </p:cNvPr>
@@ -4320,7 +4279,7 @@
           <p:cNvPr id="88" name="Rectangle 87">
             <a:extLst>
               <a:ext uri="{FF2B5EF4-FFF2-40B4-BE49-F238E27FC236}">
-                <a16:creationId xmlns:a16="http://schemas.microsoft.com/office/drawing/2014/main" id="{D41F69BC-597C-4C57-922F-4F7FF361E1AF}"/>
+                <a16:creationId xmlns:a16="http://schemas.microsoft.com/office/drawing/2014/main" xmlns="" id="{D41F69BC-597C-4C57-922F-4F7FF361E1AF}"/>
               </a:ext>
             </a:extLst>
           </p:cNvPr>
@@ -4369,7 +4328,7 @@
           <p:cNvPr id="111" name="Straight Arrow Connector 110">
             <a:extLst>
               <a:ext uri="{FF2B5EF4-FFF2-40B4-BE49-F238E27FC236}">
-                <a16:creationId xmlns:a16="http://schemas.microsoft.com/office/drawing/2014/main" id="{36CE0122-94BB-48B4-8299-311ADF53D01A}"/>
+                <a16:creationId xmlns:a16="http://schemas.microsoft.com/office/drawing/2014/main" xmlns="" id="{36CE0122-94BB-48B4-8299-311ADF53D01A}"/>
               </a:ext>
             </a:extLst>
           </p:cNvPr>
@@ -4410,7 +4369,7 @@
           <p:cNvPr id="114" name="Straight Arrow Connector 113">
             <a:extLst>
               <a:ext uri="{FF2B5EF4-FFF2-40B4-BE49-F238E27FC236}">
-                <a16:creationId xmlns:a16="http://schemas.microsoft.com/office/drawing/2014/main" id="{53D240C4-D5B8-4650-B923-4B91961DE6E2}"/>
+                <a16:creationId xmlns:a16="http://schemas.microsoft.com/office/drawing/2014/main" xmlns="" id="{53D240C4-D5B8-4650-B923-4B91961DE6E2}"/>
               </a:ext>
             </a:extLst>
           </p:cNvPr>
@@ -4451,7 +4410,7 @@
           <p:cNvPr id="126" name="Rectangle 125">
             <a:extLst>
               <a:ext uri="{FF2B5EF4-FFF2-40B4-BE49-F238E27FC236}">
-                <a16:creationId xmlns:a16="http://schemas.microsoft.com/office/drawing/2014/main" id="{39A323AA-FDCD-4F97-8B8B-5D9D27BE149C}"/>
+                <a16:creationId xmlns:a16="http://schemas.microsoft.com/office/drawing/2014/main" xmlns="" id="{39A323AA-FDCD-4F97-8B8B-5D9D27BE149C}"/>
               </a:ext>
             </a:extLst>
           </p:cNvPr>
@@ -4485,7 +4444,7 @@
           <p:cNvPr id="137" name="Rectangle 136">
             <a:extLst>
               <a:ext uri="{FF2B5EF4-FFF2-40B4-BE49-F238E27FC236}">
-                <a16:creationId xmlns:a16="http://schemas.microsoft.com/office/drawing/2014/main" id="{210F76F8-7F73-4E1C-9438-29DF2F7D47AC}"/>
+                <a16:creationId xmlns:a16="http://schemas.microsoft.com/office/drawing/2014/main" xmlns="" id="{210F76F8-7F73-4E1C-9438-29DF2F7D47AC}"/>
               </a:ext>
             </a:extLst>
           </p:cNvPr>
@@ -4527,7 +4486,7 @@
           <p:cNvPr id="138" name="Rectangle 137">
             <a:extLst>
               <a:ext uri="{FF2B5EF4-FFF2-40B4-BE49-F238E27FC236}">
-                <a16:creationId xmlns:a16="http://schemas.microsoft.com/office/drawing/2014/main" id="{4F8DCB8B-905D-445E-8584-FA14D37909BC}"/>
+                <a16:creationId xmlns:a16="http://schemas.microsoft.com/office/drawing/2014/main" xmlns="" id="{4F8DCB8B-905D-445E-8584-FA14D37909BC}"/>
               </a:ext>
             </a:extLst>
           </p:cNvPr>
@@ -4561,7 +4520,7 @@
           <p:cNvPr id="139" name="Rectangle 138">
             <a:extLst>
               <a:ext uri="{FF2B5EF4-FFF2-40B4-BE49-F238E27FC236}">
-                <a16:creationId xmlns:a16="http://schemas.microsoft.com/office/drawing/2014/main" id="{1DE06F60-E700-4BB2-8877-5244E267C939}"/>
+                <a16:creationId xmlns:a16="http://schemas.microsoft.com/office/drawing/2014/main" xmlns="" id="{1DE06F60-E700-4BB2-8877-5244E267C939}"/>
               </a:ext>
             </a:extLst>
           </p:cNvPr>
@@ -4603,7 +4562,7 @@
           <p:cNvPr id="140" name="Rectangle 139">
             <a:extLst>
               <a:ext uri="{FF2B5EF4-FFF2-40B4-BE49-F238E27FC236}">
-                <a16:creationId xmlns:a16="http://schemas.microsoft.com/office/drawing/2014/main" id="{9866B5CE-0B8D-45E9-AF0E-06FDFB2D530C}"/>
+                <a16:creationId xmlns:a16="http://schemas.microsoft.com/office/drawing/2014/main" xmlns="" id="{9866B5CE-0B8D-45E9-AF0E-06FDFB2D530C}"/>
               </a:ext>
             </a:extLst>
           </p:cNvPr>
@@ -4637,7 +4596,7 @@
           <p:cNvPr id="141" name="Rectangle 140">
             <a:extLst>
               <a:ext uri="{FF2B5EF4-FFF2-40B4-BE49-F238E27FC236}">
-                <a16:creationId xmlns:a16="http://schemas.microsoft.com/office/drawing/2014/main" id="{1A07D18C-63A9-4932-B4B1-D1C8DDA5810A}"/>
+                <a16:creationId xmlns:a16="http://schemas.microsoft.com/office/drawing/2014/main" xmlns="" id="{1A07D18C-63A9-4932-B4B1-D1C8DDA5810A}"/>
               </a:ext>
             </a:extLst>
           </p:cNvPr>
@@ -4671,7 +4630,7 @@
           <p:cNvPr id="142" name="Rectangle 141">
             <a:extLst>
               <a:ext uri="{FF2B5EF4-FFF2-40B4-BE49-F238E27FC236}">
-                <a16:creationId xmlns:a16="http://schemas.microsoft.com/office/drawing/2014/main" id="{331F8D51-08E2-4ABB-97C2-AE0BF7CE674E}"/>
+                <a16:creationId xmlns:a16="http://schemas.microsoft.com/office/drawing/2014/main" xmlns="" id="{331F8D51-08E2-4ABB-97C2-AE0BF7CE674E}"/>
               </a:ext>
             </a:extLst>
           </p:cNvPr>
@@ -4705,7 +4664,7 @@
           <p:cNvPr id="155" name="Connector: Elbow 154">
             <a:extLst>
               <a:ext uri="{FF2B5EF4-FFF2-40B4-BE49-F238E27FC236}">
-                <a16:creationId xmlns:a16="http://schemas.microsoft.com/office/drawing/2014/main" id="{063B02D8-19A9-4EEA-90D1-FA22CBC3C0CA}"/>
+                <a16:creationId xmlns:a16="http://schemas.microsoft.com/office/drawing/2014/main" xmlns="" id="{063B02D8-19A9-4EEA-90D1-FA22CBC3C0CA}"/>
               </a:ext>
             </a:extLst>
           </p:cNvPr>
@@ -4745,7 +4704,7 @@
           <p:cNvPr id="160" name="Connector: Elbow 159">
             <a:extLst>
               <a:ext uri="{FF2B5EF4-FFF2-40B4-BE49-F238E27FC236}">
-                <a16:creationId xmlns:a16="http://schemas.microsoft.com/office/drawing/2014/main" id="{46BA998D-C213-409D-B4CA-94C83F7B158E}"/>
+                <a16:creationId xmlns:a16="http://schemas.microsoft.com/office/drawing/2014/main" xmlns="" id="{46BA998D-C213-409D-B4CA-94C83F7B158E}"/>
               </a:ext>
             </a:extLst>
           </p:cNvPr>
@@ -4785,7 +4744,7 @@
           <p:cNvPr id="194" name="Straight Arrow Connector 193">
             <a:extLst>
               <a:ext uri="{FF2B5EF4-FFF2-40B4-BE49-F238E27FC236}">
-                <a16:creationId xmlns:a16="http://schemas.microsoft.com/office/drawing/2014/main" id="{D5292CFC-5275-4FD2-8109-6B14F01EBC7A}"/>
+                <a16:creationId xmlns:a16="http://schemas.microsoft.com/office/drawing/2014/main" xmlns="" id="{D5292CFC-5275-4FD2-8109-6B14F01EBC7A}"/>
               </a:ext>
             </a:extLst>
           </p:cNvPr>
@@ -4826,7 +4785,7 @@
           <p:cNvPr id="214" name="Rectangle 213">
             <a:extLst>
               <a:ext uri="{FF2B5EF4-FFF2-40B4-BE49-F238E27FC236}">
-                <a16:creationId xmlns:a16="http://schemas.microsoft.com/office/drawing/2014/main" id="{2A553585-52E8-467E-A7F2-C88B4C864A0F}"/>
+                <a16:creationId xmlns:a16="http://schemas.microsoft.com/office/drawing/2014/main" xmlns="" id="{2A553585-52E8-467E-A7F2-C88B4C864A0F}"/>
               </a:ext>
             </a:extLst>
           </p:cNvPr>
@@ -4860,7 +4819,7 @@
           <p:cNvPr id="215" name="Rectangle 214">
             <a:extLst>
               <a:ext uri="{FF2B5EF4-FFF2-40B4-BE49-F238E27FC236}">
-                <a16:creationId xmlns:a16="http://schemas.microsoft.com/office/drawing/2014/main" id="{8A736463-5E14-434D-BC8F-A5D477198C8B}"/>
+                <a16:creationId xmlns:a16="http://schemas.microsoft.com/office/drawing/2014/main" xmlns="" id="{8A736463-5E14-434D-BC8F-A5D477198C8B}"/>
               </a:ext>
             </a:extLst>
           </p:cNvPr>
@@ -4894,7 +4853,7 @@
           <p:cNvPr id="216" name="Rectangle 215">
             <a:extLst>
               <a:ext uri="{FF2B5EF4-FFF2-40B4-BE49-F238E27FC236}">
-                <a16:creationId xmlns:a16="http://schemas.microsoft.com/office/drawing/2014/main" id="{979BDA46-FAFD-4BC1-9764-07E70725BDCC}"/>
+                <a16:creationId xmlns:a16="http://schemas.microsoft.com/office/drawing/2014/main" xmlns="" id="{979BDA46-FAFD-4BC1-9764-07E70725BDCC}"/>
               </a:ext>
             </a:extLst>
           </p:cNvPr>
@@ -4928,7 +4887,7 @@
           <p:cNvPr id="230" name="Connector: Elbow 229">
             <a:extLst>
               <a:ext uri="{FF2B5EF4-FFF2-40B4-BE49-F238E27FC236}">
-                <a16:creationId xmlns:a16="http://schemas.microsoft.com/office/drawing/2014/main" id="{FE1035AB-A5FE-4C5F-BF9C-C0B9D810D481}"/>
+                <a16:creationId xmlns:a16="http://schemas.microsoft.com/office/drawing/2014/main" xmlns="" id="{FE1035AB-A5FE-4C5F-BF9C-C0B9D810D481}"/>
               </a:ext>
             </a:extLst>
           </p:cNvPr>
@@ -4971,7 +4930,7 @@
           <p:cNvPr id="231" name="Connector: Elbow 230">
             <a:extLst>
               <a:ext uri="{FF2B5EF4-FFF2-40B4-BE49-F238E27FC236}">
-                <a16:creationId xmlns:a16="http://schemas.microsoft.com/office/drawing/2014/main" id="{6E574628-7DE2-4E54-BFB0-B603F96A73F2}"/>
+                <a16:creationId xmlns:a16="http://schemas.microsoft.com/office/drawing/2014/main" xmlns="" id="{6E574628-7DE2-4E54-BFB0-B603F96A73F2}"/>
               </a:ext>
             </a:extLst>
           </p:cNvPr>
@@ -5014,7 +4973,7 @@
           <p:cNvPr id="232" name="Connector: Elbow 231">
             <a:extLst>
               <a:ext uri="{FF2B5EF4-FFF2-40B4-BE49-F238E27FC236}">
-                <a16:creationId xmlns:a16="http://schemas.microsoft.com/office/drawing/2014/main" id="{F9413389-FC58-45E8-9D4B-EEBD5971A3F9}"/>
+                <a16:creationId xmlns:a16="http://schemas.microsoft.com/office/drawing/2014/main" xmlns="" id="{F9413389-FC58-45E8-9D4B-EEBD5971A3F9}"/>
               </a:ext>
             </a:extLst>
           </p:cNvPr>
@@ -5057,7 +5016,7 @@
           <p:cNvPr id="235" name="Connector: Elbow 234">
             <a:extLst>
               <a:ext uri="{FF2B5EF4-FFF2-40B4-BE49-F238E27FC236}">
-                <a16:creationId xmlns:a16="http://schemas.microsoft.com/office/drawing/2014/main" id="{A53A34B3-7B23-4666-A3D9-EAE06CCFC506}"/>
+                <a16:creationId xmlns:a16="http://schemas.microsoft.com/office/drawing/2014/main" xmlns="" id="{A53A34B3-7B23-4666-A3D9-EAE06CCFC506}"/>
               </a:ext>
             </a:extLst>
           </p:cNvPr>
@@ -5100,7 +5059,7 @@
           <p:cNvPr id="236" name="Connector: Elbow 235">
             <a:extLst>
               <a:ext uri="{FF2B5EF4-FFF2-40B4-BE49-F238E27FC236}">
-                <a16:creationId xmlns:a16="http://schemas.microsoft.com/office/drawing/2014/main" id="{D6C552BD-2578-40DB-92F7-5D37721A4EC1}"/>
+                <a16:creationId xmlns:a16="http://schemas.microsoft.com/office/drawing/2014/main" xmlns="" id="{D6C552BD-2578-40DB-92F7-5D37721A4EC1}"/>
               </a:ext>
             </a:extLst>
           </p:cNvPr>
@@ -5143,7 +5102,7 @@
           <p:cNvPr id="244" name="Rectangle 243">
             <a:extLst>
               <a:ext uri="{FF2B5EF4-FFF2-40B4-BE49-F238E27FC236}">
-                <a16:creationId xmlns:a16="http://schemas.microsoft.com/office/drawing/2014/main" id="{D764B181-4308-49E0-B72F-2156BBACA31C}"/>
+                <a16:creationId xmlns:a16="http://schemas.microsoft.com/office/drawing/2014/main" xmlns="" id="{D764B181-4308-49E0-B72F-2156BBACA31C}"/>
               </a:ext>
             </a:extLst>
           </p:cNvPr>
@@ -5177,7 +5136,7 @@
           <p:cNvPr id="255" name="Rectangle 254">
             <a:extLst>
               <a:ext uri="{FF2B5EF4-FFF2-40B4-BE49-F238E27FC236}">
-                <a16:creationId xmlns:a16="http://schemas.microsoft.com/office/drawing/2014/main" id="{57F8A712-9842-486F-9BA1-C887F3331106}"/>
+                <a16:creationId xmlns:a16="http://schemas.microsoft.com/office/drawing/2014/main" xmlns="" id="{57F8A712-9842-486F-9BA1-C887F3331106}"/>
               </a:ext>
             </a:extLst>
           </p:cNvPr>
@@ -5211,7 +5170,7 @@
           <p:cNvPr id="260" name="Rectangle 259">
             <a:extLst>
               <a:ext uri="{FF2B5EF4-FFF2-40B4-BE49-F238E27FC236}">
-                <a16:creationId xmlns:a16="http://schemas.microsoft.com/office/drawing/2014/main" id="{106622A7-4B93-4F50-8180-5515C868FB27}"/>
+                <a16:creationId xmlns:a16="http://schemas.microsoft.com/office/drawing/2014/main" xmlns="" id="{106622A7-4B93-4F50-8180-5515C868FB27}"/>
               </a:ext>
             </a:extLst>
           </p:cNvPr>
@@ -5245,7 +5204,7 @@
           <p:cNvPr id="265" name="Rectangle 264">
             <a:extLst>
               <a:ext uri="{FF2B5EF4-FFF2-40B4-BE49-F238E27FC236}">
-                <a16:creationId xmlns:a16="http://schemas.microsoft.com/office/drawing/2014/main" id="{9033217E-CE05-4F28-B1EA-AEC38C4E2002}"/>
+                <a16:creationId xmlns:a16="http://schemas.microsoft.com/office/drawing/2014/main" xmlns="" id="{9033217E-CE05-4F28-B1EA-AEC38C4E2002}"/>
               </a:ext>
             </a:extLst>
           </p:cNvPr>
@@ -5279,7 +5238,7 @@
           <p:cNvPr id="289" name="Rectangle 288">
             <a:extLst>
               <a:ext uri="{FF2B5EF4-FFF2-40B4-BE49-F238E27FC236}">
-                <a16:creationId xmlns:a16="http://schemas.microsoft.com/office/drawing/2014/main" id="{D113DC5F-E027-453D-985E-35D3AF54AE9D}"/>
+                <a16:creationId xmlns:a16="http://schemas.microsoft.com/office/drawing/2014/main" xmlns="" id="{D113DC5F-E027-453D-985E-35D3AF54AE9D}"/>
               </a:ext>
             </a:extLst>
           </p:cNvPr>
@@ -5313,7 +5272,7 @@
           <p:cNvPr id="290" name="Rectangle 289">
             <a:extLst>
               <a:ext uri="{FF2B5EF4-FFF2-40B4-BE49-F238E27FC236}">
-                <a16:creationId xmlns:a16="http://schemas.microsoft.com/office/drawing/2014/main" id="{3E354A0E-871C-4957-9B0F-09B977985ADE}"/>
+                <a16:creationId xmlns:a16="http://schemas.microsoft.com/office/drawing/2014/main" xmlns="" id="{3E354A0E-871C-4957-9B0F-09B977985ADE}"/>
               </a:ext>
             </a:extLst>
           </p:cNvPr>
@@ -5347,7 +5306,7 @@
           <p:cNvPr id="293" name="Connector: Elbow 292">
             <a:extLst>
               <a:ext uri="{FF2B5EF4-FFF2-40B4-BE49-F238E27FC236}">
-                <a16:creationId xmlns:a16="http://schemas.microsoft.com/office/drawing/2014/main" id="{CDF0845F-B876-4C58-BD80-37F6B786DAA8}"/>
+                <a16:creationId xmlns:a16="http://schemas.microsoft.com/office/drawing/2014/main" xmlns="" id="{CDF0845F-B876-4C58-BD80-37F6B786DAA8}"/>
               </a:ext>
             </a:extLst>
           </p:cNvPr>
@@ -5390,7 +5349,7 @@
           <p:cNvPr id="299" name="Connector: Elbow 298">
             <a:extLst>
               <a:ext uri="{FF2B5EF4-FFF2-40B4-BE49-F238E27FC236}">
-                <a16:creationId xmlns:a16="http://schemas.microsoft.com/office/drawing/2014/main" id="{0E910DCA-D6A1-48C2-8A02-902D18F906D3}"/>
+                <a16:creationId xmlns:a16="http://schemas.microsoft.com/office/drawing/2014/main" xmlns="" id="{0E910DCA-D6A1-48C2-8A02-902D18F906D3}"/>
               </a:ext>
             </a:extLst>
           </p:cNvPr>
@@ -5433,7 +5392,7 @@
           <p:cNvPr id="304" name="Connector: Elbow 303">
             <a:extLst>
               <a:ext uri="{FF2B5EF4-FFF2-40B4-BE49-F238E27FC236}">
-                <a16:creationId xmlns:a16="http://schemas.microsoft.com/office/drawing/2014/main" id="{4BC85AAA-A068-478F-AFE5-85A28B54BB3C}"/>
+                <a16:creationId xmlns:a16="http://schemas.microsoft.com/office/drawing/2014/main" xmlns="" id="{4BC85AAA-A068-478F-AFE5-85A28B54BB3C}"/>
               </a:ext>
             </a:extLst>
           </p:cNvPr>
@@ -5476,7 +5435,7 @@
           <p:cNvPr id="313" name="Rectangle 312">
             <a:extLst>
               <a:ext uri="{FF2B5EF4-FFF2-40B4-BE49-F238E27FC236}">
-                <a16:creationId xmlns:a16="http://schemas.microsoft.com/office/drawing/2014/main" id="{06600712-19EA-44C2-9896-13286DE0F3CC}"/>
+                <a16:creationId xmlns:a16="http://schemas.microsoft.com/office/drawing/2014/main" xmlns="" id="{06600712-19EA-44C2-9896-13286DE0F3CC}"/>
               </a:ext>
             </a:extLst>
           </p:cNvPr>
@@ -5525,7 +5484,7 @@
           <p:cNvPr id="314" name="Rectangle 313">
             <a:extLst>
               <a:ext uri="{FF2B5EF4-FFF2-40B4-BE49-F238E27FC236}">
-                <a16:creationId xmlns:a16="http://schemas.microsoft.com/office/drawing/2014/main" id="{47063716-A3A1-41ED-9E9F-28C67B24EEDA}"/>
+                <a16:creationId xmlns:a16="http://schemas.microsoft.com/office/drawing/2014/main" xmlns="" id="{47063716-A3A1-41ED-9E9F-28C67B24EEDA}"/>
               </a:ext>
             </a:extLst>
           </p:cNvPr>
@@ -5574,7 +5533,7 @@
           <p:cNvPr id="329" name="Connector: Elbow 328">
             <a:extLst>
               <a:ext uri="{FF2B5EF4-FFF2-40B4-BE49-F238E27FC236}">
-                <a16:creationId xmlns:a16="http://schemas.microsoft.com/office/drawing/2014/main" id="{AEE92165-F7DA-4039-832D-425489B72C61}"/>
+                <a16:creationId xmlns:a16="http://schemas.microsoft.com/office/drawing/2014/main" xmlns="" id="{AEE92165-F7DA-4039-832D-425489B72C61}"/>
               </a:ext>
             </a:extLst>
           </p:cNvPr>
@@ -5616,7 +5575,7 @@
           <p:cNvPr id="331" name="Connector: Elbow 330">
             <a:extLst>
               <a:ext uri="{FF2B5EF4-FFF2-40B4-BE49-F238E27FC236}">
-                <a16:creationId xmlns:a16="http://schemas.microsoft.com/office/drawing/2014/main" id="{0BC0F377-761C-495E-BA76-4148018825EB}"/>
+                <a16:creationId xmlns:a16="http://schemas.microsoft.com/office/drawing/2014/main" xmlns="" id="{0BC0F377-761C-495E-BA76-4148018825EB}"/>
               </a:ext>
             </a:extLst>
           </p:cNvPr>
@@ -5658,7 +5617,7 @@
           <p:cNvPr id="341" name="Connector: Elbow 340">
             <a:extLst>
               <a:ext uri="{FF2B5EF4-FFF2-40B4-BE49-F238E27FC236}">
-                <a16:creationId xmlns:a16="http://schemas.microsoft.com/office/drawing/2014/main" id="{5D6FF7E3-217E-4272-9655-BF66941CDADE}"/>
+                <a16:creationId xmlns:a16="http://schemas.microsoft.com/office/drawing/2014/main" xmlns="" id="{5D6FF7E3-217E-4272-9655-BF66941CDADE}"/>
               </a:ext>
             </a:extLst>
           </p:cNvPr>
@@ -5702,7 +5661,7 @@
           <p:cNvPr id="359" name="Arrow: Circular 358">
             <a:extLst>
               <a:ext uri="{FF2B5EF4-FFF2-40B4-BE49-F238E27FC236}">
-                <a16:creationId xmlns:a16="http://schemas.microsoft.com/office/drawing/2014/main" id="{FF8DD77E-6D52-478C-86E4-770E11517046}"/>
+                <a16:creationId xmlns:a16="http://schemas.microsoft.com/office/drawing/2014/main" xmlns="" id="{FF8DD77E-6D52-478C-86E4-770E11517046}"/>
               </a:ext>
             </a:extLst>
           </p:cNvPr>
@@ -5761,7 +5720,7 @@
           <p:cNvPr id="365" name="Connector: Elbow 364">
             <a:extLst>
               <a:ext uri="{FF2B5EF4-FFF2-40B4-BE49-F238E27FC236}">
-                <a16:creationId xmlns:a16="http://schemas.microsoft.com/office/drawing/2014/main" id="{9663848A-9582-486C-9463-CCF2FC4A2735}"/>
+                <a16:creationId xmlns:a16="http://schemas.microsoft.com/office/drawing/2014/main" xmlns="" id="{9663848A-9582-486C-9463-CCF2FC4A2735}"/>
               </a:ext>
             </a:extLst>
           </p:cNvPr>
@@ -5803,7 +5762,7 @@
           <p:cNvPr id="366" name="Rectangle 365">
             <a:extLst>
               <a:ext uri="{FF2B5EF4-FFF2-40B4-BE49-F238E27FC236}">
-                <a16:creationId xmlns:a16="http://schemas.microsoft.com/office/drawing/2014/main" id="{FCE23F9D-917D-4E63-924F-6A6440149BEB}"/>
+                <a16:creationId xmlns:a16="http://schemas.microsoft.com/office/drawing/2014/main" xmlns="" id="{FCE23F9D-917D-4E63-924F-6A6440149BEB}"/>
               </a:ext>
             </a:extLst>
           </p:cNvPr>
@@ -5837,7 +5796,7 @@
           <p:cNvPr id="374" name="Straight Arrow Connector 373">
             <a:extLst>
               <a:ext uri="{FF2B5EF4-FFF2-40B4-BE49-F238E27FC236}">
-                <a16:creationId xmlns:a16="http://schemas.microsoft.com/office/drawing/2014/main" id="{EB560F91-1AE2-46EC-957E-A8F62EB32619}"/>
+                <a16:creationId xmlns:a16="http://schemas.microsoft.com/office/drawing/2014/main" xmlns="" id="{EB560F91-1AE2-46EC-957E-A8F62EB32619}"/>
               </a:ext>
             </a:extLst>
           </p:cNvPr>
@@ -5878,7 +5837,7 @@
           <p:cNvPr id="375" name="Straight Arrow Connector 374">
             <a:extLst>
               <a:ext uri="{FF2B5EF4-FFF2-40B4-BE49-F238E27FC236}">
-                <a16:creationId xmlns:a16="http://schemas.microsoft.com/office/drawing/2014/main" id="{B95E91B7-F4A6-46EE-AB0C-1DDDE017C6D0}"/>
+                <a16:creationId xmlns:a16="http://schemas.microsoft.com/office/drawing/2014/main" xmlns="" id="{B95E91B7-F4A6-46EE-AB0C-1DDDE017C6D0}"/>
               </a:ext>
             </a:extLst>
           </p:cNvPr>
@@ -5919,7 +5878,7 @@
           <p:cNvPr id="381" name="Rectangle 380">
             <a:extLst>
               <a:ext uri="{FF2B5EF4-FFF2-40B4-BE49-F238E27FC236}">
-                <a16:creationId xmlns:a16="http://schemas.microsoft.com/office/drawing/2014/main" id="{132E7DF4-D814-4B78-92D6-B581EA41D305}"/>
+                <a16:creationId xmlns:a16="http://schemas.microsoft.com/office/drawing/2014/main" xmlns="" id="{132E7DF4-D814-4B78-92D6-B581EA41D305}"/>
               </a:ext>
             </a:extLst>
           </p:cNvPr>
@@ -5994,7 +5953,7 @@
           <p:cNvPr id="385" name="Arrow: Circular 384">
             <a:extLst>
               <a:ext uri="{FF2B5EF4-FFF2-40B4-BE49-F238E27FC236}">
-                <a16:creationId xmlns:a16="http://schemas.microsoft.com/office/drawing/2014/main" id="{1F258BD7-E8FD-480C-A002-C5CE987003FC}"/>
+                <a16:creationId xmlns:a16="http://schemas.microsoft.com/office/drawing/2014/main" xmlns="" id="{1F258BD7-E8FD-480C-A002-C5CE987003FC}"/>
               </a:ext>
             </a:extLst>
           </p:cNvPr>
@@ -6053,7 +6012,7 @@
           <p:cNvPr id="389" name="Connector: Elbow 388">
             <a:extLst>
               <a:ext uri="{FF2B5EF4-FFF2-40B4-BE49-F238E27FC236}">
-                <a16:creationId xmlns:a16="http://schemas.microsoft.com/office/drawing/2014/main" id="{BD84F25E-AD05-4FC8-BBB4-0FF50D4A93D9}"/>
+                <a16:creationId xmlns:a16="http://schemas.microsoft.com/office/drawing/2014/main" xmlns="" id="{BD84F25E-AD05-4FC8-BBB4-0FF50D4A93D9}"/>
               </a:ext>
             </a:extLst>
           </p:cNvPr>
@@ -6096,7 +6055,7 @@
           <p:cNvPr id="395" name="Rectangle 394">
             <a:extLst>
               <a:ext uri="{FF2B5EF4-FFF2-40B4-BE49-F238E27FC236}">
-                <a16:creationId xmlns:a16="http://schemas.microsoft.com/office/drawing/2014/main" id="{91186E38-9086-4160-8A03-527431403D39}"/>
+                <a16:creationId xmlns:a16="http://schemas.microsoft.com/office/drawing/2014/main" xmlns="" id="{91186E38-9086-4160-8A03-527431403D39}"/>
               </a:ext>
             </a:extLst>
           </p:cNvPr>
@@ -6130,7 +6089,7 @@
           <p:cNvPr id="417" name="Rectangle 416">
             <a:extLst>
               <a:ext uri="{FF2B5EF4-FFF2-40B4-BE49-F238E27FC236}">
-                <a16:creationId xmlns:a16="http://schemas.microsoft.com/office/drawing/2014/main" id="{4EC8E588-421E-4E10-9022-26A2BBDD493C}"/>
+                <a16:creationId xmlns:a16="http://schemas.microsoft.com/office/drawing/2014/main" xmlns="" id="{4EC8E588-421E-4E10-9022-26A2BBDD493C}"/>
               </a:ext>
             </a:extLst>
           </p:cNvPr>
@@ -6164,7 +6123,7 @@
           <p:cNvPr id="419" name="Rectangle 418">
             <a:extLst>
               <a:ext uri="{FF2B5EF4-FFF2-40B4-BE49-F238E27FC236}">
-                <a16:creationId xmlns:a16="http://schemas.microsoft.com/office/drawing/2014/main" id="{F82BF4F5-544B-478F-A2AD-6E912527CA93}"/>
+                <a16:creationId xmlns:a16="http://schemas.microsoft.com/office/drawing/2014/main" xmlns="" id="{F82BF4F5-544B-478F-A2AD-6E912527CA93}"/>
               </a:ext>
             </a:extLst>
           </p:cNvPr>
@@ -6198,7 +6157,7 @@
           <p:cNvPr id="421" name="Rectangle 420">
             <a:extLst>
               <a:ext uri="{FF2B5EF4-FFF2-40B4-BE49-F238E27FC236}">
-                <a16:creationId xmlns:a16="http://schemas.microsoft.com/office/drawing/2014/main" id="{7C2366D7-DC9A-4871-96ED-EECD39E4E18F}"/>
+                <a16:creationId xmlns:a16="http://schemas.microsoft.com/office/drawing/2014/main" xmlns="" id="{7C2366D7-DC9A-4871-96ED-EECD39E4E18F}"/>
               </a:ext>
             </a:extLst>
           </p:cNvPr>
@@ -6232,7 +6191,7 @@
           <p:cNvPr id="444" name="Straight Arrow Connector 443">
             <a:extLst>
               <a:ext uri="{FF2B5EF4-FFF2-40B4-BE49-F238E27FC236}">
-                <a16:creationId xmlns:a16="http://schemas.microsoft.com/office/drawing/2014/main" id="{E56FCB02-D7E8-45AF-86C0-E897F709325A}"/>
+                <a16:creationId xmlns:a16="http://schemas.microsoft.com/office/drawing/2014/main" xmlns="" id="{E56FCB02-D7E8-45AF-86C0-E897F709325A}"/>
               </a:ext>
             </a:extLst>
           </p:cNvPr>
@@ -6273,7 +6232,7 @@
           <p:cNvPr id="445" name="Straight Arrow Connector 444">
             <a:extLst>
               <a:ext uri="{FF2B5EF4-FFF2-40B4-BE49-F238E27FC236}">
-                <a16:creationId xmlns:a16="http://schemas.microsoft.com/office/drawing/2014/main" id="{33120E74-F215-4677-B15E-704F2964393B}"/>
+                <a16:creationId xmlns:a16="http://schemas.microsoft.com/office/drawing/2014/main" xmlns="" id="{33120E74-F215-4677-B15E-704F2964393B}"/>
               </a:ext>
             </a:extLst>
           </p:cNvPr>
@@ -6314,7 +6273,7 @@
           <p:cNvPr id="447" name="Rectangle 446">
             <a:extLst>
               <a:ext uri="{FF2B5EF4-FFF2-40B4-BE49-F238E27FC236}">
-                <a16:creationId xmlns:a16="http://schemas.microsoft.com/office/drawing/2014/main" id="{DF56F0A1-83D3-4EFC-98CA-AFB5AEDF1D80}"/>
+                <a16:creationId xmlns:a16="http://schemas.microsoft.com/office/drawing/2014/main" xmlns="" id="{DF56F0A1-83D3-4EFC-98CA-AFB5AEDF1D80}"/>
               </a:ext>
             </a:extLst>
           </p:cNvPr>
@@ -6348,7 +6307,7 @@
           <p:cNvPr id="448" name="Rectangle 447">
             <a:extLst>
               <a:ext uri="{FF2B5EF4-FFF2-40B4-BE49-F238E27FC236}">
-                <a16:creationId xmlns:a16="http://schemas.microsoft.com/office/drawing/2014/main" id="{C5D756F6-B3F3-4996-BC9F-66B524E81DAC}"/>
+                <a16:creationId xmlns:a16="http://schemas.microsoft.com/office/drawing/2014/main" xmlns="" id="{C5D756F6-B3F3-4996-BC9F-66B524E81DAC}"/>
               </a:ext>
             </a:extLst>
           </p:cNvPr>
@@ -6382,7 +6341,7 @@
           <p:cNvPr id="449" name="Rectangle 448">
             <a:extLst>
               <a:ext uri="{FF2B5EF4-FFF2-40B4-BE49-F238E27FC236}">
-                <a16:creationId xmlns:a16="http://schemas.microsoft.com/office/drawing/2014/main" id="{E488CB4E-9BA6-4DE1-A618-09DE5EFD93F9}"/>
+                <a16:creationId xmlns:a16="http://schemas.microsoft.com/office/drawing/2014/main" xmlns="" id="{E488CB4E-9BA6-4DE1-A618-09DE5EFD93F9}"/>
               </a:ext>
             </a:extLst>
           </p:cNvPr>
@@ -6416,7 +6375,7 @@
           <p:cNvPr id="456" name="Connector: Elbow 455">
             <a:extLst>
               <a:ext uri="{FF2B5EF4-FFF2-40B4-BE49-F238E27FC236}">
-                <a16:creationId xmlns:a16="http://schemas.microsoft.com/office/drawing/2014/main" id="{77588B4E-8809-441A-93FF-C1D485ECE5E8}"/>
+                <a16:creationId xmlns:a16="http://schemas.microsoft.com/office/drawing/2014/main" xmlns="" id="{77588B4E-8809-441A-93FF-C1D485ECE5E8}"/>
               </a:ext>
             </a:extLst>
           </p:cNvPr>
@@ -6458,7 +6417,7 @@
           <p:cNvPr id="457" name="Straight Arrow Connector 456">
             <a:extLst>
               <a:ext uri="{FF2B5EF4-FFF2-40B4-BE49-F238E27FC236}">
-                <a16:creationId xmlns:a16="http://schemas.microsoft.com/office/drawing/2014/main" id="{13110589-C8BB-4678-98DB-795F95BBD171}"/>
+                <a16:creationId xmlns:a16="http://schemas.microsoft.com/office/drawing/2014/main" xmlns="" id="{13110589-C8BB-4678-98DB-795F95BBD171}"/>
               </a:ext>
             </a:extLst>
           </p:cNvPr>
@@ -6499,7 +6458,7 @@
           <p:cNvPr id="463" name="Straight Arrow Connector 462">
             <a:extLst>
               <a:ext uri="{FF2B5EF4-FFF2-40B4-BE49-F238E27FC236}">
-                <a16:creationId xmlns:a16="http://schemas.microsoft.com/office/drawing/2014/main" id="{C5C771C5-C60C-4D34-9518-510A66269295}"/>
+                <a16:creationId xmlns:a16="http://schemas.microsoft.com/office/drawing/2014/main" xmlns="" id="{C5C771C5-C60C-4D34-9518-510A66269295}"/>
               </a:ext>
             </a:extLst>
           </p:cNvPr>
@@ -6540,7 +6499,7 @@
           <p:cNvPr id="471" name="Rectangle 470">
             <a:extLst>
               <a:ext uri="{FF2B5EF4-FFF2-40B4-BE49-F238E27FC236}">
-                <a16:creationId xmlns:a16="http://schemas.microsoft.com/office/drawing/2014/main" id="{CCB24D01-4F63-4477-86F6-2A9F4DEE5413}"/>
+                <a16:creationId xmlns:a16="http://schemas.microsoft.com/office/drawing/2014/main" xmlns="" id="{CCB24D01-4F63-4477-86F6-2A9F4DEE5413}"/>
               </a:ext>
             </a:extLst>
           </p:cNvPr>
@@ -6574,7 +6533,7 @@
           <p:cNvPr id="472" name="Straight Arrow Connector 471">
             <a:extLst>
               <a:ext uri="{FF2B5EF4-FFF2-40B4-BE49-F238E27FC236}">
-                <a16:creationId xmlns:a16="http://schemas.microsoft.com/office/drawing/2014/main" id="{0A7482F8-663D-49C6-B72C-29396BAE962A}"/>
+                <a16:creationId xmlns:a16="http://schemas.microsoft.com/office/drawing/2014/main" xmlns="" id="{0A7482F8-663D-49C6-B72C-29396BAE962A}"/>
               </a:ext>
             </a:extLst>
           </p:cNvPr>
@@ -6615,7 +6574,7 @@
           <p:cNvPr id="473" name="Straight Arrow Connector 472">
             <a:extLst>
               <a:ext uri="{FF2B5EF4-FFF2-40B4-BE49-F238E27FC236}">
-                <a16:creationId xmlns:a16="http://schemas.microsoft.com/office/drawing/2014/main" id="{C91B718E-1020-40D8-A8F1-30F1F67E1721}"/>
+                <a16:creationId xmlns:a16="http://schemas.microsoft.com/office/drawing/2014/main" xmlns="" id="{C91B718E-1020-40D8-A8F1-30F1F67E1721}"/>
               </a:ext>
             </a:extLst>
           </p:cNvPr>
@@ -6656,7 +6615,7 @@
           <p:cNvPr id="474" name="Straight Arrow Connector 473">
             <a:extLst>
               <a:ext uri="{FF2B5EF4-FFF2-40B4-BE49-F238E27FC236}">
-                <a16:creationId xmlns:a16="http://schemas.microsoft.com/office/drawing/2014/main" id="{CCE9B018-247E-4FF8-8CEC-DC6DF7DAB711}"/>
+                <a16:creationId xmlns:a16="http://schemas.microsoft.com/office/drawing/2014/main" xmlns="" id="{CCE9B018-247E-4FF8-8CEC-DC6DF7DAB711}"/>
               </a:ext>
             </a:extLst>
           </p:cNvPr>
@@ -6697,7 +6656,7 @@
           <p:cNvPr id="489" name="Rectangle 488">
             <a:extLst>
               <a:ext uri="{FF2B5EF4-FFF2-40B4-BE49-F238E27FC236}">
-                <a16:creationId xmlns:a16="http://schemas.microsoft.com/office/drawing/2014/main" id="{9E560924-673F-4BA7-8FE2-5A73D49A9F9E}"/>
+                <a16:creationId xmlns:a16="http://schemas.microsoft.com/office/drawing/2014/main" xmlns="" id="{9E560924-673F-4BA7-8FE2-5A73D49A9F9E}"/>
               </a:ext>
             </a:extLst>
           </p:cNvPr>
@@ -6731,7 +6690,7 @@
           <p:cNvPr id="490" name="Rectangle 489">
             <a:extLst>
               <a:ext uri="{FF2B5EF4-FFF2-40B4-BE49-F238E27FC236}">
-                <a16:creationId xmlns:a16="http://schemas.microsoft.com/office/drawing/2014/main" id="{D5973B82-8AFA-4234-AFAB-1ED5D4CEEFB9}"/>
+                <a16:creationId xmlns:a16="http://schemas.microsoft.com/office/drawing/2014/main" xmlns="" id="{D5973B82-8AFA-4234-AFAB-1ED5D4CEEFB9}"/>
               </a:ext>
             </a:extLst>
           </p:cNvPr>
@@ -6765,7 +6724,7 @@
           <p:cNvPr id="491" name="Rectangle 490">
             <a:extLst>
               <a:ext uri="{FF2B5EF4-FFF2-40B4-BE49-F238E27FC236}">
-                <a16:creationId xmlns:a16="http://schemas.microsoft.com/office/drawing/2014/main" id="{960B192E-4892-4E62-9162-A03F26D2F144}"/>
+                <a16:creationId xmlns:a16="http://schemas.microsoft.com/office/drawing/2014/main" xmlns="" id="{960B192E-4892-4E62-9162-A03F26D2F144}"/>
               </a:ext>
             </a:extLst>
           </p:cNvPr>
@@ -6799,7 +6758,7 @@
           <p:cNvPr id="493" name="Straight Arrow Connector 492">
             <a:extLst>
               <a:ext uri="{FF2B5EF4-FFF2-40B4-BE49-F238E27FC236}">
-                <a16:creationId xmlns:a16="http://schemas.microsoft.com/office/drawing/2014/main" id="{78F0E7AE-5AC3-4C63-ACFA-A0D9FBD264C6}"/>
+                <a16:creationId xmlns:a16="http://schemas.microsoft.com/office/drawing/2014/main" xmlns="" id="{78F0E7AE-5AC3-4C63-ACFA-A0D9FBD264C6}"/>
               </a:ext>
             </a:extLst>
           </p:cNvPr>
@@ -6840,7 +6799,7 @@
           <p:cNvPr id="494" name="Rectangle 493">
             <a:extLst>
               <a:ext uri="{FF2B5EF4-FFF2-40B4-BE49-F238E27FC236}">
-                <a16:creationId xmlns:a16="http://schemas.microsoft.com/office/drawing/2014/main" id="{EDDF9529-7DCB-4E27-BD8D-2648113059BD}"/>
+                <a16:creationId xmlns:a16="http://schemas.microsoft.com/office/drawing/2014/main" xmlns="" id="{EDDF9529-7DCB-4E27-BD8D-2648113059BD}"/>
               </a:ext>
             </a:extLst>
           </p:cNvPr>
@@ -6874,7 +6833,7 @@
           <p:cNvPr id="495" name="Straight Arrow Connector 494">
             <a:extLst>
               <a:ext uri="{FF2B5EF4-FFF2-40B4-BE49-F238E27FC236}">
-                <a16:creationId xmlns:a16="http://schemas.microsoft.com/office/drawing/2014/main" id="{E62E09D3-EAAB-4091-8717-C05115E14AE3}"/>
+                <a16:creationId xmlns:a16="http://schemas.microsoft.com/office/drawing/2014/main" xmlns="" id="{E62E09D3-EAAB-4091-8717-C05115E14AE3}"/>
               </a:ext>
             </a:extLst>
           </p:cNvPr>
@@ -6915,7 +6874,7 @@
           <p:cNvPr id="496" name="Rectangle 495">
             <a:extLst>
               <a:ext uri="{FF2B5EF4-FFF2-40B4-BE49-F238E27FC236}">
-                <a16:creationId xmlns:a16="http://schemas.microsoft.com/office/drawing/2014/main" id="{84BBE7DC-84F1-4330-BA51-553C3D440D71}"/>
+                <a16:creationId xmlns:a16="http://schemas.microsoft.com/office/drawing/2014/main" xmlns="" id="{84BBE7DC-84F1-4330-BA51-553C3D440D71}"/>
               </a:ext>
             </a:extLst>
           </p:cNvPr>
@@ -6949,7 +6908,7 @@
           <p:cNvPr id="499" name="Arrow: Up 498">
             <a:extLst>
               <a:ext uri="{FF2B5EF4-FFF2-40B4-BE49-F238E27FC236}">
-                <a16:creationId xmlns:a16="http://schemas.microsoft.com/office/drawing/2014/main" id="{75DDA6DD-7656-436A-8956-8A565B1B233A}"/>
+                <a16:creationId xmlns:a16="http://schemas.microsoft.com/office/drawing/2014/main" xmlns="" id="{75DDA6DD-7656-436A-8956-8A565B1B233A}"/>
               </a:ext>
             </a:extLst>
           </p:cNvPr>
@@ -6995,7 +6954,7 @@
           <p:cNvPr id="500" name="Arrow: Up 499">
             <a:extLst>
               <a:ext uri="{FF2B5EF4-FFF2-40B4-BE49-F238E27FC236}">
-                <a16:creationId xmlns:a16="http://schemas.microsoft.com/office/drawing/2014/main" id="{8D76D0A2-6BE8-40F6-8F6D-26DB078B2044}"/>
+                <a16:creationId xmlns:a16="http://schemas.microsoft.com/office/drawing/2014/main" xmlns="" id="{8D76D0A2-6BE8-40F6-8F6D-26DB078B2044}"/>
               </a:ext>
             </a:extLst>
           </p:cNvPr>
@@ -7041,7 +7000,7 @@
           <p:cNvPr id="106" name="Rectangle 105">
             <a:extLst>
               <a:ext uri="{FF2B5EF4-FFF2-40B4-BE49-F238E27FC236}">
-                <a16:creationId xmlns:a16="http://schemas.microsoft.com/office/drawing/2014/main" id="{0C4A19DB-E3B0-466C-93D4-B709E4C255E4}"/>
+                <a16:creationId xmlns:a16="http://schemas.microsoft.com/office/drawing/2014/main" xmlns="" id="{0C4A19DB-E3B0-466C-93D4-B709E4C255E4}"/>
               </a:ext>
             </a:extLst>
           </p:cNvPr>
@@ -7075,7 +7034,7 @@
           <p:cNvPr id="113" name="Rectangle 112">
             <a:extLst>
               <a:ext uri="{FF2B5EF4-FFF2-40B4-BE49-F238E27FC236}">
-                <a16:creationId xmlns:a16="http://schemas.microsoft.com/office/drawing/2014/main" id="{A4BCE37F-12BB-4B41-970D-D867524DD06D}"/>
+                <a16:creationId xmlns:a16="http://schemas.microsoft.com/office/drawing/2014/main" xmlns="" id="{A4BCE37F-12BB-4B41-970D-D867524DD06D}"/>
               </a:ext>
             </a:extLst>
           </p:cNvPr>
@@ -7109,7 +7068,7 @@
           <p:cNvPr id="122" name="Rectangle 121">
             <a:extLst>
               <a:ext uri="{FF2B5EF4-FFF2-40B4-BE49-F238E27FC236}">
-                <a16:creationId xmlns:a16="http://schemas.microsoft.com/office/drawing/2014/main" id="{AAAB0FBD-9944-4D2C-9854-B02DDB31218D}"/>
+                <a16:creationId xmlns:a16="http://schemas.microsoft.com/office/drawing/2014/main" xmlns="" id="{AAAB0FBD-9944-4D2C-9854-B02DDB31218D}"/>
               </a:ext>
             </a:extLst>
           </p:cNvPr>
@@ -7143,7 +7102,7 @@
           <p:cNvPr id="136" name="Rectangle 135">
             <a:extLst>
               <a:ext uri="{FF2B5EF4-FFF2-40B4-BE49-F238E27FC236}">
-                <a16:creationId xmlns:a16="http://schemas.microsoft.com/office/drawing/2014/main" id="{55F6F84D-8A59-40AA-8EA2-6A029D8477A5}"/>
+                <a16:creationId xmlns:a16="http://schemas.microsoft.com/office/drawing/2014/main" xmlns="" id="{55F6F84D-8A59-40AA-8EA2-6A029D8477A5}"/>
               </a:ext>
             </a:extLst>
           </p:cNvPr>
@@ -7177,7 +7136,7 @@
           <p:cNvPr id="152" name="Rectangle 151">
             <a:extLst>
               <a:ext uri="{FF2B5EF4-FFF2-40B4-BE49-F238E27FC236}">
-                <a16:creationId xmlns:a16="http://schemas.microsoft.com/office/drawing/2014/main" id="{AB0A7C87-6361-4BFC-9496-A68943EE8D54}"/>
+                <a16:creationId xmlns:a16="http://schemas.microsoft.com/office/drawing/2014/main" xmlns="" id="{AB0A7C87-6361-4BFC-9496-A68943EE8D54}"/>
               </a:ext>
             </a:extLst>
           </p:cNvPr>
@@ -7211,7 +7170,7 @@
           <p:cNvPr id="169" name="Rectangle 168">
             <a:extLst>
               <a:ext uri="{FF2B5EF4-FFF2-40B4-BE49-F238E27FC236}">
-                <a16:creationId xmlns:a16="http://schemas.microsoft.com/office/drawing/2014/main" id="{0A0A3CC5-5A85-4723-9EBA-EFC0A4A54D91}"/>
+                <a16:creationId xmlns:a16="http://schemas.microsoft.com/office/drawing/2014/main" xmlns="" id="{0A0A3CC5-5A85-4723-9EBA-EFC0A4A54D91}"/>
               </a:ext>
             </a:extLst>
           </p:cNvPr>
@@ -7245,7 +7204,7 @@
           <p:cNvPr id="175" name="Rectangle 174">
             <a:extLst>
               <a:ext uri="{FF2B5EF4-FFF2-40B4-BE49-F238E27FC236}">
-                <a16:creationId xmlns:a16="http://schemas.microsoft.com/office/drawing/2014/main" id="{ED3646EF-5C2B-43FF-9D3F-300137501DBD}"/>
+                <a16:creationId xmlns:a16="http://schemas.microsoft.com/office/drawing/2014/main" xmlns="" id="{ED3646EF-5C2B-43FF-9D3F-300137501DBD}"/>
               </a:ext>
             </a:extLst>
           </p:cNvPr>
@@ -7279,7 +7238,7 @@
           <p:cNvPr id="184" name="Rectangle 183">
             <a:extLst>
               <a:ext uri="{FF2B5EF4-FFF2-40B4-BE49-F238E27FC236}">
-                <a16:creationId xmlns:a16="http://schemas.microsoft.com/office/drawing/2014/main" id="{497DFB64-AB0D-4D42-B47F-EE1DBBDA68A5}"/>
+                <a16:creationId xmlns:a16="http://schemas.microsoft.com/office/drawing/2014/main" xmlns="" id="{497DFB64-AB0D-4D42-B47F-EE1DBBDA68A5}"/>
               </a:ext>
             </a:extLst>
           </p:cNvPr>
@@ -7313,7 +7272,7 @@
           <p:cNvPr id="200" name="Rectangle 199">
             <a:extLst>
               <a:ext uri="{FF2B5EF4-FFF2-40B4-BE49-F238E27FC236}">
-                <a16:creationId xmlns:a16="http://schemas.microsoft.com/office/drawing/2014/main" id="{0AADE552-296D-4595-9AE8-14DFC031726E}"/>
+                <a16:creationId xmlns:a16="http://schemas.microsoft.com/office/drawing/2014/main" xmlns="" id="{0AADE552-296D-4595-9AE8-14DFC031726E}"/>
               </a:ext>
             </a:extLst>
           </p:cNvPr>
@@ -7347,7 +7306,7 @@
           <p:cNvPr id="205" name="Rectangle 204">
             <a:extLst>
               <a:ext uri="{FF2B5EF4-FFF2-40B4-BE49-F238E27FC236}">
-                <a16:creationId xmlns:a16="http://schemas.microsoft.com/office/drawing/2014/main" id="{443F9AC9-D240-408C-8D2B-79A9AF4D4994}"/>
+                <a16:creationId xmlns:a16="http://schemas.microsoft.com/office/drawing/2014/main" xmlns="" id="{443F9AC9-D240-408C-8D2B-79A9AF4D4994}"/>
               </a:ext>
             </a:extLst>
           </p:cNvPr>
@@ -7381,7 +7340,7 @@
           <p:cNvPr id="206" name="Rectangle 205">
             <a:extLst>
               <a:ext uri="{FF2B5EF4-FFF2-40B4-BE49-F238E27FC236}">
-                <a16:creationId xmlns:a16="http://schemas.microsoft.com/office/drawing/2014/main" id="{7A010CE0-84B5-44C4-940E-19EDC759C667}"/>
+                <a16:creationId xmlns:a16="http://schemas.microsoft.com/office/drawing/2014/main" xmlns="" id="{7A010CE0-84B5-44C4-940E-19EDC759C667}"/>
               </a:ext>
             </a:extLst>
           </p:cNvPr>
@@ -7415,7 +7374,7 @@
           <p:cNvPr id="210" name="Rectangle 209">
             <a:extLst>
               <a:ext uri="{FF2B5EF4-FFF2-40B4-BE49-F238E27FC236}">
-                <a16:creationId xmlns:a16="http://schemas.microsoft.com/office/drawing/2014/main" id="{960ECC1F-1603-45FA-850A-2264E9DD3A2D}"/>
+                <a16:creationId xmlns:a16="http://schemas.microsoft.com/office/drawing/2014/main" xmlns="" id="{960ECC1F-1603-45FA-850A-2264E9DD3A2D}"/>
               </a:ext>
             </a:extLst>
           </p:cNvPr>
@@ -7454,7 +7413,7 @@
           <p:cNvPr id="222" name="Rectangle 221">
             <a:extLst>
               <a:ext uri="{FF2B5EF4-FFF2-40B4-BE49-F238E27FC236}">
-                <a16:creationId xmlns:a16="http://schemas.microsoft.com/office/drawing/2014/main" id="{22D5ED1C-1A3D-4680-93D2-0AC0E803B936}"/>
+                <a16:creationId xmlns:a16="http://schemas.microsoft.com/office/drawing/2014/main" xmlns="" id="{22D5ED1C-1A3D-4680-93D2-0AC0E803B936}"/>
               </a:ext>
             </a:extLst>
           </p:cNvPr>
@@ -7503,7 +7462,7 @@
           <p:cNvPr id="223" name="Rectangle 222">
             <a:extLst>
               <a:ext uri="{FF2B5EF4-FFF2-40B4-BE49-F238E27FC236}">
-                <a16:creationId xmlns:a16="http://schemas.microsoft.com/office/drawing/2014/main" id="{30B894DF-DCBB-41F6-B1A8-E54CFE25689B}"/>
+                <a16:creationId xmlns:a16="http://schemas.microsoft.com/office/drawing/2014/main" xmlns="" id="{30B894DF-DCBB-41F6-B1A8-E54CFE25689B}"/>
               </a:ext>
             </a:extLst>
           </p:cNvPr>
@@ -7537,7 +7496,7 @@
           <p:cNvPr id="224" name="Rectangle 223">
             <a:extLst>
               <a:ext uri="{FF2B5EF4-FFF2-40B4-BE49-F238E27FC236}">
-                <a16:creationId xmlns:a16="http://schemas.microsoft.com/office/drawing/2014/main" id="{4D261CC7-C687-447A-BB07-28FC88F2997B}"/>
+                <a16:creationId xmlns:a16="http://schemas.microsoft.com/office/drawing/2014/main" xmlns="" id="{4D261CC7-C687-447A-BB07-28FC88F2997B}"/>
               </a:ext>
             </a:extLst>
           </p:cNvPr>
@@ -7571,7 +7530,7 @@
           <p:cNvPr id="33" name="Connector: Elbow 32">
             <a:extLst>
               <a:ext uri="{FF2B5EF4-FFF2-40B4-BE49-F238E27FC236}">
-                <a16:creationId xmlns:a16="http://schemas.microsoft.com/office/drawing/2014/main" id="{2E2CE065-FA81-4981-9105-8B2E88DCB2E6}"/>
+                <a16:creationId xmlns:a16="http://schemas.microsoft.com/office/drawing/2014/main" xmlns="" id="{2E2CE065-FA81-4981-9105-8B2E88DCB2E6}"/>
               </a:ext>
             </a:extLst>
           </p:cNvPr>
@@ -7614,7 +7573,7 @@
           <p:cNvPr id="48" name="Connector: Elbow 47">
             <a:extLst>
               <a:ext uri="{FF2B5EF4-FFF2-40B4-BE49-F238E27FC236}">
-                <a16:creationId xmlns:a16="http://schemas.microsoft.com/office/drawing/2014/main" id="{1E6D199A-B002-46BA-9CF7-9FE8B3175991}"/>
+                <a16:creationId xmlns:a16="http://schemas.microsoft.com/office/drawing/2014/main" xmlns="" id="{1E6D199A-B002-46BA-9CF7-9FE8B3175991}"/>
               </a:ext>
             </a:extLst>
           </p:cNvPr>
@@ -7657,7 +7616,7 @@
           <p:cNvPr id="2" name="Rectangle 1">
             <a:extLst>
               <a:ext uri="{FF2B5EF4-FFF2-40B4-BE49-F238E27FC236}">
-                <a16:creationId xmlns:a16="http://schemas.microsoft.com/office/drawing/2014/main" id="{7648AAB0-E088-4424-8322-6452468A8A15}"/>
+                <a16:creationId xmlns:a16="http://schemas.microsoft.com/office/drawing/2014/main" xmlns="" id="{7648AAB0-E088-4424-8322-6452468A8A15}"/>
               </a:ext>
             </a:extLst>
           </p:cNvPr>
@@ -7781,7 +7740,7 @@
           <p:cNvPr id="6" name="Rectangle 5">
             <a:extLst>
               <a:ext uri="{FF2B5EF4-FFF2-40B4-BE49-F238E27FC236}">
-                <a16:creationId xmlns:a16="http://schemas.microsoft.com/office/drawing/2014/main" id="{793DA067-D425-4A50-994D-52DB5946AA31}"/>
+                <a16:creationId xmlns:a16="http://schemas.microsoft.com/office/drawing/2014/main" xmlns="" id="{793DA067-D425-4A50-994D-52DB5946AA31}"/>
               </a:ext>
             </a:extLst>
           </p:cNvPr>
@@ -7827,7 +7786,7 @@
           <p:cNvPr id="11" name="Straight Arrow Connector 10">
             <a:extLst>
               <a:ext uri="{FF2B5EF4-FFF2-40B4-BE49-F238E27FC236}">
-                <a16:creationId xmlns:a16="http://schemas.microsoft.com/office/drawing/2014/main" id="{B49C447E-40C5-4277-97AA-0F90928B944B}"/>
+                <a16:creationId xmlns:a16="http://schemas.microsoft.com/office/drawing/2014/main" xmlns="" id="{B49C447E-40C5-4277-97AA-0F90928B944B}"/>
               </a:ext>
             </a:extLst>
           </p:cNvPr>
@@ -7868,7 +7827,7 @@
           <p:cNvPr id="13" name="Straight Arrow Connector 12">
             <a:extLst>
               <a:ext uri="{FF2B5EF4-FFF2-40B4-BE49-F238E27FC236}">
-                <a16:creationId xmlns:a16="http://schemas.microsoft.com/office/drawing/2014/main" id="{448DAE49-E511-4537-A323-C90244093A40}"/>
+                <a16:creationId xmlns:a16="http://schemas.microsoft.com/office/drawing/2014/main" xmlns="" id="{448DAE49-E511-4537-A323-C90244093A40}"/>
               </a:ext>
             </a:extLst>
           </p:cNvPr>
@@ -7909,7 +7868,7 @@
           <p:cNvPr id="83" name="Rectangle 82">
             <a:extLst>
               <a:ext uri="{FF2B5EF4-FFF2-40B4-BE49-F238E27FC236}">
-                <a16:creationId xmlns:a16="http://schemas.microsoft.com/office/drawing/2014/main" id="{317EBCBD-DE01-4C15-82F8-9BC7ABFD863D}"/>
+                <a16:creationId xmlns:a16="http://schemas.microsoft.com/office/drawing/2014/main" xmlns="" id="{317EBCBD-DE01-4C15-82F8-9BC7ABFD863D}"/>
               </a:ext>
             </a:extLst>
           </p:cNvPr>
@@ -7958,7 +7917,7 @@
           <p:cNvPr id="189" name="Rectangle 188">
             <a:extLst>
               <a:ext uri="{FF2B5EF4-FFF2-40B4-BE49-F238E27FC236}">
-                <a16:creationId xmlns:a16="http://schemas.microsoft.com/office/drawing/2014/main" id="{21A59925-5D4B-49CE-8465-B46F2D1DD98F}"/>
+                <a16:creationId xmlns:a16="http://schemas.microsoft.com/office/drawing/2014/main" xmlns="" id="{21A59925-5D4B-49CE-8465-B46F2D1DD98F}"/>
               </a:ext>
             </a:extLst>
           </p:cNvPr>
@@ -7992,7 +7951,7 @@
           <p:cNvPr id="196" name="Rectangle 195">
             <a:extLst>
               <a:ext uri="{FF2B5EF4-FFF2-40B4-BE49-F238E27FC236}">
-                <a16:creationId xmlns:a16="http://schemas.microsoft.com/office/drawing/2014/main" id="{D6B0DE49-58D5-468C-B22C-9A456DA8C3B5}"/>
+                <a16:creationId xmlns:a16="http://schemas.microsoft.com/office/drawing/2014/main" xmlns="" id="{D6B0DE49-58D5-468C-B22C-9A456DA8C3B5}"/>
               </a:ext>
             </a:extLst>
           </p:cNvPr>
@@ -8026,7 +7985,7 @@
           <p:cNvPr id="473" name="Straight Arrow Connector 472">
             <a:extLst>
               <a:ext uri="{FF2B5EF4-FFF2-40B4-BE49-F238E27FC236}">
-                <a16:creationId xmlns:a16="http://schemas.microsoft.com/office/drawing/2014/main" id="{C91B718E-1020-40D8-A8F1-30F1F67E1721}"/>
+                <a16:creationId xmlns:a16="http://schemas.microsoft.com/office/drawing/2014/main" xmlns="" id="{C91B718E-1020-40D8-A8F1-30F1F67E1721}"/>
               </a:ext>
             </a:extLst>
           </p:cNvPr>
@@ -8067,7 +8026,7 @@
           <p:cNvPr id="474" name="Straight Arrow Connector 473">
             <a:extLst>
               <a:ext uri="{FF2B5EF4-FFF2-40B4-BE49-F238E27FC236}">
-                <a16:creationId xmlns:a16="http://schemas.microsoft.com/office/drawing/2014/main" id="{CCE9B018-247E-4FF8-8CEC-DC6DF7DAB711}"/>
+                <a16:creationId xmlns:a16="http://schemas.microsoft.com/office/drawing/2014/main" xmlns="" id="{CCE9B018-247E-4FF8-8CEC-DC6DF7DAB711}"/>
               </a:ext>
             </a:extLst>
           </p:cNvPr>
@@ -8108,7 +8067,7 @@
           <p:cNvPr id="489" name="Rectangle 488">
             <a:extLst>
               <a:ext uri="{FF2B5EF4-FFF2-40B4-BE49-F238E27FC236}">
-                <a16:creationId xmlns:a16="http://schemas.microsoft.com/office/drawing/2014/main" id="{9E560924-673F-4BA7-8FE2-5A73D49A9F9E}"/>
+                <a16:creationId xmlns:a16="http://schemas.microsoft.com/office/drawing/2014/main" xmlns="" id="{9E560924-673F-4BA7-8FE2-5A73D49A9F9E}"/>
               </a:ext>
             </a:extLst>
           </p:cNvPr>
@@ -8142,7 +8101,7 @@
           <p:cNvPr id="490" name="Rectangle 489">
             <a:extLst>
               <a:ext uri="{FF2B5EF4-FFF2-40B4-BE49-F238E27FC236}">
-                <a16:creationId xmlns:a16="http://schemas.microsoft.com/office/drawing/2014/main" id="{D5973B82-8AFA-4234-AFAB-1ED5D4CEEFB9}"/>
+                <a16:creationId xmlns:a16="http://schemas.microsoft.com/office/drawing/2014/main" xmlns="" id="{D5973B82-8AFA-4234-AFAB-1ED5D4CEEFB9}"/>
               </a:ext>
             </a:extLst>
           </p:cNvPr>
@@ -8176,7 +8135,7 @@
           <p:cNvPr id="491" name="Rectangle 490">
             <a:extLst>
               <a:ext uri="{FF2B5EF4-FFF2-40B4-BE49-F238E27FC236}">
-                <a16:creationId xmlns:a16="http://schemas.microsoft.com/office/drawing/2014/main" id="{960B192E-4892-4E62-9162-A03F26D2F144}"/>
+                <a16:creationId xmlns:a16="http://schemas.microsoft.com/office/drawing/2014/main" xmlns="" id="{960B192E-4892-4E62-9162-A03F26D2F144}"/>
               </a:ext>
             </a:extLst>
           </p:cNvPr>
@@ -8210,7 +8169,7 @@
           <p:cNvPr id="109" name="Straight Arrow Connector 108">
             <a:extLst>
               <a:ext uri="{FF2B5EF4-FFF2-40B4-BE49-F238E27FC236}">
-                <a16:creationId xmlns:a16="http://schemas.microsoft.com/office/drawing/2014/main" id="{9421061F-3DD6-459D-8BDD-6269A0348038}"/>
+                <a16:creationId xmlns:a16="http://schemas.microsoft.com/office/drawing/2014/main" xmlns="" id="{9421061F-3DD6-459D-8BDD-6269A0348038}"/>
               </a:ext>
             </a:extLst>
           </p:cNvPr>
@@ -8252,7 +8211,7 @@
           <p:cNvPr id="113" name="Rectangle 112">
             <a:extLst>
               <a:ext uri="{FF2B5EF4-FFF2-40B4-BE49-F238E27FC236}">
-                <a16:creationId xmlns:a16="http://schemas.microsoft.com/office/drawing/2014/main" id="{E2671C83-AD96-4835-B5FC-0945555727C3}"/>
+                <a16:creationId xmlns:a16="http://schemas.microsoft.com/office/drawing/2014/main" xmlns="" id="{E2671C83-AD96-4835-B5FC-0945555727C3}"/>
               </a:ext>
             </a:extLst>
           </p:cNvPr>
@@ -8301,7 +8260,7 @@
           <p:cNvPr id="118" name="Rectangle 117">
             <a:extLst>
               <a:ext uri="{FF2B5EF4-FFF2-40B4-BE49-F238E27FC236}">
-                <a16:creationId xmlns:a16="http://schemas.microsoft.com/office/drawing/2014/main" id="{9C8A4265-C203-42C6-BEE3-591409956EB8}"/>
+                <a16:creationId xmlns:a16="http://schemas.microsoft.com/office/drawing/2014/main" xmlns="" id="{9C8A4265-C203-42C6-BEE3-591409956EB8}"/>
               </a:ext>
             </a:extLst>
           </p:cNvPr>
@@ -8335,7 +8294,7 @@
           <p:cNvPr id="119" name="Rectangle 118">
             <a:extLst>
               <a:ext uri="{FF2B5EF4-FFF2-40B4-BE49-F238E27FC236}">
-                <a16:creationId xmlns:a16="http://schemas.microsoft.com/office/drawing/2014/main" id="{234305EB-C127-4BAD-A029-C6CC4EEE3F75}"/>
+                <a16:creationId xmlns:a16="http://schemas.microsoft.com/office/drawing/2014/main" xmlns="" id="{234305EB-C127-4BAD-A029-C6CC4EEE3F75}"/>
               </a:ext>
             </a:extLst>
           </p:cNvPr>
@@ -8369,7 +8328,7 @@
           <p:cNvPr id="134" name="Straight Arrow Connector 133">
             <a:extLst>
               <a:ext uri="{FF2B5EF4-FFF2-40B4-BE49-F238E27FC236}">
-                <a16:creationId xmlns:a16="http://schemas.microsoft.com/office/drawing/2014/main" id="{989AF34C-0854-4E08-8557-441F5F51E960}"/>
+                <a16:creationId xmlns:a16="http://schemas.microsoft.com/office/drawing/2014/main" xmlns="" id="{989AF34C-0854-4E08-8557-441F5F51E960}"/>
               </a:ext>
             </a:extLst>
           </p:cNvPr>
@@ -8412,7 +8371,7 @@
           <p:cNvPr id="145" name="Rectangle 144">
             <a:extLst>
               <a:ext uri="{FF2B5EF4-FFF2-40B4-BE49-F238E27FC236}">
-                <a16:creationId xmlns:a16="http://schemas.microsoft.com/office/drawing/2014/main" id="{DB338DE7-A646-4FA8-AA05-F9AE5B2C256C}"/>
+                <a16:creationId xmlns:a16="http://schemas.microsoft.com/office/drawing/2014/main" xmlns="" id="{DB338DE7-A646-4FA8-AA05-F9AE5B2C256C}"/>
               </a:ext>
             </a:extLst>
           </p:cNvPr>
@@ -8446,7 +8405,7 @@
           <p:cNvPr id="146" name="Straight Arrow Connector 145">
             <a:extLst>
               <a:ext uri="{FF2B5EF4-FFF2-40B4-BE49-F238E27FC236}">
-                <a16:creationId xmlns:a16="http://schemas.microsoft.com/office/drawing/2014/main" id="{4D2B8F19-642D-486D-8A59-032AA91E016A}"/>
+                <a16:creationId xmlns:a16="http://schemas.microsoft.com/office/drawing/2014/main" xmlns="" id="{4D2B8F19-642D-486D-8A59-032AA91E016A}"/>
               </a:ext>
             </a:extLst>
           </p:cNvPr>
@@ -8487,7 +8446,7 @@
           <p:cNvPr id="147" name="Rectangle 146">
             <a:extLst>
               <a:ext uri="{FF2B5EF4-FFF2-40B4-BE49-F238E27FC236}">
-                <a16:creationId xmlns:a16="http://schemas.microsoft.com/office/drawing/2014/main" id="{0FF90299-0ED7-4E43-BCE0-98A9909ABC6F}"/>
+                <a16:creationId xmlns:a16="http://schemas.microsoft.com/office/drawing/2014/main" xmlns="" id="{0FF90299-0ED7-4E43-BCE0-98A9909ABC6F}"/>
               </a:ext>
             </a:extLst>
           </p:cNvPr>
@@ -8521,7 +8480,7 @@
           <p:cNvPr id="148" name="Straight Arrow Connector 147">
             <a:extLst>
               <a:ext uri="{FF2B5EF4-FFF2-40B4-BE49-F238E27FC236}">
-                <a16:creationId xmlns:a16="http://schemas.microsoft.com/office/drawing/2014/main" id="{B235F928-BA83-464A-888C-F18A55064B6E}"/>
+                <a16:creationId xmlns:a16="http://schemas.microsoft.com/office/drawing/2014/main" xmlns="" id="{B235F928-BA83-464A-888C-F18A55064B6E}"/>
               </a:ext>
             </a:extLst>
           </p:cNvPr>
@@ -8562,7 +8521,7 @@
           <p:cNvPr id="149" name="Rectangle 148">
             <a:extLst>
               <a:ext uri="{FF2B5EF4-FFF2-40B4-BE49-F238E27FC236}">
-                <a16:creationId xmlns:a16="http://schemas.microsoft.com/office/drawing/2014/main" id="{9B2169FD-73B5-4B54-B10F-04FA05D4FD8B}"/>
+                <a16:creationId xmlns:a16="http://schemas.microsoft.com/office/drawing/2014/main" xmlns="" id="{9B2169FD-73B5-4B54-B10F-04FA05D4FD8B}"/>
               </a:ext>
             </a:extLst>
           </p:cNvPr>
@@ -8611,7 +8570,7 @@
           <p:cNvPr id="150" name="Rectangle 149">
             <a:extLst>
               <a:ext uri="{FF2B5EF4-FFF2-40B4-BE49-F238E27FC236}">
-                <a16:creationId xmlns:a16="http://schemas.microsoft.com/office/drawing/2014/main" id="{9876AABE-AB9D-4137-A897-A4602B731D43}"/>
+                <a16:creationId xmlns:a16="http://schemas.microsoft.com/office/drawing/2014/main" xmlns="" id="{9876AABE-AB9D-4137-A897-A4602B731D43}"/>
               </a:ext>
             </a:extLst>
           </p:cNvPr>
@@ -8660,7 +8619,7 @@
           <p:cNvPr id="153" name="Rectangle 152">
             <a:extLst>
               <a:ext uri="{FF2B5EF4-FFF2-40B4-BE49-F238E27FC236}">
-                <a16:creationId xmlns:a16="http://schemas.microsoft.com/office/drawing/2014/main" id="{E286E484-271B-4333-BD28-7A943135AF65}"/>
+                <a16:creationId xmlns:a16="http://schemas.microsoft.com/office/drawing/2014/main" xmlns="" id="{E286E484-271B-4333-BD28-7A943135AF65}"/>
               </a:ext>
             </a:extLst>
           </p:cNvPr>
@@ -8709,7 +8668,7 @@
           <p:cNvPr id="167" name="Straight Arrow Connector 166">
             <a:extLst>
               <a:ext uri="{FF2B5EF4-FFF2-40B4-BE49-F238E27FC236}">
-                <a16:creationId xmlns:a16="http://schemas.microsoft.com/office/drawing/2014/main" id="{9BBCA4D2-7C41-4A99-B33D-3F490299227D}"/>
+                <a16:creationId xmlns:a16="http://schemas.microsoft.com/office/drawing/2014/main" xmlns="" id="{9BBCA4D2-7C41-4A99-B33D-3F490299227D}"/>
               </a:ext>
             </a:extLst>
           </p:cNvPr>
@@ -8752,7 +8711,7 @@
           <p:cNvPr id="168" name="Straight Arrow Connector 167">
             <a:extLst>
               <a:ext uri="{FF2B5EF4-FFF2-40B4-BE49-F238E27FC236}">
-                <a16:creationId xmlns:a16="http://schemas.microsoft.com/office/drawing/2014/main" id="{A0514AD2-8294-4C50-8138-0C3FB0341DEF}"/>
+                <a16:creationId xmlns:a16="http://schemas.microsoft.com/office/drawing/2014/main" xmlns="" id="{A0514AD2-8294-4C50-8138-0C3FB0341DEF}"/>
               </a:ext>
             </a:extLst>
           </p:cNvPr>
@@ -8795,7 +8754,7 @@
           <p:cNvPr id="182" name="Rectangle 181">
             <a:extLst>
               <a:ext uri="{FF2B5EF4-FFF2-40B4-BE49-F238E27FC236}">
-                <a16:creationId xmlns:a16="http://schemas.microsoft.com/office/drawing/2014/main" id="{D010CD2E-D89B-41D0-AE2D-B5027711FB0A}"/>
+                <a16:creationId xmlns:a16="http://schemas.microsoft.com/office/drawing/2014/main" xmlns="" id="{D010CD2E-D89B-41D0-AE2D-B5027711FB0A}"/>
               </a:ext>
             </a:extLst>
           </p:cNvPr>
@@ -8844,7 +8803,7 @@
           <p:cNvPr id="183" name="Rectangle 182">
             <a:extLst>
               <a:ext uri="{FF2B5EF4-FFF2-40B4-BE49-F238E27FC236}">
-                <a16:creationId xmlns:a16="http://schemas.microsoft.com/office/drawing/2014/main" id="{CD3BAC67-5F02-4D95-B1C8-55AA974759DF}"/>
+                <a16:creationId xmlns:a16="http://schemas.microsoft.com/office/drawing/2014/main" xmlns="" id="{CD3BAC67-5F02-4D95-B1C8-55AA974759DF}"/>
               </a:ext>
             </a:extLst>
           </p:cNvPr>
@@ -8893,7 +8852,7 @@
           <p:cNvPr id="184" name="Rectangle 183">
             <a:extLst>
               <a:ext uri="{FF2B5EF4-FFF2-40B4-BE49-F238E27FC236}">
-                <a16:creationId xmlns:a16="http://schemas.microsoft.com/office/drawing/2014/main" id="{4EFD5E2D-283C-4E9B-8F1D-C26B2F3BA019}"/>
+                <a16:creationId xmlns:a16="http://schemas.microsoft.com/office/drawing/2014/main" xmlns="" id="{4EFD5E2D-283C-4E9B-8F1D-C26B2F3BA019}"/>
               </a:ext>
             </a:extLst>
           </p:cNvPr>
@@ -8942,7 +8901,7 @@
           <p:cNvPr id="188" name="Straight Arrow Connector 187">
             <a:extLst>
               <a:ext uri="{FF2B5EF4-FFF2-40B4-BE49-F238E27FC236}">
-                <a16:creationId xmlns:a16="http://schemas.microsoft.com/office/drawing/2014/main" id="{2E082458-D070-4371-BDF9-62E958F0426F}"/>
+                <a16:creationId xmlns:a16="http://schemas.microsoft.com/office/drawing/2014/main" xmlns="" id="{2E082458-D070-4371-BDF9-62E958F0426F}"/>
               </a:ext>
             </a:extLst>
           </p:cNvPr>
@@ -8984,7 +8943,7 @@
           <p:cNvPr id="190" name="Straight Arrow Connector 189">
             <a:extLst>
               <a:ext uri="{FF2B5EF4-FFF2-40B4-BE49-F238E27FC236}">
-                <a16:creationId xmlns:a16="http://schemas.microsoft.com/office/drawing/2014/main" id="{6B9A0DC5-36F0-4664-B8E5-40FC16B14FA3}"/>
+                <a16:creationId xmlns:a16="http://schemas.microsoft.com/office/drawing/2014/main" xmlns="" id="{6B9A0DC5-36F0-4664-B8E5-40FC16B14FA3}"/>
               </a:ext>
             </a:extLst>
           </p:cNvPr>
@@ -9026,7 +8985,7 @@
           <p:cNvPr id="193" name="Straight Arrow Connector 192">
             <a:extLst>
               <a:ext uri="{FF2B5EF4-FFF2-40B4-BE49-F238E27FC236}">
-                <a16:creationId xmlns:a16="http://schemas.microsoft.com/office/drawing/2014/main" id="{70CA229D-7FCF-4F9A-88DF-84E9780CB9E7}"/>
+                <a16:creationId xmlns:a16="http://schemas.microsoft.com/office/drawing/2014/main" xmlns="" id="{70CA229D-7FCF-4F9A-88DF-84E9780CB9E7}"/>
               </a:ext>
             </a:extLst>
           </p:cNvPr>
@@ -9068,7 +9027,7 @@
           <p:cNvPr id="195" name="Straight Arrow Connector 194">
             <a:extLst>
               <a:ext uri="{FF2B5EF4-FFF2-40B4-BE49-F238E27FC236}">
-                <a16:creationId xmlns:a16="http://schemas.microsoft.com/office/drawing/2014/main" id="{D768B075-2108-4483-B831-4C02CC34A73B}"/>
+                <a16:creationId xmlns:a16="http://schemas.microsoft.com/office/drawing/2014/main" xmlns="" id="{D768B075-2108-4483-B831-4C02CC34A73B}"/>
               </a:ext>
             </a:extLst>
           </p:cNvPr>
@@ -9110,7 +9069,7 @@
           <p:cNvPr id="198" name="Rectangle 197">
             <a:extLst>
               <a:ext uri="{FF2B5EF4-FFF2-40B4-BE49-F238E27FC236}">
-                <a16:creationId xmlns:a16="http://schemas.microsoft.com/office/drawing/2014/main" id="{D03CE2DF-78C2-4241-A947-BA79C5420183}"/>
+                <a16:creationId xmlns:a16="http://schemas.microsoft.com/office/drawing/2014/main" xmlns="" id="{D03CE2DF-78C2-4241-A947-BA79C5420183}"/>
               </a:ext>
             </a:extLst>
           </p:cNvPr>
@@ -9156,7 +9115,7 @@
           <p:cNvPr id="199" name="Straight Arrow Connector 198">
             <a:extLst>
               <a:ext uri="{FF2B5EF4-FFF2-40B4-BE49-F238E27FC236}">
-                <a16:creationId xmlns:a16="http://schemas.microsoft.com/office/drawing/2014/main" id="{7B294C7A-0F06-4D89-8293-A90C61AD00D0}"/>
+                <a16:creationId xmlns:a16="http://schemas.microsoft.com/office/drawing/2014/main" xmlns="" id="{7B294C7A-0F06-4D89-8293-A90C61AD00D0}"/>
               </a:ext>
             </a:extLst>
           </p:cNvPr>
@@ -9198,7 +9157,7 @@
           <p:cNvPr id="200" name="Straight Arrow Connector 199">
             <a:extLst>
               <a:ext uri="{FF2B5EF4-FFF2-40B4-BE49-F238E27FC236}">
-                <a16:creationId xmlns:a16="http://schemas.microsoft.com/office/drawing/2014/main" id="{7558A12B-4E14-477A-8DDE-8619D0E81168}"/>
+                <a16:creationId xmlns:a16="http://schemas.microsoft.com/office/drawing/2014/main" xmlns="" id="{7558A12B-4E14-477A-8DDE-8619D0E81168}"/>
               </a:ext>
             </a:extLst>
           </p:cNvPr>
@@ -9239,7 +9198,7 @@
           <p:cNvPr id="201" name="Rectangle 200">
             <a:extLst>
               <a:ext uri="{FF2B5EF4-FFF2-40B4-BE49-F238E27FC236}">
-                <a16:creationId xmlns:a16="http://schemas.microsoft.com/office/drawing/2014/main" id="{82A92524-340B-4EE6-ABB6-EF2D5980FA47}"/>
+                <a16:creationId xmlns:a16="http://schemas.microsoft.com/office/drawing/2014/main" xmlns="" id="{82A92524-340B-4EE6-ABB6-EF2D5980FA47}"/>
               </a:ext>
             </a:extLst>
           </p:cNvPr>
@@ -9273,7 +9232,7 @@
           <p:cNvPr id="203" name="Straight Arrow Connector 202">
             <a:extLst>
               <a:ext uri="{FF2B5EF4-FFF2-40B4-BE49-F238E27FC236}">
-                <a16:creationId xmlns:a16="http://schemas.microsoft.com/office/drawing/2014/main" id="{9225B0CF-E838-413A-83F6-8650EE890565}"/>
+                <a16:creationId xmlns:a16="http://schemas.microsoft.com/office/drawing/2014/main" xmlns="" id="{9225B0CF-E838-413A-83F6-8650EE890565}"/>
               </a:ext>
             </a:extLst>
           </p:cNvPr>
@@ -9314,7 +9273,7 @@
           <p:cNvPr id="204" name="Straight Arrow Connector 203">
             <a:extLst>
               <a:ext uri="{FF2B5EF4-FFF2-40B4-BE49-F238E27FC236}">
-                <a16:creationId xmlns:a16="http://schemas.microsoft.com/office/drawing/2014/main" id="{95CAB93B-6C47-45D8-A5BC-EEC2B76BB602}"/>
+                <a16:creationId xmlns:a16="http://schemas.microsoft.com/office/drawing/2014/main" xmlns="" id="{95CAB93B-6C47-45D8-A5BC-EEC2B76BB602}"/>
               </a:ext>
             </a:extLst>
           </p:cNvPr>
@@ -9355,7 +9314,7 @@
           <p:cNvPr id="205" name="Rectangle 204">
             <a:extLst>
               <a:ext uri="{FF2B5EF4-FFF2-40B4-BE49-F238E27FC236}">
-                <a16:creationId xmlns:a16="http://schemas.microsoft.com/office/drawing/2014/main" id="{D2303A3E-B69E-4392-B84A-5831F0C33A05}"/>
+                <a16:creationId xmlns:a16="http://schemas.microsoft.com/office/drawing/2014/main" xmlns="" id="{D2303A3E-B69E-4392-B84A-5831F0C33A05}"/>
               </a:ext>
             </a:extLst>
           </p:cNvPr>
@@ -9389,7 +9348,7 @@
           <p:cNvPr id="206" name="Rectangle 205">
             <a:extLst>
               <a:ext uri="{FF2B5EF4-FFF2-40B4-BE49-F238E27FC236}">
-                <a16:creationId xmlns:a16="http://schemas.microsoft.com/office/drawing/2014/main" id="{83F6EF79-56D3-46DB-9E28-B3311AE27C7A}"/>
+                <a16:creationId xmlns:a16="http://schemas.microsoft.com/office/drawing/2014/main" xmlns="" id="{83F6EF79-56D3-46DB-9E28-B3311AE27C7A}"/>
               </a:ext>
             </a:extLst>
           </p:cNvPr>
@@ -9423,7 +9382,7 @@
           <p:cNvPr id="210" name="Straight Arrow Connector 209">
             <a:extLst>
               <a:ext uri="{FF2B5EF4-FFF2-40B4-BE49-F238E27FC236}">
-                <a16:creationId xmlns:a16="http://schemas.microsoft.com/office/drawing/2014/main" id="{88A0ABE3-FEFF-4563-A585-4987D4469D6F}"/>
+                <a16:creationId xmlns:a16="http://schemas.microsoft.com/office/drawing/2014/main" xmlns="" id="{88A0ABE3-FEFF-4563-A585-4987D4469D6F}"/>
               </a:ext>
             </a:extLst>
           </p:cNvPr>
@@ -9464,7 +9423,7 @@
           <p:cNvPr id="211" name="Rectangle 210">
             <a:extLst>
               <a:ext uri="{FF2B5EF4-FFF2-40B4-BE49-F238E27FC236}">
-                <a16:creationId xmlns:a16="http://schemas.microsoft.com/office/drawing/2014/main" id="{79552B94-11C6-49D2-8C17-CFE966019F77}"/>
+                <a16:creationId xmlns:a16="http://schemas.microsoft.com/office/drawing/2014/main" xmlns="" id="{79552B94-11C6-49D2-8C17-CFE966019F77}"/>
               </a:ext>
             </a:extLst>
           </p:cNvPr>
@@ -9498,7 +9457,7 @@
           <p:cNvPr id="227" name="Rectangle 226">
             <a:extLst>
               <a:ext uri="{FF2B5EF4-FFF2-40B4-BE49-F238E27FC236}">
-                <a16:creationId xmlns:a16="http://schemas.microsoft.com/office/drawing/2014/main" id="{0EBA1E62-C57C-4230-B1DE-7A006040DFEA}"/>
+                <a16:creationId xmlns:a16="http://schemas.microsoft.com/office/drawing/2014/main" xmlns="" id="{0EBA1E62-C57C-4230-B1DE-7A006040DFEA}"/>
               </a:ext>
             </a:extLst>
           </p:cNvPr>
@@ -9532,7 +9491,7 @@
           <p:cNvPr id="228" name="Rectangle 227">
             <a:extLst>
               <a:ext uri="{FF2B5EF4-FFF2-40B4-BE49-F238E27FC236}">
-                <a16:creationId xmlns:a16="http://schemas.microsoft.com/office/drawing/2014/main" id="{BB61BB02-FEF3-46FD-8878-8C857E40A6EE}"/>
+                <a16:creationId xmlns:a16="http://schemas.microsoft.com/office/drawing/2014/main" xmlns="" id="{BB61BB02-FEF3-46FD-8878-8C857E40A6EE}"/>
               </a:ext>
             </a:extLst>
           </p:cNvPr>
@@ -9566,7 +9525,7 @@
           <p:cNvPr id="229" name="Rectangle 228">
             <a:extLst>
               <a:ext uri="{FF2B5EF4-FFF2-40B4-BE49-F238E27FC236}">
-                <a16:creationId xmlns:a16="http://schemas.microsoft.com/office/drawing/2014/main" id="{1C1125DF-B23D-4221-8F2B-652887367C26}"/>
+                <a16:creationId xmlns:a16="http://schemas.microsoft.com/office/drawing/2014/main" xmlns="" id="{1C1125DF-B23D-4221-8F2B-652887367C26}"/>
               </a:ext>
             </a:extLst>
           </p:cNvPr>
@@ -9600,7 +9559,7 @@
           <p:cNvPr id="233" name="Rectangle 232">
             <a:extLst>
               <a:ext uri="{FF2B5EF4-FFF2-40B4-BE49-F238E27FC236}">
-                <a16:creationId xmlns:a16="http://schemas.microsoft.com/office/drawing/2014/main" id="{1B4FB8F5-EB60-4653-BE7C-0158D662589D}"/>
+                <a16:creationId xmlns:a16="http://schemas.microsoft.com/office/drawing/2014/main" xmlns="" id="{1B4FB8F5-EB60-4653-BE7C-0158D662589D}"/>
               </a:ext>
             </a:extLst>
           </p:cNvPr>
@@ -9634,7 +9593,7 @@
           <p:cNvPr id="234" name="Rectangle 233">
             <a:extLst>
               <a:ext uri="{FF2B5EF4-FFF2-40B4-BE49-F238E27FC236}">
-                <a16:creationId xmlns:a16="http://schemas.microsoft.com/office/drawing/2014/main" id="{E9142C20-3FFD-4CEA-B005-03DCAEF186E7}"/>
+                <a16:creationId xmlns:a16="http://schemas.microsoft.com/office/drawing/2014/main" xmlns="" id="{E9142C20-3FFD-4CEA-B005-03DCAEF186E7}"/>
               </a:ext>
             </a:extLst>
           </p:cNvPr>
@@ -9668,7 +9627,7 @@
           <p:cNvPr id="237" name="Rectangle 236">
             <a:extLst>
               <a:ext uri="{FF2B5EF4-FFF2-40B4-BE49-F238E27FC236}">
-                <a16:creationId xmlns:a16="http://schemas.microsoft.com/office/drawing/2014/main" id="{D8B04C34-B847-4F0B-BE9C-4903831ADF00}"/>
+                <a16:creationId xmlns:a16="http://schemas.microsoft.com/office/drawing/2014/main" xmlns="" id="{D8B04C34-B847-4F0B-BE9C-4903831ADF00}"/>
               </a:ext>
             </a:extLst>
           </p:cNvPr>
@@ -9717,7 +9676,7 @@
           <p:cNvPr id="239" name="Straight Arrow Connector 238">
             <a:extLst>
               <a:ext uri="{FF2B5EF4-FFF2-40B4-BE49-F238E27FC236}">
-                <a16:creationId xmlns:a16="http://schemas.microsoft.com/office/drawing/2014/main" id="{DDA81647-B08D-4590-B655-8A0750B8971A}"/>
+                <a16:creationId xmlns:a16="http://schemas.microsoft.com/office/drawing/2014/main" xmlns="" id="{DDA81647-B08D-4590-B655-8A0750B8971A}"/>
               </a:ext>
             </a:extLst>
           </p:cNvPr>
@@ -9759,7 +9718,7 @@
           <p:cNvPr id="250" name="Straight Arrow Connector 249">
             <a:extLst>
               <a:ext uri="{FF2B5EF4-FFF2-40B4-BE49-F238E27FC236}">
-                <a16:creationId xmlns:a16="http://schemas.microsoft.com/office/drawing/2014/main" id="{42701CC6-8508-46B9-9D5E-938100E7DFCF}"/>
+                <a16:creationId xmlns:a16="http://schemas.microsoft.com/office/drawing/2014/main" xmlns="" id="{42701CC6-8508-46B9-9D5E-938100E7DFCF}"/>
               </a:ext>
             </a:extLst>
           </p:cNvPr>
@@ -9802,7 +9761,7 @@
           <p:cNvPr id="254" name="Straight Arrow Connector 253">
             <a:extLst>
               <a:ext uri="{FF2B5EF4-FFF2-40B4-BE49-F238E27FC236}">
-                <a16:creationId xmlns:a16="http://schemas.microsoft.com/office/drawing/2014/main" id="{5B55D431-C57A-47DF-802E-7B2794623492}"/>
+                <a16:creationId xmlns:a16="http://schemas.microsoft.com/office/drawing/2014/main" xmlns="" id="{5B55D431-C57A-47DF-802E-7B2794623492}"/>
               </a:ext>
             </a:extLst>
           </p:cNvPr>
@@ -9844,7 +9803,7 @@
           <p:cNvPr id="258" name="Straight Arrow Connector 257">
             <a:extLst>
               <a:ext uri="{FF2B5EF4-FFF2-40B4-BE49-F238E27FC236}">
-                <a16:creationId xmlns:a16="http://schemas.microsoft.com/office/drawing/2014/main" id="{F9A79799-E125-4DF1-A376-93B905B2C82F}"/>
+                <a16:creationId xmlns:a16="http://schemas.microsoft.com/office/drawing/2014/main" xmlns="" id="{F9A79799-E125-4DF1-A376-93B905B2C82F}"/>
               </a:ext>
             </a:extLst>
           </p:cNvPr>
@@ -9885,7 +9844,7 @@
           <p:cNvPr id="263" name="Rectangle 262">
             <a:extLst>
               <a:ext uri="{FF2B5EF4-FFF2-40B4-BE49-F238E27FC236}">
-                <a16:creationId xmlns:a16="http://schemas.microsoft.com/office/drawing/2014/main" id="{55950AD6-5A2C-4E71-9898-4A1755988F14}"/>
+                <a16:creationId xmlns:a16="http://schemas.microsoft.com/office/drawing/2014/main" xmlns="" id="{55950AD6-5A2C-4E71-9898-4A1755988F14}"/>
               </a:ext>
             </a:extLst>
           </p:cNvPr>
@@ -9919,7 +9878,7 @@
           <p:cNvPr id="280" name="Rectangle 279">
             <a:extLst>
               <a:ext uri="{FF2B5EF4-FFF2-40B4-BE49-F238E27FC236}">
-                <a16:creationId xmlns:a16="http://schemas.microsoft.com/office/drawing/2014/main" id="{CDE04D3A-6266-425E-9570-77DDECC409AA}"/>
+                <a16:creationId xmlns:a16="http://schemas.microsoft.com/office/drawing/2014/main" xmlns="" id="{CDE04D3A-6266-425E-9570-77DDECC409AA}"/>
               </a:ext>
             </a:extLst>
           </p:cNvPr>
@@ -9964,7 +9923,7 @@
           <p:cNvPr id="291" name="Straight Arrow Connector 290">
             <a:extLst>
               <a:ext uri="{FF2B5EF4-FFF2-40B4-BE49-F238E27FC236}">
-                <a16:creationId xmlns:a16="http://schemas.microsoft.com/office/drawing/2014/main" id="{2C2CF265-361C-4386-88FB-9DABB2DC39C4}"/>
+                <a16:creationId xmlns:a16="http://schemas.microsoft.com/office/drawing/2014/main" xmlns="" id="{2C2CF265-361C-4386-88FB-9DABB2DC39C4}"/>
               </a:ext>
             </a:extLst>
           </p:cNvPr>
@@ -10005,7 +9964,7 @@
           <p:cNvPr id="136" name="Straight Connector 135">
             <a:extLst>
               <a:ext uri="{FF2B5EF4-FFF2-40B4-BE49-F238E27FC236}">
-                <a16:creationId xmlns:a16="http://schemas.microsoft.com/office/drawing/2014/main" id="{D063FEEB-AA91-4330-984F-3978E16AB366}"/>
+                <a16:creationId xmlns:a16="http://schemas.microsoft.com/office/drawing/2014/main" xmlns="" id="{D063FEEB-AA91-4330-984F-3978E16AB366}"/>
               </a:ext>
             </a:extLst>
           </p:cNvPr>
@@ -10051,7 +10010,7 @@
           <p:cNvPr id="282" name="Straight Arrow Connector 281">
             <a:extLst>
               <a:ext uri="{FF2B5EF4-FFF2-40B4-BE49-F238E27FC236}">
-                <a16:creationId xmlns:a16="http://schemas.microsoft.com/office/drawing/2014/main" id="{360B0EA3-C48E-4679-8DF2-7DD3194DB943}"/>
+                <a16:creationId xmlns:a16="http://schemas.microsoft.com/office/drawing/2014/main" xmlns="" id="{360B0EA3-C48E-4679-8DF2-7DD3194DB943}"/>
               </a:ext>
             </a:extLst>
           </p:cNvPr>
@@ -10096,7 +10055,7 @@
           <p:cNvPr id="309" name="Rectangle 308">
             <a:extLst>
               <a:ext uri="{FF2B5EF4-FFF2-40B4-BE49-F238E27FC236}">
-                <a16:creationId xmlns:a16="http://schemas.microsoft.com/office/drawing/2014/main" id="{D16C60F4-2EC0-449B-83C6-FB150BE34D4D}"/>
+                <a16:creationId xmlns:a16="http://schemas.microsoft.com/office/drawing/2014/main" xmlns="" id="{D16C60F4-2EC0-449B-83C6-FB150BE34D4D}"/>
               </a:ext>
             </a:extLst>
           </p:cNvPr>
@@ -10154,7 +10113,7 @@
           <p:cNvPr id="310" name="Rectangle 309">
             <a:extLst>
               <a:ext uri="{FF2B5EF4-FFF2-40B4-BE49-F238E27FC236}">
-                <a16:creationId xmlns:a16="http://schemas.microsoft.com/office/drawing/2014/main" id="{85A7135B-51C2-400B-B777-FED50B3EC008}"/>
+                <a16:creationId xmlns:a16="http://schemas.microsoft.com/office/drawing/2014/main" xmlns="" id="{85A7135B-51C2-400B-B777-FED50B3EC008}"/>
               </a:ext>
             </a:extLst>
           </p:cNvPr>
@@ -10212,7 +10171,7 @@
           <p:cNvPr id="311" name="Straight Arrow Connector 310">
             <a:extLst>
               <a:ext uri="{FF2B5EF4-FFF2-40B4-BE49-F238E27FC236}">
-                <a16:creationId xmlns:a16="http://schemas.microsoft.com/office/drawing/2014/main" id="{DCEF04F4-68C0-4CA0-89EA-228916077B2C}"/>
+                <a16:creationId xmlns:a16="http://schemas.microsoft.com/office/drawing/2014/main" xmlns="" id="{DCEF04F4-68C0-4CA0-89EA-228916077B2C}"/>
               </a:ext>
             </a:extLst>
           </p:cNvPr>
@@ -10256,7 +10215,7 @@
           <p:cNvPr id="315" name="Straight Arrow Connector 314">
             <a:extLst>
               <a:ext uri="{FF2B5EF4-FFF2-40B4-BE49-F238E27FC236}">
-                <a16:creationId xmlns:a16="http://schemas.microsoft.com/office/drawing/2014/main" id="{7C096D74-7E3B-4674-A5C4-FC3CE09903AD}"/>
+                <a16:creationId xmlns:a16="http://schemas.microsoft.com/office/drawing/2014/main" xmlns="" id="{7C096D74-7E3B-4674-A5C4-FC3CE09903AD}"/>
               </a:ext>
             </a:extLst>
           </p:cNvPr>
@@ -10300,7 +10259,7 @@
           <p:cNvPr id="317" name="Straight Arrow Connector 316">
             <a:extLst>
               <a:ext uri="{FF2B5EF4-FFF2-40B4-BE49-F238E27FC236}">
-                <a16:creationId xmlns:a16="http://schemas.microsoft.com/office/drawing/2014/main" id="{73A95639-E3ED-4946-97D1-3E8794314B64}"/>
+                <a16:creationId xmlns:a16="http://schemas.microsoft.com/office/drawing/2014/main" xmlns="" id="{73A95639-E3ED-4946-97D1-3E8794314B64}"/>
               </a:ext>
             </a:extLst>
           </p:cNvPr>
@@ -10344,7 +10303,7 @@
           <p:cNvPr id="318" name="Straight Arrow Connector 317">
             <a:extLst>
               <a:ext uri="{FF2B5EF4-FFF2-40B4-BE49-F238E27FC236}">
-                <a16:creationId xmlns:a16="http://schemas.microsoft.com/office/drawing/2014/main" id="{3C63B944-8AFA-4950-A704-D95FC5B9BB51}"/>
+                <a16:creationId xmlns:a16="http://schemas.microsoft.com/office/drawing/2014/main" xmlns="" id="{3C63B944-8AFA-4950-A704-D95FC5B9BB51}"/>
               </a:ext>
             </a:extLst>
           </p:cNvPr>
@@ -10388,7 +10347,7 @@
           <p:cNvPr id="320" name="Rectangle 319">
             <a:extLst>
               <a:ext uri="{FF2B5EF4-FFF2-40B4-BE49-F238E27FC236}">
-                <a16:creationId xmlns:a16="http://schemas.microsoft.com/office/drawing/2014/main" id="{77CC2ECC-DB69-4B52-97FB-29231455C7B9}"/>
+                <a16:creationId xmlns:a16="http://schemas.microsoft.com/office/drawing/2014/main" xmlns="" id="{77CC2ECC-DB69-4B52-97FB-29231455C7B9}"/>
               </a:ext>
             </a:extLst>
           </p:cNvPr>
@@ -10426,7 +10385,7 @@
           <p:cNvPr id="321" name="Rectangle 320">
             <a:extLst>
               <a:ext uri="{FF2B5EF4-FFF2-40B4-BE49-F238E27FC236}">
-                <a16:creationId xmlns:a16="http://schemas.microsoft.com/office/drawing/2014/main" id="{8A576E09-313B-4C7E-9796-9E1BAD0C1BF8}"/>
+                <a16:creationId xmlns:a16="http://schemas.microsoft.com/office/drawing/2014/main" xmlns="" id="{8A576E09-313B-4C7E-9796-9E1BAD0C1BF8}"/>
               </a:ext>
             </a:extLst>
           </p:cNvPr>
@@ -10464,7 +10423,7 @@
           <p:cNvPr id="322" name="Rectangle 321">
             <a:extLst>
               <a:ext uri="{FF2B5EF4-FFF2-40B4-BE49-F238E27FC236}">
-                <a16:creationId xmlns:a16="http://schemas.microsoft.com/office/drawing/2014/main" id="{EB442C16-7FB9-4F0A-A72F-2A0A9FAEFED8}"/>
+                <a16:creationId xmlns:a16="http://schemas.microsoft.com/office/drawing/2014/main" xmlns="" id="{EB442C16-7FB9-4F0A-A72F-2A0A9FAEFED8}"/>
               </a:ext>
             </a:extLst>
           </p:cNvPr>
@@ -10502,7 +10461,7 @@
           <p:cNvPr id="323" name="Rectangle 322">
             <a:extLst>
               <a:ext uri="{FF2B5EF4-FFF2-40B4-BE49-F238E27FC236}">
-                <a16:creationId xmlns:a16="http://schemas.microsoft.com/office/drawing/2014/main" id="{6A6BCDE4-43E1-4013-8BE7-D534D26E48C5}"/>
+                <a16:creationId xmlns:a16="http://schemas.microsoft.com/office/drawing/2014/main" xmlns="" id="{6A6BCDE4-43E1-4013-8BE7-D534D26E48C5}"/>
               </a:ext>
             </a:extLst>
           </p:cNvPr>
@@ -10540,7 +10499,7 @@
           <p:cNvPr id="324" name="Rectangle 323">
             <a:extLst>
               <a:ext uri="{FF2B5EF4-FFF2-40B4-BE49-F238E27FC236}">
-                <a16:creationId xmlns:a16="http://schemas.microsoft.com/office/drawing/2014/main" id="{D66D816E-D2AE-45D3-9344-CE1FE2BE8E42}"/>
+                <a16:creationId xmlns:a16="http://schemas.microsoft.com/office/drawing/2014/main" xmlns="" id="{D66D816E-D2AE-45D3-9344-CE1FE2BE8E42}"/>
               </a:ext>
             </a:extLst>
           </p:cNvPr>
@@ -10578,7 +10537,7 @@
           <p:cNvPr id="164" name="Straight Connector 163">
             <a:extLst>
               <a:ext uri="{FF2B5EF4-FFF2-40B4-BE49-F238E27FC236}">
-                <a16:creationId xmlns:a16="http://schemas.microsoft.com/office/drawing/2014/main" id="{A27F1AF9-DB67-4643-A6B8-892B357F77F8}"/>
+                <a16:creationId xmlns:a16="http://schemas.microsoft.com/office/drawing/2014/main" xmlns="" id="{A27F1AF9-DB67-4643-A6B8-892B357F77F8}"/>
               </a:ext>
             </a:extLst>
           </p:cNvPr>
@@ -10622,7 +10581,7 @@
           <p:cNvPr id="330" name="Straight Connector 329">
             <a:extLst>
               <a:ext uri="{FF2B5EF4-FFF2-40B4-BE49-F238E27FC236}">
-                <a16:creationId xmlns:a16="http://schemas.microsoft.com/office/drawing/2014/main" id="{08DB0F1A-2564-4342-B978-1CE2DC892C2D}"/>
+                <a16:creationId xmlns:a16="http://schemas.microsoft.com/office/drawing/2014/main" xmlns="" id="{08DB0F1A-2564-4342-B978-1CE2DC892C2D}"/>
               </a:ext>
             </a:extLst>
           </p:cNvPr>
@@ -10666,7 +10625,7 @@
           <p:cNvPr id="332" name="Straight Connector 331">
             <a:extLst>
               <a:ext uri="{FF2B5EF4-FFF2-40B4-BE49-F238E27FC236}">
-                <a16:creationId xmlns:a16="http://schemas.microsoft.com/office/drawing/2014/main" id="{B2F054C6-EFF0-4A77-A899-8238A0325C57}"/>
+                <a16:creationId xmlns:a16="http://schemas.microsoft.com/office/drawing/2014/main" xmlns="" id="{B2F054C6-EFF0-4A77-A899-8238A0325C57}"/>
               </a:ext>
             </a:extLst>
           </p:cNvPr>
@@ -10710,7 +10669,7 @@
           <p:cNvPr id="334" name="Rectangle 333">
             <a:extLst>
               <a:ext uri="{FF2B5EF4-FFF2-40B4-BE49-F238E27FC236}">
-                <a16:creationId xmlns:a16="http://schemas.microsoft.com/office/drawing/2014/main" id="{4080B39D-BD2E-486F-BF26-82DA65407DB1}"/>
+                <a16:creationId xmlns:a16="http://schemas.microsoft.com/office/drawing/2014/main" xmlns="" id="{4080B39D-BD2E-486F-BF26-82DA65407DB1}"/>
               </a:ext>
             </a:extLst>
           </p:cNvPr>
@@ -10744,7 +10703,7 @@
           <p:cNvPr id="172" name="Arrow: Up-Down 171">
             <a:extLst>
               <a:ext uri="{FF2B5EF4-FFF2-40B4-BE49-F238E27FC236}">
-                <a16:creationId xmlns:a16="http://schemas.microsoft.com/office/drawing/2014/main" id="{588123E5-6CCD-448D-9A1D-08E68C7DCD57}"/>
+                <a16:creationId xmlns:a16="http://schemas.microsoft.com/office/drawing/2014/main" xmlns="" id="{588123E5-6CCD-448D-9A1D-08E68C7DCD57}"/>
               </a:ext>
             </a:extLst>
           </p:cNvPr>
@@ -10790,7 +10749,7 @@
           <p:cNvPr id="338" name="Rectangle 337">
             <a:extLst>
               <a:ext uri="{FF2B5EF4-FFF2-40B4-BE49-F238E27FC236}">
-                <a16:creationId xmlns:a16="http://schemas.microsoft.com/office/drawing/2014/main" id="{2EB48334-7101-4C13-BBC1-33964A917FFD}"/>
+                <a16:creationId xmlns:a16="http://schemas.microsoft.com/office/drawing/2014/main" xmlns="" id="{2EB48334-7101-4C13-BBC1-33964A917FFD}"/>
               </a:ext>
             </a:extLst>
           </p:cNvPr>
@@ -10824,7 +10783,7 @@
           <p:cNvPr id="78" name="Rectangle 77">
             <a:extLst>
               <a:ext uri="{FF2B5EF4-FFF2-40B4-BE49-F238E27FC236}">
-                <a16:creationId xmlns:a16="http://schemas.microsoft.com/office/drawing/2014/main" id="{CEAA613F-4E8E-4AAE-A8B4-C6CEFC30093A}"/>
+                <a16:creationId xmlns:a16="http://schemas.microsoft.com/office/drawing/2014/main" xmlns="" id="{CEAA613F-4E8E-4AAE-A8B4-C6CEFC30093A}"/>
               </a:ext>
             </a:extLst>
           </p:cNvPr>
@@ -10945,7 +10904,7 @@
           <p:cNvPr id="31" name="Rectangle 30">
             <a:extLst>
               <a:ext uri="{FF2B5EF4-FFF2-40B4-BE49-F238E27FC236}">
-                <a16:creationId xmlns:a16="http://schemas.microsoft.com/office/drawing/2014/main" id="{279579D0-6030-4938-A589-CE40E5BE1442}"/>
+                <a16:creationId xmlns:a16="http://schemas.microsoft.com/office/drawing/2014/main" xmlns="" id="{279579D0-6030-4938-A589-CE40E5BE1442}"/>
               </a:ext>
             </a:extLst>
           </p:cNvPr>
@@ -10998,7 +10957,7 @@
           <p:cNvPr id="6" name="Rectangle 5">
             <a:extLst>
               <a:ext uri="{FF2B5EF4-FFF2-40B4-BE49-F238E27FC236}">
-                <a16:creationId xmlns:a16="http://schemas.microsoft.com/office/drawing/2014/main" id="{793DA067-D425-4A50-994D-52DB5946AA31}"/>
+                <a16:creationId xmlns:a16="http://schemas.microsoft.com/office/drawing/2014/main" xmlns="" id="{793DA067-D425-4A50-994D-52DB5946AA31}"/>
               </a:ext>
             </a:extLst>
           </p:cNvPr>
@@ -11044,7 +11003,7 @@
           <p:cNvPr id="10" name="Straight Arrow Connector 9">
             <a:extLst>
               <a:ext uri="{FF2B5EF4-FFF2-40B4-BE49-F238E27FC236}">
-                <a16:creationId xmlns:a16="http://schemas.microsoft.com/office/drawing/2014/main" id="{A89C22DD-226C-46F2-816E-D54E3CBF4E86}"/>
+                <a16:creationId xmlns:a16="http://schemas.microsoft.com/office/drawing/2014/main" xmlns="" id="{A89C22DD-226C-46F2-816E-D54E3CBF4E86}"/>
               </a:ext>
             </a:extLst>
           </p:cNvPr>
@@ -11085,7 +11044,7 @@
           <p:cNvPr id="47" name="Rectangle 46">
             <a:extLst>
               <a:ext uri="{FF2B5EF4-FFF2-40B4-BE49-F238E27FC236}">
-                <a16:creationId xmlns:a16="http://schemas.microsoft.com/office/drawing/2014/main" id="{F12AF9E8-72B3-49C2-A806-D7A997233D9B}"/>
+                <a16:creationId xmlns:a16="http://schemas.microsoft.com/office/drawing/2014/main" xmlns="" id="{F12AF9E8-72B3-49C2-A806-D7A997233D9B}"/>
               </a:ext>
             </a:extLst>
           </p:cNvPr>
@@ -11133,7 +11092,7 @@
           <p:cNvPr id="50" name="Rectangle 49">
             <a:extLst>
               <a:ext uri="{FF2B5EF4-FFF2-40B4-BE49-F238E27FC236}">
-                <a16:creationId xmlns:a16="http://schemas.microsoft.com/office/drawing/2014/main" id="{72BA8D96-D1B3-403E-B40C-4B015061F610}"/>
+                <a16:creationId xmlns:a16="http://schemas.microsoft.com/office/drawing/2014/main" xmlns="" id="{72BA8D96-D1B3-403E-B40C-4B015061F610}"/>
               </a:ext>
             </a:extLst>
           </p:cNvPr>
@@ -11181,7 +11140,7 @@
           <p:cNvPr id="52" name="Rectangle 51">
             <a:extLst>
               <a:ext uri="{FF2B5EF4-FFF2-40B4-BE49-F238E27FC236}">
-                <a16:creationId xmlns:a16="http://schemas.microsoft.com/office/drawing/2014/main" id="{DA80DDF8-DEA8-4759-B1BD-161F83A1C3BA}"/>
+                <a16:creationId xmlns:a16="http://schemas.microsoft.com/office/drawing/2014/main" xmlns="" id="{DA80DDF8-DEA8-4759-B1BD-161F83A1C3BA}"/>
               </a:ext>
             </a:extLst>
           </p:cNvPr>
@@ -11230,7 +11189,7 @@
           <p:cNvPr id="88" name="Rectangle 87">
             <a:extLst>
               <a:ext uri="{FF2B5EF4-FFF2-40B4-BE49-F238E27FC236}">
-                <a16:creationId xmlns:a16="http://schemas.microsoft.com/office/drawing/2014/main" id="{D41F69BC-597C-4C57-922F-4F7FF361E1AF}"/>
+                <a16:creationId xmlns:a16="http://schemas.microsoft.com/office/drawing/2014/main" xmlns="" id="{D41F69BC-597C-4C57-922F-4F7FF361E1AF}"/>
               </a:ext>
             </a:extLst>
           </p:cNvPr>
@@ -11279,7 +11238,7 @@
           <p:cNvPr id="114" name="Straight Arrow Connector 113">
             <a:extLst>
               <a:ext uri="{FF2B5EF4-FFF2-40B4-BE49-F238E27FC236}">
-                <a16:creationId xmlns:a16="http://schemas.microsoft.com/office/drawing/2014/main" id="{53D240C4-D5B8-4650-B923-4B91961DE6E2}"/>
+                <a16:creationId xmlns:a16="http://schemas.microsoft.com/office/drawing/2014/main" xmlns="" id="{53D240C4-D5B8-4650-B923-4B91961DE6E2}"/>
               </a:ext>
             </a:extLst>
           </p:cNvPr>
@@ -11321,7 +11280,7 @@
           <p:cNvPr id="126" name="Rectangle 125">
             <a:extLst>
               <a:ext uri="{FF2B5EF4-FFF2-40B4-BE49-F238E27FC236}">
-                <a16:creationId xmlns:a16="http://schemas.microsoft.com/office/drawing/2014/main" id="{39A323AA-FDCD-4F97-8B8B-5D9D27BE149C}"/>
+                <a16:creationId xmlns:a16="http://schemas.microsoft.com/office/drawing/2014/main" xmlns="" id="{39A323AA-FDCD-4F97-8B8B-5D9D27BE149C}"/>
               </a:ext>
             </a:extLst>
           </p:cNvPr>
@@ -11355,7 +11314,7 @@
           <p:cNvPr id="138" name="Rectangle 137">
             <a:extLst>
               <a:ext uri="{FF2B5EF4-FFF2-40B4-BE49-F238E27FC236}">
-                <a16:creationId xmlns:a16="http://schemas.microsoft.com/office/drawing/2014/main" id="{4F8DCB8B-905D-445E-8584-FA14D37909BC}"/>
+                <a16:creationId xmlns:a16="http://schemas.microsoft.com/office/drawing/2014/main" xmlns="" id="{4F8DCB8B-905D-445E-8584-FA14D37909BC}"/>
               </a:ext>
             </a:extLst>
           </p:cNvPr>
@@ -11389,7 +11348,7 @@
           <p:cNvPr id="160" name="Connector: Elbow 159">
             <a:extLst>
               <a:ext uri="{FF2B5EF4-FFF2-40B4-BE49-F238E27FC236}">
-                <a16:creationId xmlns:a16="http://schemas.microsoft.com/office/drawing/2014/main" id="{46BA998D-C213-409D-B4CA-94C83F7B158E}"/>
+                <a16:creationId xmlns:a16="http://schemas.microsoft.com/office/drawing/2014/main" xmlns="" id="{46BA998D-C213-409D-B4CA-94C83F7B158E}"/>
               </a:ext>
             </a:extLst>
           </p:cNvPr>
@@ -11429,7 +11388,7 @@
           <p:cNvPr id="194" name="Straight Arrow Connector 193">
             <a:extLst>
               <a:ext uri="{FF2B5EF4-FFF2-40B4-BE49-F238E27FC236}">
-                <a16:creationId xmlns:a16="http://schemas.microsoft.com/office/drawing/2014/main" id="{D5292CFC-5275-4FD2-8109-6B14F01EBC7A}"/>
+                <a16:creationId xmlns:a16="http://schemas.microsoft.com/office/drawing/2014/main" xmlns="" id="{D5292CFC-5275-4FD2-8109-6B14F01EBC7A}"/>
               </a:ext>
             </a:extLst>
           </p:cNvPr>
@@ -11470,7 +11429,7 @@
           <p:cNvPr id="214" name="Rectangle 213">
             <a:extLst>
               <a:ext uri="{FF2B5EF4-FFF2-40B4-BE49-F238E27FC236}">
-                <a16:creationId xmlns:a16="http://schemas.microsoft.com/office/drawing/2014/main" id="{2A553585-52E8-467E-A7F2-C88B4C864A0F}"/>
+                <a16:creationId xmlns:a16="http://schemas.microsoft.com/office/drawing/2014/main" xmlns="" id="{2A553585-52E8-467E-A7F2-C88B4C864A0F}"/>
               </a:ext>
             </a:extLst>
           </p:cNvPr>
@@ -11504,7 +11463,7 @@
           <p:cNvPr id="215" name="Rectangle 214">
             <a:extLst>
               <a:ext uri="{FF2B5EF4-FFF2-40B4-BE49-F238E27FC236}">
-                <a16:creationId xmlns:a16="http://schemas.microsoft.com/office/drawing/2014/main" id="{8A736463-5E14-434D-BC8F-A5D477198C8B}"/>
+                <a16:creationId xmlns:a16="http://schemas.microsoft.com/office/drawing/2014/main" xmlns="" id="{8A736463-5E14-434D-BC8F-A5D477198C8B}"/>
               </a:ext>
             </a:extLst>
           </p:cNvPr>
@@ -11538,7 +11497,7 @@
           <p:cNvPr id="216" name="Rectangle 215">
             <a:extLst>
               <a:ext uri="{FF2B5EF4-FFF2-40B4-BE49-F238E27FC236}">
-                <a16:creationId xmlns:a16="http://schemas.microsoft.com/office/drawing/2014/main" id="{979BDA46-FAFD-4BC1-9764-07E70725BDCC}"/>
+                <a16:creationId xmlns:a16="http://schemas.microsoft.com/office/drawing/2014/main" xmlns="" id="{979BDA46-FAFD-4BC1-9764-07E70725BDCC}"/>
               </a:ext>
             </a:extLst>
           </p:cNvPr>
@@ -11572,7 +11531,7 @@
           <p:cNvPr id="232" name="Connector: Elbow 231">
             <a:extLst>
               <a:ext uri="{FF2B5EF4-FFF2-40B4-BE49-F238E27FC236}">
-                <a16:creationId xmlns:a16="http://schemas.microsoft.com/office/drawing/2014/main" id="{F9413389-FC58-45E8-9D4B-EEBD5971A3F9}"/>
+                <a16:creationId xmlns:a16="http://schemas.microsoft.com/office/drawing/2014/main" xmlns="" id="{F9413389-FC58-45E8-9D4B-EEBD5971A3F9}"/>
               </a:ext>
             </a:extLst>
           </p:cNvPr>
@@ -11615,7 +11574,7 @@
           <p:cNvPr id="265" name="Rectangle 264">
             <a:extLst>
               <a:ext uri="{FF2B5EF4-FFF2-40B4-BE49-F238E27FC236}">
-                <a16:creationId xmlns:a16="http://schemas.microsoft.com/office/drawing/2014/main" id="{9033217E-CE05-4F28-B1EA-AEC38C4E2002}"/>
+                <a16:creationId xmlns:a16="http://schemas.microsoft.com/office/drawing/2014/main" xmlns="" id="{9033217E-CE05-4F28-B1EA-AEC38C4E2002}"/>
               </a:ext>
             </a:extLst>
           </p:cNvPr>
@@ -11649,7 +11608,7 @@
           <p:cNvPr id="313" name="Rectangle 312">
             <a:extLst>
               <a:ext uri="{FF2B5EF4-FFF2-40B4-BE49-F238E27FC236}">
-                <a16:creationId xmlns:a16="http://schemas.microsoft.com/office/drawing/2014/main" id="{06600712-19EA-44C2-9896-13286DE0F3CC}"/>
+                <a16:creationId xmlns:a16="http://schemas.microsoft.com/office/drawing/2014/main" xmlns="" id="{06600712-19EA-44C2-9896-13286DE0F3CC}"/>
               </a:ext>
             </a:extLst>
           </p:cNvPr>
@@ -11698,7 +11657,7 @@
           <p:cNvPr id="472" name="Straight Arrow Connector 471">
             <a:extLst>
               <a:ext uri="{FF2B5EF4-FFF2-40B4-BE49-F238E27FC236}">
-                <a16:creationId xmlns:a16="http://schemas.microsoft.com/office/drawing/2014/main" id="{0A7482F8-663D-49C6-B72C-29396BAE962A}"/>
+                <a16:creationId xmlns:a16="http://schemas.microsoft.com/office/drawing/2014/main" xmlns="" id="{0A7482F8-663D-49C6-B72C-29396BAE962A}"/>
               </a:ext>
             </a:extLst>
           </p:cNvPr>
@@ -11739,7 +11698,7 @@
           <p:cNvPr id="473" name="Straight Arrow Connector 472">
             <a:extLst>
               <a:ext uri="{FF2B5EF4-FFF2-40B4-BE49-F238E27FC236}">
-                <a16:creationId xmlns:a16="http://schemas.microsoft.com/office/drawing/2014/main" id="{C91B718E-1020-40D8-A8F1-30F1F67E1721}"/>
+                <a16:creationId xmlns:a16="http://schemas.microsoft.com/office/drawing/2014/main" xmlns="" id="{C91B718E-1020-40D8-A8F1-30F1F67E1721}"/>
               </a:ext>
             </a:extLst>
           </p:cNvPr>
@@ -11780,7 +11739,7 @@
           <p:cNvPr id="474" name="Straight Arrow Connector 473">
             <a:extLst>
               <a:ext uri="{FF2B5EF4-FFF2-40B4-BE49-F238E27FC236}">
-                <a16:creationId xmlns:a16="http://schemas.microsoft.com/office/drawing/2014/main" id="{CCE9B018-247E-4FF8-8CEC-DC6DF7DAB711}"/>
+                <a16:creationId xmlns:a16="http://schemas.microsoft.com/office/drawing/2014/main" xmlns="" id="{CCE9B018-247E-4FF8-8CEC-DC6DF7DAB711}"/>
               </a:ext>
             </a:extLst>
           </p:cNvPr>
@@ -11821,7 +11780,7 @@
           <p:cNvPr id="489" name="Rectangle 488">
             <a:extLst>
               <a:ext uri="{FF2B5EF4-FFF2-40B4-BE49-F238E27FC236}">
-                <a16:creationId xmlns:a16="http://schemas.microsoft.com/office/drawing/2014/main" id="{9E560924-673F-4BA7-8FE2-5A73D49A9F9E}"/>
+                <a16:creationId xmlns:a16="http://schemas.microsoft.com/office/drawing/2014/main" xmlns="" id="{9E560924-673F-4BA7-8FE2-5A73D49A9F9E}"/>
               </a:ext>
             </a:extLst>
           </p:cNvPr>
@@ -11855,7 +11814,7 @@
           <p:cNvPr id="490" name="Rectangle 489">
             <a:extLst>
               <a:ext uri="{FF2B5EF4-FFF2-40B4-BE49-F238E27FC236}">
-                <a16:creationId xmlns:a16="http://schemas.microsoft.com/office/drawing/2014/main" id="{D5973B82-8AFA-4234-AFAB-1ED5D4CEEFB9}"/>
+                <a16:creationId xmlns:a16="http://schemas.microsoft.com/office/drawing/2014/main" xmlns="" id="{D5973B82-8AFA-4234-AFAB-1ED5D4CEEFB9}"/>
               </a:ext>
             </a:extLst>
           </p:cNvPr>
@@ -11889,7 +11848,7 @@
           <p:cNvPr id="491" name="Rectangle 490">
             <a:extLst>
               <a:ext uri="{FF2B5EF4-FFF2-40B4-BE49-F238E27FC236}">
-                <a16:creationId xmlns:a16="http://schemas.microsoft.com/office/drawing/2014/main" id="{960B192E-4892-4E62-9162-A03F26D2F144}"/>
+                <a16:creationId xmlns:a16="http://schemas.microsoft.com/office/drawing/2014/main" xmlns="" id="{960B192E-4892-4E62-9162-A03F26D2F144}"/>
               </a:ext>
             </a:extLst>
           </p:cNvPr>
@@ -11923,7 +11882,7 @@
           <p:cNvPr id="493" name="Straight Arrow Connector 492">
             <a:extLst>
               <a:ext uri="{FF2B5EF4-FFF2-40B4-BE49-F238E27FC236}">
-                <a16:creationId xmlns:a16="http://schemas.microsoft.com/office/drawing/2014/main" id="{78F0E7AE-5AC3-4C63-ACFA-A0D9FBD264C6}"/>
+                <a16:creationId xmlns:a16="http://schemas.microsoft.com/office/drawing/2014/main" xmlns="" id="{78F0E7AE-5AC3-4C63-ACFA-A0D9FBD264C6}"/>
               </a:ext>
             </a:extLst>
           </p:cNvPr>
@@ -11964,7 +11923,7 @@
           <p:cNvPr id="494" name="Rectangle 493">
             <a:extLst>
               <a:ext uri="{FF2B5EF4-FFF2-40B4-BE49-F238E27FC236}">
-                <a16:creationId xmlns:a16="http://schemas.microsoft.com/office/drawing/2014/main" id="{EDDF9529-7DCB-4E27-BD8D-2648113059BD}"/>
+                <a16:creationId xmlns:a16="http://schemas.microsoft.com/office/drawing/2014/main" xmlns="" id="{EDDF9529-7DCB-4E27-BD8D-2648113059BD}"/>
               </a:ext>
             </a:extLst>
           </p:cNvPr>
@@ -11998,7 +11957,7 @@
           <p:cNvPr id="499" name="Arrow: Up 498">
             <a:extLst>
               <a:ext uri="{FF2B5EF4-FFF2-40B4-BE49-F238E27FC236}">
-                <a16:creationId xmlns:a16="http://schemas.microsoft.com/office/drawing/2014/main" id="{75DDA6DD-7656-436A-8956-8A565B1B233A}"/>
+                <a16:creationId xmlns:a16="http://schemas.microsoft.com/office/drawing/2014/main" xmlns="" id="{75DDA6DD-7656-436A-8956-8A565B1B233A}"/>
               </a:ext>
             </a:extLst>
           </p:cNvPr>
@@ -12044,7 +12003,7 @@
           <p:cNvPr id="500" name="Arrow: Up 499">
             <a:extLst>
               <a:ext uri="{FF2B5EF4-FFF2-40B4-BE49-F238E27FC236}">
-                <a16:creationId xmlns:a16="http://schemas.microsoft.com/office/drawing/2014/main" id="{8D76D0A2-6BE8-40F6-8F6D-26DB078B2044}"/>
+                <a16:creationId xmlns:a16="http://schemas.microsoft.com/office/drawing/2014/main" xmlns="" id="{8D76D0A2-6BE8-40F6-8F6D-26DB078B2044}"/>
               </a:ext>
             </a:extLst>
           </p:cNvPr>
@@ -12090,7 +12049,7 @@
           <p:cNvPr id="106" name="Rectangle 105">
             <a:extLst>
               <a:ext uri="{FF2B5EF4-FFF2-40B4-BE49-F238E27FC236}">
-                <a16:creationId xmlns:a16="http://schemas.microsoft.com/office/drawing/2014/main" id="{0C4A19DB-E3B0-466C-93D4-B709E4C255E4}"/>
+                <a16:creationId xmlns:a16="http://schemas.microsoft.com/office/drawing/2014/main" xmlns="" id="{0C4A19DB-E3B0-466C-93D4-B709E4C255E4}"/>
               </a:ext>
             </a:extLst>
           </p:cNvPr>
@@ -12124,7 +12083,7 @@
           <p:cNvPr id="113" name="Rectangle 112">
             <a:extLst>
               <a:ext uri="{FF2B5EF4-FFF2-40B4-BE49-F238E27FC236}">
-                <a16:creationId xmlns:a16="http://schemas.microsoft.com/office/drawing/2014/main" id="{A4BCE37F-12BB-4B41-970D-D867524DD06D}"/>
+                <a16:creationId xmlns:a16="http://schemas.microsoft.com/office/drawing/2014/main" xmlns="" id="{A4BCE37F-12BB-4B41-970D-D867524DD06D}"/>
               </a:ext>
             </a:extLst>
           </p:cNvPr>
@@ -12158,7 +12117,7 @@
           <p:cNvPr id="122" name="Rectangle 121">
             <a:extLst>
               <a:ext uri="{FF2B5EF4-FFF2-40B4-BE49-F238E27FC236}">
-                <a16:creationId xmlns:a16="http://schemas.microsoft.com/office/drawing/2014/main" id="{AAAB0FBD-9944-4D2C-9854-B02DDB31218D}"/>
+                <a16:creationId xmlns:a16="http://schemas.microsoft.com/office/drawing/2014/main" xmlns="" id="{AAAB0FBD-9944-4D2C-9854-B02DDB31218D}"/>
               </a:ext>
             </a:extLst>
           </p:cNvPr>
@@ -12192,7 +12151,7 @@
           <p:cNvPr id="136" name="Rectangle 135">
             <a:extLst>
               <a:ext uri="{FF2B5EF4-FFF2-40B4-BE49-F238E27FC236}">
-                <a16:creationId xmlns:a16="http://schemas.microsoft.com/office/drawing/2014/main" id="{55F6F84D-8A59-40AA-8EA2-6A029D8477A5}"/>
+                <a16:creationId xmlns:a16="http://schemas.microsoft.com/office/drawing/2014/main" xmlns="" id="{55F6F84D-8A59-40AA-8EA2-6A029D8477A5}"/>
               </a:ext>
             </a:extLst>
           </p:cNvPr>
@@ -12226,7 +12185,7 @@
           <p:cNvPr id="152" name="Rectangle 151">
             <a:extLst>
               <a:ext uri="{FF2B5EF4-FFF2-40B4-BE49-F238E27FC236}">
-                <a16:creationId xmlns:a16="http://schemas.microsoft.com/office/drawing/2014/main" id="{AB0A7C87-6361-4BFC-9496-A68943EE8D54}"/>
+                <a16:creationId xmlns:a16="http://schemas.microsoft.com/office/drawing/2014/main" xmlns="" id="{AB0A7C87-6361-4BFC-9496-A68943EE8D54}"/>
               </a:ext>
             </a:extLst>
           </p:cNvPr>
@@ -12260,7 +12219,7 @@
           <p:cNvPr id="169" name="Rectangle 168">
             <a:extLst>
               <a:ext uri="{FF2B5EF4-FFF2-40B4-BE49-F238E27FC236}">
-                <a16:creationId xmlns:a16="http://schemas.microsoft.com/office/drawing/2014/main" id="{0A0A3CC5-5A85-4723-9EBA-EFC0A4A54D91}"/>
+                <a16:creationId xmlns:a16="http://schemas.microsoft.com/office/drawing/2014/main" xmlns="" id="{0A0A3CC5-5A85-4723-9EBA-EFC0A4A54D91}"/>
               </a:ext>
             </a:extLst>
           </p:cNvPr>
@@ -12294,7 +12253,7 @@
           <p:cNvPr id="175" name="Rectangle 174">
             <a:extLst>
               <a:ext uri="{FF2B5EF4-FFF2-40B4-BE49-F238E27FC236}">
-                <a16:creationId xmlns:a16="http://schemas.microsoft.com/office/drawing/2014/main" id="{ED3646EF-5C2B-43FF-9D3F-300137501DBD}"/>
+                <a16:creationId xmlns:a16="http://schemas.microsoft.com/office/drawing/2014/main" xmlns="" id="{ED3646EF-5C2B-43FF-9D3F-300137501DBD}"/>
               </a:ext>
             </a:extLst>
           </p:cNvPr>
@@ -12328,7 +12287,7 @@
           <p:cNvPr id="184" name="Rectangle 183">
             <a:extLst>
               <a:ext uri="{FF2B5EF4-FFF2-40B4-BE49-F238E27FC236}">
-                <a16:creationId xmlns:a16="http://schemas.microsoft.com/office/drawing/2014/main" id="{497DFB64-AB0D-4D42-B47F-EE1DBBDA68A5}"/>
+                <a16:creationId xmlns:a16="http://schemas.microsoft.com/office/drawing/2014/main" xmlns="" id="{497DFB64-AB0D-4D42-B47F-EE1DBBDA68A5}"/>
               </a:ext>
             </a:extLst>
           </p:cNvPr>
@@ -12362,7 +12321,7 @@
           <p:cNvPr id="200" name="Rectangle 199">
             <a:extLst>
               <a:ext uri="{FF2B5EF4-FFF2-40B4-BE49-F238E27FC236}">
-                <a16:creationId xmlns:a16="http://schemas.microsoft.com/office/drawing/2014/main" id="{0AADE552-296D-4595-9AE8-14DFC031726E}"/>
+                <a16:creationId xmlns:a16="http://schemas.microsoft.com/office/drawing/2014/main" xmlns="" id="{0AADE552-296D-4595-9AE8-14DFC031726E}"/>
               </a:ext>
             </a:extLst>
           </p:cNvPr>
@@ -12396,7 +12355,7 @@
           <p:cNvPr id="222" name="Rectangle 221">
             <a:extLst>
               <a:ext uri="{FF2B5EF4-FFF2-40B4-BE49-F238E27FC236}">
-                <a16:creationId xmlns:a16="http://schemas.microsoft.com/office/drawing/2014/main" id="{22D5ED1C-1A3D-4680-93D2-0AC0E803B936}"/>
+                <a16:creationId xmlns:a16="http://schemas.microsoft.com/office/drawing/2014/main" xmlns="" id="{22D5ED1C-1A3D-4680-93D2-0AC0E803B936}"/>
               </a:ext>
             </a:extLst>
           </p:cNvPr>
@@ -12445,7 +12404,7 @@
           <p:cNvPr id="223" name="Rectangle 222">
             <a:extLst>
               <a:ext uri="{FF2B5EF4-FFF2-40B4-BE49-F238E27FC236}">
-                <a16:creationId xmlns:a16="http://schemas.microsoft.com/office/drawing/2014/main" id="{30B894DF-DCBB-41F6-B1A8-E54CFE25689B}"/>
+                <a16:creationId xmlns:a16="http://schemas.microsoft.com/office/drawing/2014/main" xmlns="" id="{30B894DF-DCBB-41F6-B1A8-E54CFE25689B}"/>
               </a:ext>
             </a:extLst>
           </p:cNvPr>
@@ -12479,7 +12438,7 @@
           <p:cNvPr id="224" name="Rectangle 223">
             <a:extLst>
               <a:ext uri="{FF2B5EF4-FFF2-40B4-BE49-F238E27FC236}">
-                <a16:creationId xmlns:a16="http://schemas.microsoft.com/office/drawing/2014/main" id="{4D261CC7-C687-447A-BB07-28FC88F2997B}"/>
+                <a16:creationId xmlns:a16="http://schemas.microsoft.com/office/drawing/2014/main" xmlns="" id="{4D261CC7-C687-447A-BB07-28FC88F2997B}"/>
               </a:ext>
             </a:extLst>
           </p:cNvPr>
@@ -12513,7 +12472,7 @@
           <p:cNvPr id="26" name="Connector: Elbow 25">
             <a:extLst>
               <a:ext uri="{FF2B5EF4-FFF2-40B4-BE49-F238E27FC236}">
-                <a16:creationId xmlns:a16="http://schemas.microsoft.com/office/drawing/2014/main" id="{571B4CDA-759B-4325-8906-3FAD22D271E0}"/>
+                <a16:creationId xmlns:a16="http://schemas.microsoft.com/office/drawing/2014/main" xmlns="" id="{571B4CDA-759B-4325-8906-3FAD22D271E0}"/>
               </a:ext>
             </a:extLst>
           </p:cNvPr>
@@ -12556,7 +12515,7 @@
           <p:cNvPr id="120" name="Rectangle 119">
             <a:extLst>
               <a:ext uri="{FF2B5EF4-FFF2-40B4-BE49-F238E27FC236}">
-                <a16:creationId xmlns:a16="http://schemas.microsoft.com/office/drawing/2014/main" id="{79FAD2DA-23E8-4AAA-B8C2-7F8324B4D791}"/>
+                <a16:creationId xmlns:a16="http://schemas.microsoft.com/office/drawing/2014/main" xmlns="" id="{79FAD2DA-23E8-4AAA-B8C2-7F8324B4D791}"/>
               </a:ext>
             </a:extLst>
           </p:cNvPr>
@@ -12590,7 +12549,7 @@
           <p:cNvPr id="129" name="Rectangle 128">
             <a:extLst>
               <a:ext uri="{FF2B5EF4-FFF2-40B4-BE49-F238E27FC236}">
-                <a16:creationId xmlns:a16="http://schemas.microsoft.com/office/drawing/2014/main" id="{E5DAC0AA-EF21-42F3-BAC2-373B66326348}"/>
+                <a16:creationId xmlns:a16="http://schemas.microsoft.com/office/drawing/2014/main" xmlns="" id="{E5DAC0AA-EF21-42F3-BAC2-373B66326348}"/>
               </a:ext>
             </a:extLst>
           </p:cNvPr>
@@ -12639,7 +12598,7 @@
           <p:cNvPr id="37" name="Arrow: Bent-Up 36">
             <a:extLst>
               <a:ext uri="{FF2B5EF4-FFF2-40B4-BE49-F238E27FC236}">
-                <a16:creationId xmlns:a16="http://schemas.microsoft.com/office/drawing/2014/main" id="{D86D2E88-D3B1-4F84-9A12-88A2719D808C}"/>
+                <a16:creationId xmlns:a16="http://schemas.microsoft.com/office/drawing/2014/main" xmlns="" id="{D86D2E88-D3B1-4F84-9A12-88A2719D808C}"/>
               </a:ext>
             </a:extLst>
           </p:cNvPr>
@@ -12695,7 +12654,7 @@
           <p:cNvPr id="132" name="Rectangle 131">
             <a:extLst>
               <a:ext uri="{FF2B5EF4-FFF2-40B4-BE49-F238E27FC236}">
-                <a16:creationId xmlns:a16="http://schemas.microsoft.com/office/drawing/2014/main" id="{AAA28C2C-C71C-47AE-8B87-A01AB0A66F59}"/>
+                <a16:creationId xmlns:a16="http://schemas.microsoft.com/office/drawing/2014/main" xmlns="" id="{AAA28C2C-C71C-47AE-8B87-A01AB0A66F59}"/>
               </a:ext>
             </a:extLst>
           </p:cNvPr>
@@ -12704,8 +12663,8 @@
         </p:nvSpPr>
         <p:spPr>
           <a:xfrm>
-            <a:off x="4270932" y="512559"/>
-            <a:ext cx="1646155" cy="553998"/>
+            <a:off x="4256661" y="369870"/>
+            <a:ext cx="2136334" cy="707886"/>
           </a:xfrm>
           <a:prstGeom prst="rect">
             <a:avLst/>
@@ -12732,8 +12691,19 @@
             </a:br>
             <a:r>
               <a:rPr lang="en-US" sz="1000" dirty="0"/>
-              <a:t>3. Mac Configuration</a:t>
-            </a:r>
+              <a:t>3. Mac </a:t>
+            </a:r>
+            <a:r>
+              <a:rPr lang="en-US" sz="1000" dirty="0" smtClean="0"/>
+              <a:t>Configuration</a:t>
+            </a:r>
+          </a:p>
+          <a:p>
+            <a:r>
+              <a:rPr lang="en-US" sz="1000" dirty="0" smtClean="0"/>
+              <a:t>4. CLI  (Measurement &amp; debug)</a:t>
+            </a:r>
+            <a:endParaRPr lang="en-US" sz="1000" dirty="0"/>
           </a:p>
         </p:txBody>
       </p:sp>
@@ -12742,7 +12712,7 @@
           <p:cNvPr id="133" name="Rectangle 132">
             <a:extLst>
               <a:ext uri="{FF2B5EF4-FFF2-40B4-BE49-F238E27FC236}">
-                <a16:creationId xmlns:a16="http://schemas.microsoft.com/office/drawing/2014/main" id="{675365E4-90BC-4368-8892-69B23A4E3232}"/>
+                <a16:creationId xmlns:a16="http://schemas.microsoft.com/office/drawing/2014/main" xmlns="" id="{675365E4-90BC-4368-8892-69B23A4E3232}"/>
               </a:ext>
             </a:extLst>
           </p:cNvPr>
@@ -12776,7 +12746,7 @@
           <p:cNvPr id="143" name="Arrow: Up-Down 142">
             <a:extLst>
               <a:ext uri="{FF2B5EF4-FFF2-40B4-BE49-F238E27FC236}">
-                <a16:creationId xmlns:a16="http://schemas.microsoft.com/office/drawing/2014/main" id="{93660FA0-156C-44BF-8C34-E57E5251DE69}"/>
+                <a16:creationId xmlns:a16="http://schemas.microsoft.com/office/drawing/2014/main" xmlns="" id="{93660FA0-156C-44BF-8C34-E57E5251DE69}"/>
               </a:ext>
             </a:extLst>
           </p:cNvPr>
@@ -12825,7 +12795,7 @@
           <p:cNvPr id="144" name="Rectangle 143">
             <a:extLst>
               <a:ext uri="{FF2B5EF4-FFF2-40B4-BE49-F238E27FC236}">
-                <a16:creationId xmlns:a16="http://schemas.microsoft.com/office/drawing/2014/main" id="{986542AB-5674-4AA6-86E5-28B0C30BA790}"/>
+                <a16:creationId xmlns:a16="http://schemas.microsoft.com/office/drawing/2014/main" xmlns="" id="{986542AB-5674-4AA6-86E5-28B0C30BA790}"/>
               </a:ext>
             </a:extLst>
           </p:cNvPr>
@@ -12859,7 +12829,7 @@
           <p:cNvPr id="145" name="Rectangle 144">
             <a:extLst>
               <a:ext uri="{FF2B5EF4-FFF2-40B4-BE49-F238E27FC236}">
-                <a16:creationId xmlns:a16="http://schemas.microsoft.com/office/drawing/2014/main" id="{83D57939-D224-484F-8C35-2A1A98DF164E}"/>
+                <a16:creationId xmlns:a16="http://schemas.microsoft.com/office/drawing/2014/main" xmlns="" id="{83D57939-D224-484F-8C35-2A1A98DF164E}"/>
               </a:ext>
             </a:extLst>
           </p:cNvPr>
@@ -12980,7 +12950,7 @@
           <p:cNvPr id="19" name="Rectangle 18">
             <a:extLst>
               <a:ext uri="{FF2B5EF4-FFF2-40B4-BE49-F238E27FC236}">
-                <a16:creationId xmlns:a16="http://schemas.microsoft.com/office/drawing/2014/main" id="{E7CAE480-721E-40B8-A76B-23FB73E57856}"/>
+                <a16:creationId xmlns:a16="http://schemas.microsoft.com/office/drawing/2014/main" xmlns="" id="{E7CAE480-721E-40B8-A76B-23FB73E57856}"/>
               </a:ext>
             </a:extLst>
           </p:cNvPr>
@@ -13049,7 +13019,7 @@
           <p:cNvPr id="21" name="Rectangle 20">
             <a:extLst>
               <a:ext uri="{FF2B5EF4-FFF2-40B4-BE49-F238E27FC236}">
-                <a16:creationId xmlns:a16="http://schemas.microsoft.com/office/drawing/2014/main" id="{ECDAD001-47DC-4992-826B-B3A870905047}"/>
+                <a16:creationId xmlns:a16="http://schemas.microsoft.com/office/drawing/2014/main" xmlns="" id="{ECDAD001-47DC-4992-826B-B3A870905047}"/>
               </a:ext>
             </a:extLst>
           </p:cNvPr>
@@ -13098,7 +13068,7 @@
           <p:cNvPr id="23" name="Rectangle 22">
             <a:extLst>
               <a:ext uri="{FF2B5EF4-FFF2-40B4-BE49-F238E27FC236}">
-                <a16:creationId xmlns:a16="http://schemas.microsoft.com/office/drawing/2014/main" id="{1EF86CA4-3571-4BD3-B0A2-B35D3758FEFF}"/>
+                <a16:creationId xmlns:a16="http://schemas.microsoft.com/office/drawing/2014/main" xmlns="" id="{1EF86CA4-3571-4BD3-B0A2-B35D3758FEFF}"/>
               </a:ext>
             </a:extLst>
           </p:cNvPr>
@@ -13147,7 +13117,7 @@
           <p:cNvPr id="24" name="Rectangle 23">
             <a:extLst>
               <a:ext uri="{FF2B5EF4-FFF2-40B4-BE49-F238E27FC236}">
-                <a16:creationId xmlns:a16="http://schemas.microsoft.com/office/drawing/2014/main" id="{18C3AAE8-CB09-438D-8C1D-ADF346E24AB5}"/>
+                <a16:creationId xmlns:a16="http://schemas.microsoft.com/office/drawing/2014/main" xmlns="" id="{18C3AAE8-CB09-438D-8C1D-ADF346E24AB5}"/>
               </a:ext>
             </a:extLst>
           </p:cNvPr>
@@ -13196,7 +13166,7 @@
           <p:cNvPr id="25" name="Rectangle 24">
             <a:extLst>
               <a:ext uri="{FF2B5EF4-FFF2-40B4-BE49-F238E27FC236}">
-                <a16:creationId xmlns:a16="http://schemas.microsoft.com/office/drawing/2014/main" id="{02C9D8FC-AFDF-4D47-ACB9-2426EC2DCE46}"/>
+                <a16:creationId xmlns:a16="http://schemas.microsoft.com/office/drawing/2014/main" xmlns="" id="{02C9D8FC-AFDF-4D47-ACB9-2426EC2DCE46}"/>
               </a:ext>
             </a:extLst>
           </p:cNvPr>
@@ -13245,7 +13215,7 @@
           <p:cNvPr id="27" name="Straight Connector 26">
             <a:extLst>
               <a:ext uri="{FF2B5EF4-FFF2-40B4-BE49-F238E27FC236}">
-                <a16:creationId xmlns:a16="http://schemas.microsoft.com/office/drawing/2014/main" id="{7A207637-1914-4FE7-A1CB-62CB6D3DD8AF}"/>
+                <a16:creationId xmlns:a16="http://schemas.microsoft.com/office/drawing/2014/main" xmlns="" id="{7A207637-1914-4FE7-A1CB-62CB6D3DD8AF}"/>
               </a:ext>
             </a:extLst>
           </p:cNvPr>
@@ -13283,7 +13253,7 @@
           <p:cNvPr id="28" name="Straight Connector 27">
             <a:extLst>
               <a:ext uri="{FF2B5EF4-FFF2-40B4-BE49-F238E27FC236}">
-                <a16:creationId xmlns:a16="http://schemas.microsoft.com/office/drawing/2014/main" id="{E864DD82-2B99-4204-BD7D-DC797E4B0103}"/>
+                <a16:creationId xmlns:a16="http://schemas.microsoft.com/office/drawing/2014/main" xmlns="" id="{E864DD82-2B99-4204-BD7D-DC797E4B0103}"/>
               </a:ext>
             </a:extLst>
           </p:cNvPr>
@@ -13321,7 +13291,7 @@
           <p:cNvPr id="30" name="Rectangle 29">
             <a:extLst>
               <a:ext uri="{FF2B5EF4-FFF2-40B4-BE49-F238E27FC236}">
-                <a16:creationId xmlns:a16="http://schemas.microsoft.com/office/drawing/2014/main" id="{772555D8-ED85-407F-9BFD-FB2BD3409E9D}"/>
+                <a16:creationId xmlns:a16="http://schemas.microsoft.com/office/drawing/2014/main" xmlns="" id="{772555D8-ED85-407F-9BFD-FB2BD3409E9D}"/>
               </a:ext>
             </a:extLst>
           </p:cNvPr>
@@ -13370,7 +13340,7 @@
           <p:cNvPr id="37" name="Connector: Elbow 36">
             <a:extLst>
               <a:ext uri="{FF2B5EF4-FFF2-40B4-BE49-F238E27FC236}">
-                <a16:creationId xmlns:a16="http://schemas.microsoft.com/office/drawing/2014/main" id="{C0334C91-9963-4334-8838-4E4AA8B68532}"/>
+                <a16:creationId xmlns:a16="http://schemas.microsoft.com/office/drawing/2014/main" xmlns="" id="{C0334C91-9963-4334-8838-4E4AA8B68532}"/>
               </a:ext>
             </a:extLst>
           </p:cNvPr>
@@ -13414,7 +13384,7 @@
           <p:cNvPr id="44" name="Connector: Elbow 43">
             <a:extLst>
               <a:ext uri="{FF2B5EF4-FFF2-40B4-BE49-F238E27FC236}">
-                <a16:creationId xmlns:a16="http://schemas.microsoft.com/office/drawing/2014/main" id="{35DACB8F-1C95-4A29-AD81-9EFF3D765BAF}"/>
+                <a16:creationId xmlns:a16="http://schemas.microsoft.com/office/drawing/2014/main" xmlns="" id="{35DACB8F-1C95-4A29-AD81-9EFF3D765BAF}"/>
               </a:ext>
             </a:extLst>
           </p:cNvPr>
@@ -13460,7 +13430,7 @@
           <p:cNvPr id="59" name="Straight Connector 58">
             <a:extLst>
               <a:ext uri="{FF2B5EF4-FFF2-40B4-BE49-F238E27FC236}">
-                <a16:creationId xmlns:a16="http://schemas.microsoft.com/office/drawing/2014/main" id="{127A1BC2-3CFD-4B64-8273-515A1AA53E59}"/>
+                <a16:creationId xmlns:a16="http://schemas.microsoft.com/office/drawing/2014/main" xmlns="" id="{127A1BC2-3CFD-4B64-8273-515A1AA53E59}"/>
               </a:ext>
             </a:extLst>
           </p:cNvPr>
@@ -13496,7 +13466,7 @@
           <p:cNvPr id="60" name="Straight Connector 59">
             <a:extLst>
               <a:ext uri="{FF2B5EF4-FFF2-40B4-BE49-F238E27FC236}">
-                <a16:creationId xmlns:a16="http://schemas.microsoft.com/office/drawing/2014/main" id="{290FB555-0E5F-4BB9-BFED-1B3F2A452E92}"/>
+                <a16:creationId xmlns:a16="http://schemas.microsoft.com/office/drawing/2014/main" xmlns="" id="{290FB555-0E5F-4BB9-BFED-1B3F2A452E92}"/>
               </a:ext>
             </a:extLst>
           </p:cNvPr>
@@ -13534,7 +13504,7 @@
           <p:cNvPr id="64" name="Straight Arrow Connector 63">
             <a:extLst>
               <a:ext uri="{FF2B5EF4-FFF2-40B4-BE49-F238E27FC236}">
-                <a16:creationId xmlns:a16="http://schemas.microsoft.com/office/drawing/2014/main" id="{112FE805-0717-4E88-B5BC-7306D91F4013}"/>
+                <a16:creationId xmlns:a16="http://schemas.microsoft.com/office/drawing/2014/main" xmlns="" id="{112FE805-0717-4E88-B5BC-7306D91F4013}"/>
               </a:ext>
             </a:extLst>
           </p:cNvPr>
@@ -13575,7 +13545,7 @@
           <p:cNvPr id="66" name="Straight Arrow Connector 65">
             <a:extLst>
               <a:ext uri="{FF2B5EF4-FFF2-40B4-BE49-F238E27FC236}">
-                <a16:creationId xmlns:a16="http://schemas.microsoft.com/office/drawing/2014/main" id="{F959494D-B074-4CEB-83C0-F358C450A6ED}"/>
+                <a16:creationId xmlns:a16="http://schemas.microsoft.com/office/drawing/2014/main" xmlns="" id="{F959494D-B074-4CEB-83C0-F358C450A6ED}"/>
               </a:ext>
             </a:extLst>
           </p:cNvPr>
@@ -13616,7 +13586,7 @@
           <p:cNvPr id="70" name="Straight Arrow Connector 69">
             <a:extLst>
               <a:ext uri="{FF2B5EF4-FFF2-40B4-BE49-F238E27FC236}">
-                <a16:creationId xmlns:a16="http://schemas.microsoft.com/office/drawing/2014/main" id="{F89053ED-A2BA-41D7-ACF9-4CA9D8138FD9}"/>
+                <a16:creationId xmlns:a16="http://schemas.microsoft.com/office/drawing/2014/main" xmlns="" id="{F89053ED-A2BA-41D7-ACF9-4CA9D8138FD9}"/>
               </a:ext>
             </a:extLst>
           </p:cNvPr>
@@ -13657,7 +13627,7 @@
           <p:cNvPr id="73" name="Straight Arrow Connector 72">
             <a:extLst>
               <a:ext uri="{FF2B5EF4-FFF2-40B4-BE49-F238E27FC236}">
-                <a16:creationId xmlns:a16="http://schemas.microsoft.com/office/drawing/2014/main" id="{F6C4AEA4-DAF0-4BD3-B771-879ACEA4F7E2}"/>
+                <a16:creationId xmlns:a16="http://schemas.microsoft.com/office/drawing/2014/main" xmlns="" id="{F6C4AEA4-DAF0-4BD3-B771-879ACEA4F7E2}"/>
               </a:ext>
             </a:extLst>
           </p:cNvPr>
@@ -13749,7 +13719,7 @@
     </a:clrScheme>
     <a:fontScheme name="Office">
       <a:majorFont>
-        <a:latin typeface="Calibri Light" panose="020F0302020204030204"/>
+        <a:latin typeface="Calibri Light"/>
         <a:ea typeface=""/>
         <a:cs typeface=""/>
         <a:font script="Jpan" typeface="游ゴシック Light"/>
@@ -13801,7 +13771,7 @@
         <a:font script="Tfng" typeface="Ebrima"/>
       </a:majorFont>
       <a:minorFont>
-        <a:latin typeface="Calibri" panose="020F0502020204030204"/>
+        <a:latin typeface="Calibri"/>
         <a:ea typeface=""/>
         <a:cs typeface=""/>
         <a:font script="Jpan" typeface="游ゴシック"/>
@@ -13995,7 +13965,7 @@
   <a:extraClrSchemeLst/>
   <a:extLst>
     <a:ext uri="{05A4C25C-085E-4340-85A3-A5531E510DB2}">
-      <thm15:themeFamily xmlns:thm15="http://schemas.microsoft.com/office/thememl/2012/main" name="Office Theme" id="{62F939B6-93AF-4DB8-9C6B-D6C7DFDC589F}" vid="{4A3C46E8-61CC-4603-A589-7422A47A8E4A}"/>
+      <thm15:themeFamily xmlns:thm15="http://schemas.microsoft.com/office/thememl/2012/main" xmlns="" name="Office Theme" id="{62F939B6-93AF-4DB8-9C6B-D6C7DFDC589F}" vid="{4A3C46E8-61CC-4603-A589-7422A47A8E4A}"/>
     </a:ext>
   </a:extLst>
 </a:theme>
@@ -14044,7 +14014,7 @@
     </a:clrScheme>
     <a:fontScheme name="Office">
       <a:majorFont>
-        <a:latin typeface="Calibri Light" panose="020F0302020204030204"/>
+        <a:latin typeface="Calibri Light"/>
         <a:ea typeface=""/>
         <a:cs typeface=""/>
         <a:font script="Jpan" typeface="游ゴシック Light"/>
@@ -14096,7 +14066,7 @@
         <a:font script="Tfng" typeface="Ebrima"/>
       </a:majorFont>
       <a:minorFont>
-        <a:latin typeface="Calibri" panose="020F0502020204030204"/>
+        <a:latin typeface="Calibri"/>
         <a:ea typeface=""/>
         <a:cs typeface=""/>
         <a:font script="Jpan" typeface="游ゴシック"/>
@@ -14290,7 +14260,7 @@
   <a:extraClrSchemeLst/>
   <a:extLst>
     <a:ext uri="{05A4C25C-085E-4340-85A3-A5531E510DB2}">
-      <thm15:themeFamily xmlns:thm15="http://schemas.microsoft.com/office/thememl/2012/main" name="Office Theme" id="{62F939B6-93AF-4DB8-9C6B-D6C7DFDC589F}" vid="{4A3C46E8-61CC-4603-A589-7422A47A8E4A}"/>
+      <thm15:themeFamily xmlns:thm15="http://schemas.microsoft.com/office/thememl/2012/main" xmlns="" name="Office Theme" id="{62F939B6-93AF-4DB8-9C6B-D6C7DFDC589F}" vid="{4A3C46E8-61CC-4603-A589-7422A47A8E4A}"/>
     </a:ext>
   </a:extLst>
 </a:theme>

</xml_diff>

<commit_message>
[framework] adding openLteMac files document
Change description:
    1. Added functionality of openlte modules.
    2. Updated "Time_bounded_processing" slide.
</commit_message>
<xml_diff>
--- a/Doc/openlte_MAC_ARCH_.pptx
+++ b/Doc/openlte_MAC_ARCH_.pptx
@@ -5,13 +5,18 @@
     <p:sldMasterId id="2147483648" r:id="rId1"/>
   </p:sldMasterIdLst>
   <p:notesMasterIdLst>
-    <p:notesMasterId r:id="rId6"/>
+    <p:notesMasterId r:id="rId11"/>
   </p:notesMasterIdLst>
   <p:sldIdLst>
     <p:sldId id="259" r:id="rId2"/>
     <p:sldId id="261" r:id="rId3"/>
     <p:sldId id="262" r:id="rId4"/>
     <p:sldId id="258" r:id="rId5"/>
+    <p:sldId id="264" r:id="rId6"/>
+    <p:sldId id="267" r:id="rId7"/>
+    <p:sldId id="266" r:id="rId8"/>
+    <p:sldId id="263" r:id="rId9"/>
+    <p:sldId id="265" r:id="rId10"/>
   </p:sldIdLst>
   <p:sldSz cx="12192000" cy="6858000"/>
   <p:notesSz cx="6858000" cy="9144000"/>
@@ -7797,8 +7802,8 @@
         </p:nvCxnSpPr>
         <p:spPr>
           <a:xfrm flipV="1">
-            <a:off x="2424598" y="5014850"/>
-            <a:ext cx="0" cy="951920"/>
+            <a:off x="2416839" y="4011054"/>
+            <a:ext cx="5252" cy="1068770"/>
           </a:xfrm>
           <a:prstGeom prst="straightConnector1">
             <a:avLst/>
@@ -7838,8 +7843,8 @@
         </p:nvCxnSpPr>
         <p:spPr>
           <a:xfrm flipV="1">
-            <a:off x="3342262" y="5014852"/>
-            <a:ext cx="0" cy="951918"/>
+            <a:off x="3336184" y="4024933"/>
+            <a:ext cx="8939" cy="1073848"/>
           </a:xfrm>
           <a:prstGeom prst="straightConnector1">
             <a:avLst/>
@@ -7877,7 +7882,7 @@
         </p:nvSpPr>
         <p:spPr>
           <a:xfrm>
-            <a:off x="2092044" y="4139770"/>
+            <a:off x="2106314" y="5067255"/>
             <a:ext cx="3152308" cy="875079"/>
           </a:xfrm>
           <a:prstGeom prst="rect">
@@ -7926,7 +7931,7 @@
         </p:nvSpPr>
         <p:spPr>
           <a:xfrm rot="16200000">
-            <a:off x="3143684" y="5206240"/>
+            <a:off x="3157564" y="4117592"/>
             <a:ext cx="546945" cy="246221"/>
           </a:xfrm>
           <a:prstGeom prst="rect">
@@ -7960,8 +7965,8 @@
         </p:nvSpPr>
         <p:spPr>
           <a:xfrm rot="16200000">
-            <a:off x="2071526" y="5234572"/>
-            <a:ext cx="861133" cy="246221"/>
+            <a:off x="4020986" y="4194447"/>
+            <a:ext cx="770202" cy="246221"/>
           </a:xfrm>
           <a:prstGeom prst="rect">
             <a:avLst/>
@@ -8164,25 +8169,148 @@
           </a:p>
         </p:txBody>
       </p:sp>
+      <p:sp>
+        <p:nvSpPr>
+          <p:cNvPr id="113" name="Rectangle 112">
+            <a:extLst>
+              <a:ext uri="{FF2B5EF4-FFF2-40B4-BE49-F238E27FC236}">
+                <a16:creationId xmlns:a16="http://schemas.microsoft.com/office/drawing/2014/main" xmlns="" id="{E2671C83-AD96-4835-B5FC-0945555727C3}"/>
+              </a:ext>
+            </a:extLst>
+          </p:cNvPr>
+          <p:cNvSpPr/>
+          <p:nvPr/>
+        </p:nvSpPr>
+        <p:spPr>
+          <a:xfrm>
+            <a:off x="6643998" y="3441434"/>
+            <a:ext cx="3179876" cy="1460323"/>
+          </a:xfrm>
+          <a:prstGeom prst="rect">
+            <a:avLst/>
+          </a:prstGeom>
+        </p:spPr>
+        <p:style>
+          <a:lnRef idx="2">
+            <a:schemeClr val="accent1">
+              <a:shade val="50000"/>
+            </a:schemeClr>
+          </a:lnRef>
+          <a:fillRef idx="1">
+            <a:schemeClr val="accent1"/>
+          </a:fillRef>
+          <a:effectRef idx="0">
+            <a:schemeClr val="accent1"/>
+          </a:effectRef>
+          <a:fontRef idx="minor">
+            <a:schemeClr val="lt1"/>
+          </a:fontRef>
+        </p:style>
+        <p:txBody>
+          <a:bodyPr rtlCol="0" anchor="ctr"/>
+          <a:lstStyle/>
+          <a:p>
+            <a:pPr algn="ctr"/>
+            <a:r>
+              <a:rPr lang="en-US" dirty="0"/>
+              <a:t>DL scheduler</a:t>
+            </a:r>
+            <a:endParaRPr lang="en-US" dirty="0"/>
+          </a:p>
+        </p:txBody>
+      </p:sp>
+      <p:sp>
+        <p:nvSpPr>
+          <p:cNvPr id="118" name="Rectangle 117">
+            <a:extLst>
+              <a:ext uri="{FF2B5EF4-FFF2-40B4-BE49-F238E27FC236}">
+                <a16:creationId xmlns:a16="http://schemas.microsoft.com/office/drawing/2014/main" xmlns="" id="{9C8A4265-C203-42C6-BEE3-591409956EB8}"/>
+              </a:ext>
+            </a:extLst>
+          </p:cNvPr>
+          <p:cNvSpPr/>
+          <p:nvPr/>
+        </p:nvSpPr>
+        <p:spPr>
+          <a:xfrm>
+            <a:off x="5499501" y="3596001"/>
+            <a:ext cx="1428270" cy="246221"/>
+          </a:xfrm>
+          <a:prstGeom prst="rect">
+            <a:avLst/>
+          </a:prstGeom>
+        </p:spPr>
+        <p:txBody>
+          <a:bodyPr wrap="square">
+            <a:spAutoFit/>
+          </a:bodyPr>
+          <a:lstStyle/>
+          <a:p>
+            <a:r>
+              <a:rPr lang="en-US" sz="1000" dirty="0"/>
+              <a:t>PUCCH </a:t>
+            </a:r>
+            <a:r>
+              <a:rPr lang="en-US" sz="1000" dirty="0" smtClean="0"/>
+              <a:t>/PUSCHTPC</a:t>
+            </a:r>
+            <a:endParaRPr lang="en-US" sz="1000" dirty="0"/>
+          </a:p>
+        </p:txBody>
+      </p:sp>
+      <p:sp>
+        <p:nvSpPr>
+          <p:cNvPr id="119" name="Rectangle 118">
+            <a:extLst>
+              <a:ext uri="{FF2B5EF4-FFF2-40B4-BE49-F238E27FC236}">
+                <a16:creationId xmlns:a16="http://schemas.microsoft.com/office/drawing/2014/main" xmlns="" id="{234305EB-C127-4BAD-A029-C6CC4EEE3F75}"/>
+              </a:ext>
+            </a:extLst>
+          </p:cNvPr>
+          <p:cNvSpPr/>
+          <p:nvPr/>
+        </p:nvSpPr>
+        <p:spPr>
+          <a:xfrm>
+            <a:off x="7614304" y="5204173"/>
+            <a:ext cx="744581" cy="246221"/>
+          </a:xfrm>
+          <a:prstGeom prst="rect">
+            <a:avLst/>
+          </a:prstGeom>
+        </p:spPr>
+        <p:txBody>
+          <a:bodyPr wrap="square">
+            <a:spAutoFit/>
+          </a:bodyPr>
+          <a:lstStyle/>
+          <a:p>
+            <a:r>
+              <a:rPr lang="en-US" sz="1000" dirty="0"/>
+              <a:t>HARQ-fbk</a:t>
+            </a:r>
+          </a:p>
+        </p:txBody>
+      </p:sp>
       <p:cxnSp>
         <p:nvCxnSpPr>
-          <p:cNvPr id="109" name="Straight Arrow Connector 108">
-            <a:extLst>
-              <a:ext uri="{FF2B5EF4-FFF2-40B4-BE49-F238E27FC236}">
-                <a16:creationId xmlns:a16="http://schemas.microsoft.com/office/drawing/2014/main" xmlns="" id="{9421061F-3DD6-459D-8BDD-6269A0348038}"/>
+          <p:cNvPr id="134" name="Straight Arrow Connector 133">
+            <a:extLst>
+              <a:ext uri="{FF2B5EF4-FFF2-40B4-BE49-F238E27FC236}">
+                <a16:creationId xmlns:a16="http://schemas.microsoft.com/office/drawing/2014/main" xmlns="" id="{989AF34C-0854-4E08-8557-441F5F51E960}"/>
               </a:ext>
             </a:extLst>
           </p:cNvPr>
           <p:cNvCxnSpPr>
             <a:cxnSpLocks/>
-            <a:endCxn id="113" idx="2"/>
+            <a:stCxn id="149" idx="3"/>
           </p:cNvCxnSpPr>
           <p:nvPr/>
         </p:nvCxnSpPr>
         <p:spPr>
-          <a:xfrm flipH="1" flipV="1">
-            <a:off x="8233936" y="5019763"/>
-            <a:ext cx="17900" cy="947007"/>
+          <a:xfrm>
+            <a:off x="5241322" y="3631710"/>
+            <a:ext cx="1407283" cy="4609"/>
           </a:xfrm>
           <a:prstGeom prst="straightConnector1">
             <a:avLst/>
@@ -8208,10 +8336,10 @@
       </p:cxnSp>
       <p:sp>
         <p:nvSpPr>
-          <p:cNvPr id="113" name="Rectangle 112">
-            <a:extLst>
-              <a:ext uri="{FF2B5EF4-FFF2-40B4-BE49-F238E27FC236}">
-                <a16:creationId xmlns:a16="http://schemas.microsoft.com/office/drawing/2014/main" xmlns="" id="{E2671C83-AD96-4835-B5FC-0945555727C3}"/>
+          <p:cNvPr id="145" name="Rectangle 144">
+            <a:extLst>
+              <a:ext uri="{FF2B5EF4-FFF2-40B4-BE49-F238E27FC236}">
+                <a16:creationId xmlns:a16="http://schemas.microsoft.com/office/drawing/2014/main" xmlns="" id="{DB338DE7-A646-4FA8-AA05-F9AE5B2C256C}"/>
               </a:ext>
             </a:extLst>
           </p:cNvPr>
@@ -8220,129 +8348,44 @@
         </p:nvSpPr>
         <p:spPr>
           <a:xfrm>
-            <a:off x="6643998" y="4144685"/>
-            <a:ext cx="3179876" cy="875078"/>
+            <a:off x="6252340" y="4291292"/>
+            <a:ext cx="320922" cy="246221"/>
           </a:xfrm>
           <a:prstGeom prst="rect">
             <a:avLst/>
           </a:prstGeom>
         </p:spPr>
-        <p:style>
-          <a:lnRef idx="2">
-            <a:schemeClr val="accent1">
-              <a:shade val="50000"/>
-            </a:schemeClr>
-          </a:lnRef>
-          <a:fillRef idx="1">
-            <a:schemeClr val="accent1"/>
-          </a:fillRef>
-          <a:effectRef idx="0">
-            <a:schemeClr val="accent1"/>
-          </a:effectRef>
-          <a:fontRef idx="minor">
-            <a:schemeClr val="lt1"/>
-          </a:fontRef>
-        </p:style>
-        <p:txBody>
-          <a:bodyPr rtlCol="0" anchor="ctr"/>
-          <a:lstStyle/>
-          <a:p>
-            <a:pPr algn="ctr"/>
-            <a:r>
-              <a:rPr lang="en-US" dirty="0"/>
-              <a:t>DL MAC</a:t>
-            </a:r>
-          </a:p>
-        </p:txBody>
-      </p:sp>
-      <p:sp>
-        <p:nvSpPr>
-          <p:cNvPr id="118" name="Rectangle 117">
-            <a:extLst>
-              <a:ext uri="{FF2B5EF4-FFF2-40B4-BE49-F238E27FC236}">
-                <a16:creationId xmlns:a16="http://schemas.microsoft.com/office/drawing/2014/main" xmlns="" id="{9C8A4265-C203-42C6-BEE3-591409956EB8}"/>
-              </a:ext>
-            </a:extLst>
-          </p:cNvPr>
-          <p:cNvSpPr/>
-          <p:nvPr/>
-        </p:nvSpPr>
-        <p:spPr>
-          <a:xfrm>
-            <a:off x="5887445" y="3589061"/>
-            <a:ext cx="1040325" cy="246221"/>
-          </a:xfrm>
-          <a:prstGeom prst="rect">
-            <a:avLst/>
-          </a:prstGeom>
-        </p:spPr>
-        <p:txBody>
-          <a:bodyPr wrap="square">
+        <p:txBody>
+          <a:bodyPr wrap="none">
             <a:spAutoFit/>
           </a:bodyPr>
           <a:lstStyle/>
           <a:p>
             <a:r>
               <a:rPr lang="en-US" sz="1000" dirty="0"/>
-              <a:t>PUCCH TPC</a:t>
-            </a:r>
-          </a:p>
-        </p:txBody>
-      </p:sp>
-      <p:sp>
-        <p:nvSpPr>
-          <p:cNvPr id="119" name="Rectangle 118">
-            <a:extLst>
-              <a:ext uri="{FF2B5EF4-FFF2-40B4-BE49-F238E27FC236}">
-                <a16:creationId xmlns:a16="http://schemas.microsoft.com/office/drawing/2014/main" xmlns="" id="{234305EB-C127-4BAD-A029-C6CC4EEE3F75}"/>
-              </a:ext>
-            </a:extLst>
-          </p:cNvPr>
-          <p:cNvSpPr/>
-          <p:nvPr/>
-        </p:nvSpPr>
-        <p:spPr>
-          <a:xfrm rot="16200000">
-            <a:off x="8002656" y="5204173"/>
-            <a:ext cx="744581" cy="246221"/>
-          </a:xfrm>
-          <a:prstGeom prst="rect">
-            <a:avLst/>
-          </a:prstGeom>
-        </p:spPr>
-        <p:txBody>
-          <a:bodyPr wrap="square">
-            <a:spAutoFit/>
-          </a:bodyPr>
-          <a:lstStyle/>
-          <a:p>
-            <a:r>
-              <a:rPr lang="en-US" sz="1000" dirty="0"/>
-              <a:t>HARQ-fbk</a:t>
+              <a:t>TA</a:t>
             </a:r>
           </a:p>
         </p:txBody>
       </p:sp>
       <p:cxnSp>
         <p:nvCxnSpPr>
-          <p:cNvPr id="134" name="Straight Arrow Connector 133">
-            <a:extLst>
-              <a:ext uri="{FF2B5EF4-FFF2-40B4-BE49-F238E27FC236}">
-                <a16:creationId xmlns:a16="http://schemas.microsoft.com/office/drawing/2014/main" xmlns="" id="{989AF34C-0854-4E08-8557-441F5F51E960}"/>
+          <p:cNvPr id="146" name="Straight Arrow Connector 145">
+            <a:extLst>
+              <a:ext uri="{FF2B5EF4-FFF2-40B4-BE49-F238E27FC236}">
+                <a16:creationId xmlns:a16="http://schemas.microsoft.com/office/drawing/2014/main" xmlns="" id="{4D2B8F19-642D-486D-8A59-032AA91E016A}"/>
               </a:ext>
             </a:extLst>
           </p:cNvPr>
           <p:cNvCxnSpPr>
             <a:cxnSpLocks/>
-            <a:stCxn id="149" idx="3"/>
-            <a:endCxn id="150" idx="1"/>
           </p:cNvCxnSpPr>
           <p:nvPr/>
         </p:nvCxnSpPr>
         <p:spPr>
           <a:xfrm>
-            <a:off x="5241322" y="3591375"/>
-            <a:ext cx="1417974" cy="5996"/>
+            <a:off x="4795765" y="4312164"/>
+            <a:ext cx="1836090" cy="12245"/>
           </a:xfrm>
           <a:prstGeom prst="straightConnector1">
             <a:avLst/>
@@ -8368,10 +8411,10 @@
       </p:cxnSp>
       <p:sp>
         <p:nvSpPr>
-          <p:cNvPr id="145" name="Rectangle 144">
-            <a:extLst>
-              <a:ext uri="{FF2B5EF4-FFF2-40B4-BE49-F238E27FC236}">
-                <a16:creationId xmlns:a16="http://schemas.microsoft.com/office/drawing/2014/main" xmlns="" id="{DB338DE7-A646-4FA8-AA05-F9AE5B2C256C}"/>
+          <p:cNvPr id="147" name="Rectangle 146">
+            <a:extLst>
+              <a:ext uri="{FF2B5EF4-FFF2-40B4-BE49-F238E27FC236}">
+                <a16:creationId xmlns:a16="http://schemas.microsoft.com/office/drawing/2014/main" xmlns="" id="{0FF90299-0ED7-4E43-BCE0-98A9909ABC6F}"/>
               </a:ext>
             </a:extLst>
           </p:cNvPr>
@@ -8380,8 +8423,8 @@
         </p:nvSpPr>
         <p:spPr>
           <a:xfrm>
-            <a:off x="6252340" y="4291292"/>
-            <a:ext cx="320922" cy="246221"/>
+            <a:off x="5937877" y="4754726"/>
+            <a:ext cx="716863" cy="246221"/>
           </a:xfrm>
           <a:prstGeom prst="rect">
             <a:avLst/>
@@ -8395,17 +8438,17 @@
           <a:p>
             <a:r>
               <a:rPr lang="en-US" sz="1000" dirty="0"/>
-              <a:t>TA</a:t>
+              <a:t>RACH-info</a:t>
             </a:r>
           </a:p>
         </p:txBody>
       </p:sp>
       <p:cxnSp>
         <p:nvCxnSpPr>
-          <p:cNvPr id="146" name="Straight Arrow Connector 145">
-            <a:extLst>
-              <a:ext uri="{FF2B5EF4-FFF2-40B4-BE49-F238E27FC236}">
-                <a16:creationId xmlns:a16="http://schemas.microsoft.com/office/drawing/2014/main" xmlns="" id="{4D2B8F19-642D-486D-8A59-032AA91E016A}"/>
+          <p:cNvPr id="148" name="Straight Arrow Connector 147">
+            <a:extLst>
+              <a:ext uri="{FF2B5EF4-FFF2-40B4-BE49-F238E27FC236}">
+                <a16:creationId xmlns:a16="http://schemas.microsoft.com/office/drawing/2014/main" xmlns="" id="{B235F928-BA83-464A-888C-F18A55064B6E}"/>
               </a:ext>
             </a:extLst>
           </p:cNvPr>
@@ -8416,8 +8459,8 @@
         </p:nvCxnSpPr>
         <p:spPr>
           <a:xfrm>
-            <a:off x="5253597" y="4324409"/>
-            <a:ext cx="1378258" cy="0"/>
+            <a:off x="4313524" y="4784588"/>
+            <a:ext cx="2339999" cy="7187"/>
           </a:xfrm>
           <a:prstGeom prst="straightConnector1">
             <a:avLst/>
@@ -8443,10 +8486,10 @@
       </p:cxnSp>
       <p:sp>
         <p:nvSpPr>
-          <p:cNvPr id="147" name="Rectangle 146">
-            <a:extLst>
-              <a:ext uri="{FF2B5EF4-FFF2-40B4-BE49-F238E27FC236}">
-                <a16:creationId xmlns:a16="http://schemas.microsoft.com/office/drawing/2014/main" xmlns="" id="{0FF90299-0ED7-4E43-BCE0-98A9909ABC6F}"/>
+          <p:cNvPr id="149" name="Rectangle 148">
+            <a:extLst>
+              <a:ext uri="{FF2B5EF4-FFF2-40B4-BE49-F238E27FC236}">
+                <a16:creationId xmlns:a16="http://schemas.microsoft.com/office/drawing/2014/main" xmlns="" id="{9B2169FD-73B5-4B54-B10F-04FA05D4FD8B}"/>
               </a:ext>
             </a:extLst>
           </p:cNvPr>
@@ -8455,44 +8498,109 @@
         </p:nvSpPr>
         <p:spPr>
           <a:xfrm>
-            <a:off x="5937877" y="4754726"/>
-            <a:ext cx="716863" cy="246221"/>
+            <a:off x="2092043" y="3253844"/>
+            <a:ext cx="3149279" cy="755731"/>
           </a:xfrm>
           <a:prstGeom prst="rect">
             <a:avLst/>
           </a:prstGeom>
         </p:spPr>
-        <p:txBody>
-          <a:bodyPr wrap="none">
-            <a:spAutoFit/>
-          </a:bodyPr>
-          <a:lstStyle/>
-          <a:p>
-            <a:r>
-              <a:rPr lang="en-US" sz="1000" dirty="0"/>
-              <a:t>RACH-info</a:t>
+        <p:style>
+          <a:lnRef idx="2">
+            <a:schemeClr val="accent1">
+              <a:shade val="50000"/>
+            </a:schemeClr>
+          </a:lnRef>
+          <a:fillRef idx="1">
+            <a:schemeClr val="accent1"/>
+          </a:fillRef>
+          <a:effectRef idx="0">
+            <a:schemeClr val="accent1"/>
+          </a:effectRef>
+          <a:fontRef idx="minor">
+            <a:schemeClr val="lt1"/>
+          </a:fontRef>
+        </p:style>
+        <p:txBody>
+          <a:bodyPr rtlCol="0" anchor="ctr"/>
+          <a:lstStyle/>
+          <a:p>
+            <a:pPr algn="ctr"/>
+            <a:r>
+              <a:rPr lang="en-US" dirty="0"/>
+              <a:t>UL scheduler</a:t>
+            </a:r>
+          </a:p>
+        </p:txBody>
+      </p:sp>
+      <p:sp>
+        <p:nvSpPr>
+          <p:cNvPr id="153" name="Rectangle 152">
+            <a:extLst>
+              <a:ext uri="{FF2B5EF4-FFF2-40B4-BE49-F238E27FC236}">
+                <a16:creationId xmlns:a16="http://schemas.microsoft.com/office/drawing/2014/main" xmlns="" id="{E286E484-271B-4333-BD28-7A943135AF65}"/>
+              </a:ext>
+            </a:extLst>
+          </p:cNvPr>
+          <p:cNvSpPr/>
+          <p:nvPr/>
+        </p:nvSpPr>
+        <p:spPr>
+          <a:xfrm>
+            <a:off x="2092043" y="2568292"/>
+            <a:ext cx="7680068" cy="339365"/>
+          </a:xfrm>
+          <a:prstGeom prst="rect">
+            <a:avLst/>
+          </a:prstGeom>
+        </p:spPr>
+        <p:style>
+          <a:lnRef idx="2">
+            <a:schemeClr val="accent1">
+              <a:shade val="50000"/>
+            </a:schemeClr>
+          </a:lnRef>
+          <a:fillRef idx="1">
+            <a:schemeClr val="accent1"/>
+          </a:fillRef>
+          <a:effectRef idx="0">
+            <a:schemeClr val="accent1"/>
+          </a:effectRef>
+          <a:fontRef idx="minor">
+            <a:schemeClr val="lt1"/>
+          </a:fontRef>
+        </p:style>
+        <p:txBody>
+          <a:bodyPr rtlCol="0" anchor="ctr"/>
+          <a:lstStyle/>
+          <a:p>
+            <a:pPr algn="ctr"/>
+            <a:r>
+              <a:rPr lang="en-US" dirty="0"/>
+              <a:t>    PDCCH     allocator</a:t>
             </a:r>
           </a:p>
         </p:txBody>
       </p:sp>
       <p:cxnSp>
         <p:nvCxnSpPr>
-          <p:cNvPr id="148" name="Straight Arrow Connector 147">
-            <a:extLst>
-              <a:ext uri="{FF2B5EF4-FFF2-40B4-BE49-F238E27FC236}">
-                <a16:creationId xmlns:a16="http://schemas.microsoft.com/office/drawing/2014/main" xmlns="" id="{B235F928-BA83-464A-888C-F18A55064B6E}"/>
+          <p:cNvPr id="168" name="Straight Arrow Connector 167">
+            <a:extLst>
+              <a:ext uri="{FF2B5EF4-FFF2-40B4-BE49-F238E27FC236}">
+                <a16:creationId xmlns:a16="http://schemas.microsoft.com/office/drawing/2014/main" xmlns="" id="{A0514AD2-8294-4C50-8138-0C3FB0341DEF}"/>
               </a:ext>
             </a:extLst>
           </p:cNvPr>
           <p:cNvCxnSpPr>
             <a:cxnSpLocks/>
+            <a:stCxn id="113" idx="0"/>
           </p:cNvCxnSpPr>
           <p:nvPr/>
         </p:nvCxnSpPr>
         <p:spPr>
-          <a:xfrm>
-            <a:off x="5253876" y="4786860"/>
-            <a:ext cx="1399647" cy="4914"/>
+          <a:xfrm flipH="1" flipV="1">
+            <a:off x="8228583" y="2907467"/>
+            <a:ext cx="5353" cy="533967"/>
           </a:xfrm>
           <a:prstGeom prst="straightConnector1">
             <a:avLst/>
@@ -8518,10 +8626,10 @@
       </p:cxnSp>
       <p:sp>
         <p:nvSpPr>
-          <p:cNvPr id="149" name="Rectangle 148">
-            <a:extLst>
-              <a:ext uri="{FF2B5EF4-FFF2-40B4-BE49-F238E27FC236}">
-                <a16:creationId xmlns:a16="http://schemas.microsoft.com/office/drawing/2014/main" xmlns="" id="{9B2169FD-73B5-4B54-B10F-04FA05D4FD8B}"/>
+          <p:cNvPr id="182" name="Rectangle 181">
+            <a:extLst>
+              <a:ext uri="{FF2B5EF4-FFF2-40B4-BE49-F238E27FC236}">
+                <a16:creationId xmlns:a16="http://schemas.microsoft.com/office/drawing/2014/main" xmlns="" id="{D010CD2E-D89B-41D0-AE2D-B5027711FB0A}"/>
               </a:ext>
             </a:extLst>
           </p:cNvPr>
@@ -8530,7 +8638,7 @@
         </p:nvSpPr>
         <p:spPr>
           <a:xfrm>
-            <a:off x="2092043" y="3421692"/>
+            <a:off x="2090839" y="1862317"/>
             <a:ext cx="3149279" cy="339365"/>
           </a:xfrm>
           <a:prstGeom prst="rect">
@@ -8560,17 +8668,17 @@
             <a:pPr algn="ctr"/>
             <a:r>
               <a:rPr lang="en-US" dirty="0"/>
-              <a:t>UL scheduler</a:t>
-            </a:r>
-          </a:p>
-        </p:txBody>
-      </p:sp>
-      <p:sp>
-        <p:nvSpPr>
-          <p:cNvPr id="150" name="Rectangle 149">
-            <a:extLst>
-              <a:ext uri="{FF2B5EF4-FFF2-40B4-BE49-F238E27FC236}">
-                <a16:creationId xmlns:a16="http://schemas.microsoft.com/office/drawing/2014/main" xmlns="" id="{9876AABE-AB9D-4137-A897-A4602B731D43}"/>
+              <a:t>UL RB allocator</a:t>
+            </a:r>
+          </a:p>
+        </p:txBody>
+      </p:sp>
+      <p:sp>
+        <p:nvSpPr>
+          <p:cNvPr id="183" name="Rectangle 182">
+            <a:extLst>
+              <a:ext uri="{FF2B5EF4-FFF2-40B4-BE49-F238E27FC236}">
+                <a16:creationId xmlns:a16="http://schemas.microsoft.com/office/drawing/2014/main" xmlns="" id="{CD3BAC67-5F02-4D95-B1C8-55AA974759DF}"/>
               </a:ext>
             </a:extLst>
           </p:cNvPr>
@@ -8579,8 +8687,8 @@
         </p:nvSpPr>
         <p:spPr>
           <a:xfrm>
-            <a:off x="6659296" y="3427688"/>
-            <a:ext cx="3149279" cy="339365"/>
+            <a:off x="7111999" y="1862316"/>
+            <a:ext cx="2677365" cy="339365"/>
           </a:xfrm>
           <a:prstGeom prst="rect">
             <a:avLst/>
@@ -8609,17 +8717,17 @@
             <a:pPr algn="ctr"/>
             <a:r>
               <a:rPr lang="en-US" dirty="0"/>
-              <a:t>DL scheduler</a:t>
-            </a:r>
-          </a:p>
-        </p:txBody>
-      </p:sp>
-      <p:sp>
-        <p:nvSpPr>
-          <p:cNvPr id="153" name="Rectangle 152">
-            <a:extLst>
-              <a:ext uri="{FF2B5EF4-FFF2-40B4-BE49-F238E27FC236}">
-                <a16:creationId xmlns:a16="http://schemas.microsoft.com/office/drawing/2014/main" xmlns="" id="{E286E484-271B-4333-BD28-7A943135AF65}"/>
+              <a:t>DL RB allocator</a:t>
+            </a:r>
+          </a:p>
+        </p:txBody>
+      </p:sp>
+      <p:sp>
+        <p:nvSpPr>
+          <p:cNvPr id="184" name="Rectangle 183">
+            <a:extLst>
+              <a:ext uri="{FF2B5EF4-FFF2-40B4-BE49-F238E27FC236}">
+                <a16:creationId xmlns:a16="http://schemas.microsoft.com/office/drawing/2014/main" xmlns="" id="{4EFD5E2D-283C-4E9B-8F1D-C26B2F3BA019}"/>
               </a:ext>
             </a:extLst>
           </p:cNvPr>
@@ -8628,8 +8736,8 @@
         </p:nvSpPr>
         <p:spPr>
           <a:xfrm>
-            <a:off x="2092043" y="2568292"/>
-            <a:ext cx="7680068" cy="339365"/>
+            <a:off x="6643144" y="577273"/>
+            <a:ext cx="3149279" cy="498210"/>
           </a:xfrm>
           <a:prstGeom prst="rect">
             <a:avLst/>
@@ -8657,242 +8765,14 @@
           <a:p>
             <a:pPr algn="ctr"/>
             <a:r>
+              <a:rPr lang="en-US" dirty="0" smtClean="0"/>
+              <a:t>DL </a:t>
+            </a:r>
+            <a:r>
               <a:rPr lang="en-US" dirty="0"/>
-              <a:t>    PDCCH     allocator</a:t>
-            </a:r>
-          </a:p>
-        </p:txBody>
-      </p:sp>
-      <p:cxnSp>
-        <p:nvCxnSpPr>
-          <p:cNvPr id="167" name="Straight Arrow Connector 166">
-            <a:extLst>
-              <a:ext uri="{FF2B5EF4-FFF2-40B4-BE49-F238E27FC236}">
-                <a16:creationId xmlns:a16="http://schemas.microsoft.com/office/drawing/2014/main" xmlns="" id="{9BBCA4D2-7C41-4A99-B33D-3F490299227D}"/>
-              </a:ext>
-            </a:extLst>
-          </p:cNvPr>
-          <p:cNvCxnSpPr>
-            <a:cxnSpLocks/>
-            <a:stCxn id="83" idx="0"/>
-            <a:endCxn id="149" idx="2"/>
-          </p:cNvCxnSpPr>
-          <p:nvPr/>
-        </p:nvCxnSpPr>
-        <p:spPr>
-          <a:xfrm flipH="1" flipV="1">
-            <a:off x="3666683" y="3761057"/>
-            <a:ext cx="1515" cy="378713"/>
-          </a:xfrm>
-          <a:prstGeom prst="straightConnector1">
-            <a:avLst/>
-          </a:prstGeom>
-          <a:ln>
-            <a:tailEnd type="triangle"/>
-          </a:ln>
-        </p:spPr>
-        <p:style>
-          <a:lnRef idx="3">
-            <a:schemeClr val="accent2"/>
-          </a:lnRef>
-          <a:fillRef idx="0">
-            <a:schemeClr val="accent2"/>
-          </a:fillRef>
-          <a:effectRef idx="2">
-            <a:schemeClr val="accent2"/>
-          </a:effectRef>
-          <a:fontRef idx="minor">
-            <a:schemeClr val="tx1"/>
-          </a:fontRef>
-        </p:style>
-      </p:cxnSp>
-      <p:cxnSp>
-        <p:nvCxnSpPr>
-          <p:cNvPr id="168" name="Straight Arrow Connector 167">
-            <a:extLst>
-              <a:ext uri="{FF2B5EF4-FFF2-40B4-BE49-F238E27FC236}">
-                <a16:creationId xmlns:a16="http://schemas.microsoft.com/office/drawing/2014/main" xmlns="" id="{A0514AD2-8294-4C50-8138-0C3FB0341DEF}"/>
-              </a:ext>
-            </a:extLst>
-          </p:cNvPr>
-          <p:cNvCxnSpPr>
-            <a:cxnSpLocks/>
-            <a:stCxn id="113" idx="0"/>
-            <a:endCxn id="150" idx="2"/>
-          </p:cNvCxnSpPr>
-          <p:nvPr/>
-        </p:nvCxnSpPr>
-        <p:spPr>
-          <a:xfrm flipV="1">
-            <a:off x="8233936" y="3767053"/>
-            <a:ext cx="0" cy="377632"/>
-          </a:xfrm>
-          <a:prstGeom prst="straightConnector1">
-            <a:avLst/>
-          </a:prstGeom>
-          <a:ln>
-            <a:tailEnd type="triangle"/>
-          </a:ln>
-        </p:spPr>
-        <p:style>
-          <a:lnRef idx="3">
-            <a:schemeClr val="accent2"/>
-          </a:lnRef>
-          <a:fillRef idx="0">
-            <a:schemeClr val="accent2"/>
-          </a:fillRef>
-          <a:effectRef idx="2">
-            <a:schemeClr val="accent2"/>
-          </a:effectRef>
-          <a:fontRef idx="minor">
-            <a:schemeClr val="tx1"/>
-          </a:fontRef>
-        </p:style>
-      </p:cxnSp>
-      <p:sp>
-        <p:nvSpPr>
-          <p:cNvPr id="182" name="Rectangle 181">
-            <a:extLst>
-              <a:ext uri="{FF2B5EF4-FFF2-40B4-BE49-F238E27FC236}">
-                <a16:creationId xmlns:a16="http://schemas.microsoft.com/office/drawing/2014/main" xmlns="" id="{D010CD2E-D89B-41D0-AE2D-B5027711FB0A}"/>
-              </a:ext>
-            </a:extLst>
-          </p:cNvPr>
-          <p:cNvSpPr/>
-          <p:nvPr/>
-        </p:nvSpPr>
-        <p:spPr>
-          <a:xfrm>
-            <a:off x="2090839" y="1862317"/>
-            <a:ext cx="3149279" cy="339365"/>
-          </a:xfrm>
-          <a:prstGeom prst="rect">
-            <a:avLst/>
-          </a:prstGeom>
-        </p:spPr>
-        <p:style>
-          <a:lnRef idx="2">
-            <a:schemeClr val="accent1">
-              <a:shade val="50000"/>
-            </a:schemeClr>
-          </a:lnRef>
-          <a:fillRef idx="1">
-            <a:schemeClr val="accent1"/>
-          </a:fillRef>
-          <a:effectRef idx="0">
-            <a:schemeClr val="accent1"/>
-          </a:effectRef>
-          <a:fontRef idx="minor">
-            <a:schemeClr val="lt1"/>
-          </a:fontRef>
-        </p:style>
-        <p:txBody>
-          <a:bodyPr rtlCol="0" anchor="ctr"/>
-          <a:lstStyle/>
-          <a:p>
-            <a:pPr algn="ctr"/>
-            <a:r>
-              <a:rPr lang="en-US" dirty="0"/>
-              <a:t>UL RB allocator</a:t>
-            </a:r>
-          </a:p>
-        </p:txBody>
-      </p:sp>
-      <p:sp>
-        <p:nvSpPr>
-          <p:cNvPr id="183" name="Rectangle 182">
-            <a:extLst>
-              <a:ext uri="{FF2B5EF4-FFF2-40B4-BE49-F238E27FC236}">
-                <a16:creationId xmlns:a16="http://schemas.microsoft.com/office/drawing/2014/main" xmlns="" id="{CD3BAC67-5F02-4D95-B1C8-55AA974759DF}"/>
-              </a:ext>
-            </a:extLst>
-          </p:cNvPr>
-          <p:cNvSpPr/>
-          <p:nvPr/>
-        </p:nvSpPr>
-        <p:spPr>
-          <a:xfrm>
-            <a:off x="6976997" y="1862316"/>
-            <a:ext cx="2812368" cy="339365"/>
-          </a:xfrm>
-          <a:prstGeom prst="rect">
-            <a:avLst/>
-          </a:prstGeom>
-        </p:spPr>
-        <p:style>
-          <a:lnRef idx="2">
-            <a:schemeClr val="accent1">
-              <a:shade val="50000"/>
-            </a:schemeClr>
-          </a:lnRef>
-          <a:fillRef idx="1">
-            <a:schemeClr val="accent1"/>
-          </a:fillRef>
-          <a:effectRef idx="0">
-            <a:schemeClr val="accent1"/>
-          </a:effectRef>
-          <a:fontRef idx="minor">
-            <a:schemeClr val="lt1"/>
-          </a:fontRef>
-        </p:style>
-        <p:txBody>
-          <a:bodyPr rtlCol="0" anchor="ctr"/>
-          <a:lstStyle/>
-          <a:p>
-            <a:pPr algn="ctr"/>
-            <a:r>
-              <a:rPr lang="en-US" dirty="0"/>
-              <a:t>DL RB allocator</a:t>
-            </a:r>
-          </a:p>
-        </p:txBody>
-      </p:sp>
-      <p:sp>
-        <p:nvSpPr>
-          <p:cNvPr id="184" name="Rectangle 183">
-            <a:extLst>
-              <a:ext uri="{FF2B5EF4-FFF2-40B4-BE49-F238E27FC236}">
-                <a16:creationId xmlns:a16="http://schemas.microsoft.com/office/drawing/2014/main" xmlns="" id="{4EFD5E2D-283C-4E9B-8F1D-C26B2F3BA019}"/>
-              </a:ext>
-            </a:extLst>
-          </p:cNvPr>
-          <p:cNvSpPr/>
-          <p:nvPr/>
-        </p:nvSpPr>
-        <p:spPr>
-          <a:xfrm>
-            <a:off x="6643144" y="736117"/>
-            <a:ext cx="3149279" cy="339365"/>
-          </a:xfrm>
-          <a:prstGeom prst="rect">
-            <a:avLst/>
-          </a:prstGeom>
-        </p:spPr>
-        <p:style>
-          <a:lnRef idx="2">
-            <a:schemeClr val="accent1">
-              <a:shade val="50000"/>
-            </a:schemeClr>
-          </a:lnRef>
-          <a:fillRef idx="1">
-            <a:schemeClr val="accent1"/>
-          </a:fillRef>
-          <a:effectRef idx="0">
-            <a:schemeClr val="accent1"/>
-          </a:effectRef>
-          <a:fontRef idx="minor">
-            <a:schemeClr val="lt1"/>
-          </a:fontRef>
-        </p:style>
-        <p:txBody>
-          <a:bodyPr rtlCol="0" anchor="ctr"/>
-          <a:lstStyle/>
-          <a:p>
-            <a:pPr algn="ctr"/>
-            <a:r>
-              <a:rPr lang="en-US" dirty="0"/>
-              <a:t>TB mux</a:t>
-            </a:r>
+              <a:t>MAC</a:t>
+            </a:r>
+            <a:endParaRPr lang="en-US" dirty="0"/>
           </a:p>
         </p:txBody>
       </p:sp>
@@ -8914,49 +8794,7 @@
         <p:spPr>
           <a:xfrm flipV="1">
             <a:off x="3666683" y="2897832"/>
-            <a:ext cx="0" cy="523860"/>
-          </a:xfrm>
-          <a:prstGeom prst="straightConnector1">
-            <a:avLst/>
-          </a:prstGeom>
-          <a:ln>
-            <a:tailEnd type="triangle"/>
-          </a:ln>
-        </p:spPr>
-        <p:style>
-          <a:lnRef idx="3">
-            <a:schemeClr val="accent2"/>
-          </a:lnRef>
-          <a:fillRef idx="0">
-            <a:schemeClr val="accent2"/>
-          </a:fillRef>
-          <a:effectRef idx="2">
-            <a:schemeClr val="accent2"/>
-          </a:effectRef>
-          <a:fontRef idx="minor">
-            <a:schemeClr val="tx1"/>
-          </a:fontRef>
-        </p:style>
-      </p:cxnSp>
-      <p:cxnSp>
-        <p:nvCxnSpPr>
-          <p:cNvPr id="190" name="Straight Arrow Connector 189">
-            <a:extLst>
-              <a:ext uri="{FF2B5EF4-FFF2-40B4-BE49-F238E27FC236}">
-                <a16:creationId xmlns:a16="http://schemas.microsoft.com/office/drawing/2014/main" xmlns="" id="{6B9A0DC5-36F0-4664-B8E5-40FC16B14FA3}"/>
-              </a:ext>
-            </a:extLst>
-          </p:cNvPr>
-          <p:cNvCxnSpPr>
-            <a:cxnSpLocks/>
-            <a:stCxn id="150" idx="0"/>
-          </p:cNvCxnSpPr>
-          <p:nvPr/>
-        </p:nvCxnSpPr>
-        <p:spPr>
-          <a:xfrm flipV="1">
-            <a:off x="8233936" y="2907657"/>
-            <a:ext cx="8950" cy="520031"/>
+            <a:ext cx="0" cy="356012"/>
           </a:xfrm>
           <a:prstGeom prst="straightConnector1">
             <a:avLst/>
@@ -9078,8 +8916,8 @@
         </p:nvSpPr>
         <p:spPr>
           <a:xfrm flipV="1">
-            <a:off x="2092043" y="461700"/>
-            <a:ext cx="7655865" cy="86928"/>
+            <a:off x="2068952" y="469514"/>
+            <a:ext cx="7706199" cy="79113"/>
           </a:xfrm>
           <a:prstGeom prst="rect">
             <a:avLst/>
@@ -9112,23 +8950,22 @@
       </p:sp>
       <p:cxnSp>
         <p:nvCxnSpPr>
-          <p:cNvPr id="199" name="Straight Arrow Connector 198">
-            <a:extLst>
-              <a:ext uri="{FF2B5EF4-FFF2-40B4-BE49-F238E27FC236}">
-                <a16:creationId xmlns:a16="http://schemas.microsoft.com/office/drawing/2014/main" xmlns="" id="{7B294C7A-0F06-4D89-8293-A90C61AD00D0}"/>
+          <p:cNvPr id="200" name="Straight Arrow Connector 199">
+            <a:extLst>
+              <a:ext uri="{FF2B5EF4-FFF2-40B4-BE49-F238E27FC236}">
+                <a16:creationId xmlns:a16="http://schemas.microsoft.com/office/drawing/2014/main" xmlns="" id="{7558A12B-4E14-477A-8DDE-8619D0E81168}"/>
               </a:ext>
             </a:extLst>
           </p:cNvPr>
           <p:cNvCxnSpPr>
             <a:cxnSpLocks/>
-            <a:stCxn id="184" idx="0"/>
           </p:cNvCxnSpPr>
           <p:nvPr/>
         </p:nvCxnSpPr>
         <p:spPr>
-          <a:xfrm flipV="1">
-            <a:off x="8217784" y="544637"/>
-            <a:ext cx="0" cy="191480"/>
+          <a:xfrm flipH="1" flipV="1">
+            <a:off x="2859316" y="3990235"/>
+            <a:ext cx="2978" cy="1089589"/>
           </a:xfrm>
           <a:prstGeom prst="straightConnector1">
             <a:avLst/>
@@ -9152,12 +8989,46 @@
           </a:fontRef>
         </p:style>
       </p:cxnSp>
+      <p:sp>
+        <p:nvSpPr>
+          <p:cNvPr id="201" name="Rectangle 200">
+            <a:extLst>
+              <a:ext uri="{FF2B5EF4-FFF2-40B4-BE49-F238E27FC236}">
+                <a16:creationId xmlns:a16="http://schemas.microsoft.com/office/drawing/2014/main" xmlns="" id="{82A92524-340B-4EE6-ABB6-EF2D5980FA47}"/>
+              </a:ext>
+            </a:extLst>
+          </p:cNvPr>
+          <p:cNvSpPr/>
+          <p:nvPr/>
+        </p:nvSpPr>
+        <p:spPr>
+          <a:xfrm rot="16200000">
+            <a:off x="2619218" y="4184115"/>
+            <a:ext cx="670376" cy="246221"/>
+          </a:xfrm>
+          <a:prstGeom prst="rect">
+            <a:avLst/>
+          </a:prstGeom>
+        </p:spPr>
+        <p:txBody>
+          <a:bodyPr wrap="none">
+            <a:spAutoFit/>
+          </a:bodyPr>
+          <a:lstStyle/>
+          <a:p>
+            <a:r>
+              <a:rPr lang="en-US" sz="1000" dirty="0"/>
+              <a:t>CRNTI-CE</a:t>
+            </a:r>
+          </a:p>
+        </p:txBody>
+      </p:sp>
       <p:cxnSp>
         <p:nvCxnSpPr>
-          <p:cNvPr id="200" name="Straight Arrow Connector 199">
-            <a:extLst>
-              <a:ext uri="{FF2B5EF4-FFF2-40B4-BE49-F238E27FC236}">
-                <a16:creationId xmlns:a16="http://schemas.microsoft.com/office/drawing/2014/main" xmlns="" id="{7558A12B-4E14-477A-8DDE-8619D0E81168}"/>
+          <p:cNvPr id="203" name="Straight Arrow Connector 202">
+            <a:extLst>
+              <a:ext uri="{FF2B5EF4-FFF2-40B4-BE49-F238E27FC236}">
+                <a16:creationId xmlns:a16="http://schemas.microsoft.com/office/drawing/2014/main" xmlns="" id="{9225B0CF-E838-413A-83F6-8650EE890565}"/>
               </a:ext>
             </a:extLst>
           </p:cNvPr>
@@ -9167,84 +9038,9 @@
           <p:nvPr/>
         </p:nvCxnSpPr>
         <p:spPr>
-          <a:xfrm flipV="1">
-            <a:off x="2864387" y="5014852"/>
-            <a:ext cx="0" cy="951918"/>
-          </a:xfrm>
-          <a:prstGeom prst="straightConnector1">
-            <a:avLst/>
-          </a:prstGeom>
-          <a:ln>
-            <a:tailEnd type="triangle"/>
-          </a:ln>
-        </p:spPr>
-        <p:style>
-          <a:lnRef idx="3">
-            <a:schemeClr val="accent2"/>
-          </a:lnRef>
-          <a:fillRef idx="0">
-            <a:schemeClr val="accent2"/>
-          </a:fillRef>
-          <a:effectRef idx="2">
-            <a:schemeClr val="accent2"/>
-          </a:effectRef>
-          <a:fontRef idx="minor">
-            <a:schemeClr val="tx1"/>
-          </a:fontRef>
-        </p:style>
-      </p:cxnSp>
-      <p:sp>
-        <p:nvSpPr>
-          <p:cNvPr id="201" name="Rectangle 200">
-            <a:extLst>
-              <a:ext uri="{FF2B5EF4-FFF2-40B4-BE49-F238E27FC236}">
-                <a16:creationId xmlns:a16="http://schemas.microsoft.com/office/drawing/2014/main" xmlns="" id="{82A92524-340B-4EE6-ABB6-EF2D5980FA47}"/>
-              </a:ext>
-            </a:extLst>
-          </p:cNvPr>
-          <p:cNvSpPr/>
-          <p:nvPr/>
-        </p:nvSpPr>
-        <p:spPr>
-          <a:xfrm rot="16200000">
-            <a:off x="2619218" y="5241275"/>
-            <a:ext cx="670376" cy="246221"/>
-          </a:xfrm>
-          <a:prstGeom prst="rect">
-            <a:avLst/>
-          </a:prstGeom>
-        </p:spPr>
-        <p:txBody>
-          <a:bodyPr wrap="none">
-            <a:spAutoFit/>
-          </a:bodyPr>
-          <a:lstStyle/>
-          <a:p>
-            <a:r>
-              <a:rPr lang="en-US" sz="1000" dirty="0"/>
-              <a:t>CRNTI-CE</a:t>
-            </a:r>
-          </a:p>
-        </p:txBody>
-      </p:sp>
-      <p:cxnSp>
-        <p:nvCxnSpPr>
-          <p:cNvPr id="203" name="Straight Arrow Connector 202">
-            <a:extLst>
-              <a:ext uri="{FF2B5EF4-FFF2-40B4-BE49-F238E27FC236}">
-                <a16:creationId xmlns:a16="http://schemas.microsoft.com/office/drawing/2014/main" xmlns="" id="{9225B0CF-E838-413A-83F6-8650EE890565}"/>
-              </a:ext>
-            </a:extLst>
-          </p:cNvPr>
-          <p:cNvCxnSpPr>
-            <a:cxnSpLocks/>
-          </p:cNvCxnSpPr>
-          <p:nvPr/>
-        </p:nvCxnSpPr>
-        <p:spPr>
-          <a:xfrm flipV="1">
-            <a:off x="3875573" y="5011675"/>
-            <a:ext cx="0" cy="951920"/>
+          <a:xfrm flipH="1" flipV="1">
+            <a:off x="3872569" y="4004114"/>
+            <a:ext cx="3034" cy="1076089"/>
           </a:xfrm>
           <a:prstGeom prst="straightConnector1">
             <a:avLst/>
@@ -9283,9 +9079,9 @@
           <p:nvPr/>
         </p:nvCxnSpPr>
         <p:spPr>
-          <a:xfrm flipV="1">
-            <a:off x="4793237" y="5011677"/>
-            <a:ext cx="0" cy="951918"/>
+          <a:xfrm flipH="1" flipV="1">
+            <a:off x="4774781" y="4004114"/>
+            <a:ext cx="20985" cy="1075711"/>
           </a:xfrm>
           <a:prstGeom prst="straightConnector1">
             <a:avLst/>
@@ -9323,7 +9119,7 @@
         </p:nvSpPr>
         <p:spPr>
           <a:xfrm rot="16200000">
-            <a:off x="4674995" y="5221408"/>
+            <a:off x="2315025" y="4079261"/>
             <a:ext cx="399468" cy="246221"/>
           </a:xfrm>
           <a:prstGeom prst="rect">
@@ -9357,7 +9153,7 @@
         </p:nvSpPr>
         <p:spPr>
           <a:xfrm rot="16200000">
-            <a:off x="3789865" y="5233337"/>
+            <a:off x="4728166" y="3999474"/>
             <a:ext cx="330188" cy="246221"/>
           </a:xfrm>
           <a:prstGeom prst="rect">
@@ -9392,9 +9188,9 @@
           <p:nvPr/>
         </p:nvCxnSpPr>
         <p:spPr>
-          <a:xfrm flipV="1">
-            <a:off x="4315362" y="5011677"/>
-            <a:ext cx="0" cy="951918"/>
+          <a:xfrm flipH="1" flipV="1">
+            <a:off x="4316735" y="3990235"/>
+            <a:ext cx="7737" cy="1073545"/>
           </a:xfrm>
           <a:prstGeom prst="straightConnector1">
             <a:avLst/>
@@ -9432,7 +9228,7 @@
         </p:nvSpPr>
         <p:spPr>
           <a:xfrm rot="16200000">
-            <a:off x="4238881" y="5228104"/>
+            <a:off x="3803922" y="4018599"/>
             <a:ext cx="312906" cy="246221"/>
           </a:xfrm>
           <a:prstGeom prst="rect">
@@ -9466,7 +9262,7 @@
         </p:nvSpPr>
         <p:spPr>
           <a:xfrm>
-            <a:off x="3633588" y="3048135"/>
+            <a:off x="3612596" y="2932679"/>
             <a:ext cx="1606530" cy="246221"/>
           </a:xfrm>
           <a:prstGeom prst="rect">
@@ -9500,7 +9296,7 @@
         </p:nvSpPr>
         <p:spPr>
           <a:xfrm>
-            <a:off x="8216036" y="2986872"/>
+            <a:off x="8195044" y="2934392"/>
             <a:ext cx="1249060" cy="246221"/>
           </a:xfrm>
           <a:prstGeom prst="rect">
@@ -9636,8 +9432,8 @@
         </p:nvSpPr>
         <p:spPr>
           <a:xfrm>
-            <a:off x="6976998" y="1317035"/>
-            <a:ext cx="2812368" cy="339366"/>
+            <a:off x="7131538" y="1317035"/>
+            <a:ext cx="2657828" cy="339366"/>
           </a:xfrm>
           <a:prstGeom prst="rect">
             <a:avLst/>
@@ -9687,9 +9483,9 @@
           <p:nvPr/>
         </p:nvCxnSpPr>
         <p:spPr>
-          <a:xfrm flipV="1">
-            <a:off x="8383182" y="1096005"/>
-            <a:ext cx="0" cy="221030"/>
+          <a:xfrm flipH="1" flipV="1">
+            <a:off x="8459968" y="1075629"/>
+            <a:ext cx="484" cy="241406"/>
           </a:xfrm>
           <a:prstGeom prst="straightConnector1">
             <a:avLst/>
@@ -9731,8 +9527,8 @@
         </p:nvCxnSpPr>
         <p:spPr>
           <a:xfrm flipV="1">
-            <a:off x="8383181" y="1656401"/>
-            <a:ext cx="1" cy="205915"/>
+            <a:off x="8450682" y="1656401"/>
+            <a:ext cx="9770" cy="205915"/>
           </a:xfrm>
           <a:prstGeom prst="straightConnector1">
             <a:avLst/>
@@ -9772,9 +9568,9 @@
           <p:nvPr/>
         </p:nvCxnSpPr>
         <p:spPr>
-          <a:xfrm flipV="1">
-            <a:off x="8380817" y="2201681"/>
-            <a:ext cx="2364" cy="357791"/>
+          <a:xfrm flipH="1" flipV="1">
+            <a:off x="8450682" y="2201681"/>
+            <a:ext cx="9286" cy="372888"/>
           </a:xfrm>
           <a:prstGeom prst="straightConnector1">
             <a:avLst/>
@@ -9814,7 +9610,7 @@
         </p:nvCxnSpPr>
         <p:spPr>
           <a:xfrm flipV="1">
-            <a:off x="6756378" y="1096005"/>
+            <a:off x="6700858" y="1096005"/>
             <a:ext cx="0" cy="1472287"/>
           </a:xfrm>
           <a:prstGeom prst="straightConnector1">
@@ -9852,9 +9648,9 @@
           <p:nvPr/>
         </p:nvSpPr>
         <p:spPr>
-          <a:xfrm>
-            <a:off x="5621244" y="1259773"/>
-            <a:ext cx="1220206" cy="246221"/>
+          <a:xfrm rot="16200000">
+            <a:off x="6478152" y="1301471"/>
+            <a:ext cx="675022" cy="246221"/>
           </a:xfrm>
           <a:prstGeom prst="rect">
             <a:avLst/>
@@ -9867,9 +9663,10 @@
           <a:lstStyle/>
           <a:p>
             <a:r>
-              <a:rPr lang="en-US" sz="1000" dirty="0"/>
-              <a:t>Scheduled Mac CE’s</a:t>
-            </a:r>
+              <a:rPr lang="en-US" sz="1000" dirty="0" smtClean="0"/>
+              <a:t>Alloc Info</a:t>
+            </a:r>
+            <a:endParaRPr lang="en-US" sz="1000" dirty="0"/>
           </a:p>
         </p:txBody>
       </p:sp>
@@ -10021,9 +9818,9 @@
           <p:nvPr/>
         </p:nvCxnSpPr>
         <p:spPr>
-          <a:xfrm flipV="1">
-            <a:off x="5919976" y="110067"/>
-            <a:ext cx="0" cy="351633"/>
+          <a:xfrm flipH="1" flipV="1">
+            <a:off x="5911273" y="100061"/>
+            <a:ext cx="10779" cy="369453"/>
           </a:xfrm>
           <a:prstGeom prst="straightConnector1">
             <a:avLst/>
@@ -10678,8 +10475,8 @@
         </p:nvSpPr>
         <p:spPr>
           <a:xfrm>
-            <a:off x="8342886" y="2280634"/>
-            <a:ext cx="2621230" cy="246221"/>
+            <a:off x="7656574" y="2280634"/>
+            <a:ext cx="2649033" cy="246221"/>
           </a:xfrm>
           <a:prstGeom prst="rect">
             <a:avLst/>
@@ -10693,7 +10490,15 @@
           <a:p>
             <a:r>
               <a:rPr lang="en-US" sz="1000" dirty="0"/>
-              <a:t>DCI allocated (FORMAT_1,1A/B/C/D, 2,2A,B/C)</a:t>
+              <a:t>DCI allocated </a:t>
+            </a:r>
+            <a:r>
+              <a:rPr lang="en-US" sz="1000" dirty="0" smtClean="0"/>
+              <a:t> (</a:t>
+            </a:r>
+            <a:r>
+              <a:rPr lang="en-US" sz="1000" dirty="0"/>
+              <a:t>FORMAT_1,1A/B/C/D, 2,2A,B/C)</a:t>
             </a:r>
           </a:p>
         </p:txBody>
@@ -10866,6 +10671,117 @@
                 </a:outerShdw>
               </a:effectLst>
             </a:endParaRPr>
+          </a:p>
+        </p:txBody>
+      </p:sp>
+      <p:cxnSp>
+        <p:nvCxnSpPr>
+          <p:cNvPr id="27" name="Elbow Connector 26"/>
+          <p:cNvCxnSpPr>
+            <a:stCxn id="83" idx="3"/>
+            <a:endCxn id="113" idx="2"/>
+          </p:cNvCxnSpPr>
+          <p:nvPr/>
+        </p:nvCxnSpPr>
+        <p:spPr>
+          <a:xfrm flipV="1">
+            <a:off x="5258622" y="4901757"/>
+            <a:ext cx="2975314" cy="603038"/>
+          </a:xfrm>
+          <a:prstGeom prst="bentConnector2">
+            <a:avLst/>
+          </a:prstGeom>
+          <a:ln>
+            <a:tailEnd type="triangle"/>
+          </a:ln>
+        </p:spPr>
+        <p:style>
+          <a:lnRef idx="3">
+            <a:schemeClr val="accent2"/>
+          </a:lnRef>
+          <a:fillRef idx="0">
+            <a:schemeClr val="accent2"/>
+          </a:fillRef>
+          <a:effectRef idx="2">
+            <a:schemeClr val="accent2"/>
+          </a:effectRef>
+          <a:fontRef idx="minor">
+            <a:schemeClr val="tx1"/>
+          </a:fontRef>
+        </p:style>
+      </p:cxnSp>
+      <p:cxnSp>
+        <p:nvCxnSpPr>
+          <p:cNvPr id="121" name="Straight Arrow Connector 120">
+            <a:extLst>
+              <a:ext uri="{FF2B5EF4-FFF2-40B4-BE49-F238E27FC236}">
+                <a16:creationId xmlns:a16="http://schemas.microsoft.com/office/drawing/2014/main" xmlns="" id="{F9A79799-E125-4DF1-A376-93B905B2C82F}"/>
+              </a:ext>
+            </a:extLst>
+          </p:cNvPr>
+          <p:cNvCxnSpPr>
+            <a:cxnSpLocks/>
+          </p:cNvCxnSpPr>
+          <p:nvPr/>
+        </p:nvCxnSpPr>
+        <p:spPr>
+          <a:xfrm flipV="1">
+            <a:off x="6908778" y="1092101"/>
+            <a:ext cx="0" cy="1472287"/>
+          </a:xfrm>
+          <a:prstGeom prst="straightConnector1">
+            <a:avLst/>
+          </a:prstGeom>
+          <a:ln>
+            <a:tailEnd type="triangle"/>
+          </a:ln>
+        </p:spPr>
+        <p:style>
+          <a:lnRef idx="3">
+            <a:schemeClr val="accent2"/>
+          </a:lnRef>
+          <a:fillRef idx="0">
+            <a:schemeClr val="accent2"/>
+          </a:fillRef>
+          <a:effectRef idx="2">
+            <a:schemeClr val="accent2"/>
+          </a:effectRef>
+          <a:fontRef idx="minor">
+            <a:schemeClr val="tx1"/>
+          </a:fontRef>
+        </p:style>
+      </p:cxnSp>
+      <p:sp>
+        <p:nvSpPr>
+          <p:cNvPr id="132" name="Rectangle 131">
+            <a:extLst>
+              <a:ext uri="{FF2B5EF4-FFF2-40B4-BE49-F238E27FC236}">
+                <a16:creationId xmlns:a16="http://schemas.microsoft.com/office/drawing/2014/main" xmlns="" id="{55950AD6-5A2C-4E71-9898-4A1755988F14}"/>
+              </a:ext>
+            </a:extLst>
+          </p:cNvPr>
+          <p:cNvSpPr/>
+          <p:nvPr/>
+        </p:nvSpPr>
+        <p:spPr>
+          <a:xfrm rot="16200000">
+            <a:off x="5979058" y="1568477"/>
+            <a:ext cx="1220206" cy="246221"/>
+          </a:xfrm>
+          <a:prstGeom prst="rect">
+            <a:avLst/>
+          </a:prstGeom>
+        </p:spPr>
+        <p:txBody>
+          <a:bodyPr wrap="none">
+            <a:spAutoFit/>
+          </a:bodyPr>
+          <a:lstStyle/>
+          <a:p>
+            <a:r>
+              <a:rPr lang="en-US" sz="1000" dirty="0"/>
+              <a:t>Scheduled Mac CE’s</a:t>
+            </a:r>
           </a:p>
         </p:txBody>
       </p:sp>
@@ -11324,7 +11240,7 @@
         <p:spPr>
           <a:xfrm>
             <a:off x="7216176" y="3325110"/>
-            <a:ext cx="543739" cy="246221"/>
+            <a:ext cx="516350" cy="246221"/>
           </a:xfrm>
           <a:prstGeom prst="rect">
             <a:avLst/>
@@ -11338,8 +11254,13 @@
           <a:p>
             <a:r>
               <a:rPr lang="en-US" sz="1000" dirty="0"/>
-              <a:t>DL-CQI</a:t>
-            </a:r>
+              <a:t>DL-</a:t>
+            </a:r>
+            <a:r>
+              <a:rPr lang="en-US" sz="1000" dirty="0" smtClean="0"/>
+              <a:t>CSI</a:t>
+            </a:r>
+            <a:endParaRPr lang="en-US" sz="1000" dirty="0"/>
           </a:p>
         </p:txBody>
       </p:sp>
@@ -13667,6 +13588,1613 @@
     <p:extLst>
       <p:ext uri="{BB962C8B-B14F-4D97-AF65-F5344CB8AC3E}">
         <p14:creationId xmlns:p14="http://schemas.microsoft.com/office/powerpoint/2010/main" val="3376825789"/>
+      </p:ext>
+    </p:extLst>
+  </p:cSld>
+  <p:clrMapOvr>
+    <a:masterClrMapping/>
+  </p:clrMapOvr>
+</p:sld>
+</file>
+
+<file path=ppt/slides/slide5.xml><?xml version="1.0" encoding="utf-8"?>
+<p:sld xmlns:a="http://schemas.openxmlformats.org/drawingml/2006/main" xmlns:r="http://schemas.openxmlformats.org/officeDocument/2006/relationships" xmlns:p="http://schemas.openxmlformats.org/presentationml/2006/main">
+  <p:cSld>
+    <p:spTree>
+      <p:nvGrpSpPr>
+        <p:cNvPr id="1" name=""/>
+        <p:cNvGrpSpPr/>
+        <p:nvPr/>
+      </p:nvGrpSpPr>
+      <p:grpSpPr>
+        <a:xfrm>
+          <a:off x="0" y="0"/>
+          <a:ext cx="0" cy="0"/>
+          <a:chOff x="0" y="0"/>
+          <a:chExt cx="0" cy="0"/>
+        </a:xfrm>
+      </p:grpSpPr>
+      <p:sp>
+        <p:nvSpPr>
+          <p:cNvPr id="2" name="Title 1"/>
+          <p:cNvSpPr>
+            <a:spLocks noGrp="1"/>
+          </p:cNvSpPr>
+          <p:nvPr>
+            <p:ph type="title"/>
+          </p:nvPr>
+        </p:nvSpPr>
+        <p:spPr/>
+        <p:txBody>
+          <a:bodyPr/>
+          <a:lstStyle/>
+          <a:p>
+            <a:r>
+              <a:rPr lang="en-US" dirty="0" smtClean="0"/>
+              <a:t>PDCCH Functions</a:t>
+            </a:r>
+            <a:endParaRPr lang="en-US" dirty="0"/>
+          </a:p>
+        </p:txBody>
+      </p:sp>
+      <p:sp>
+        <p:nvSpPr>
+          <p:cNvPr id="3" name="Content Placeholder 2"/>
+          <p:cNvSpPr>
+            <a:spLocks noGrp="1"/>
+          </p:cNvSpPr>
+          <p:nvPr>
+            <p:ph idx="1"/>
+          </p:nvPr>
+        </p:nvSpPr>
+        <p:spPr>
+          <a:xfrm>
+            <a:off x="838200" y="1825625"/>
+            <a:ext cx="10515600" cy="3097153"/>
+          </a:xfrm>
+        </p:spPr>
+        <p:txBody>
+          <a:bodyPr>
+            <a:normAutofit fontScale="77500" lnSpcReduction="20000"/>
+          </a:bodyPr>
+          <a:lstStyle/>
+          <a:p>
+            <a:r>
+              <a:rPr lang="en-US" dirty="0" smtClean="0">
+                <a:solidFill>
+                  <a:schemeClr val="accent6">
+                    <a:lumMod val="75000"/>
+                  </a:schemeClr>
+                </a:solidFill>
+              </a:rPr>
+              <a:t>Decide CFI based on number of UEs/DL data pending/UL data Pending/number of DCI alloc failures/average aggregation level.</a:t>
+            </a:r>
+          </a:p>
+          <a:p>
+            <a:r>
+              <a:rPr lang="en-US" dirty="0" smtClean="0">
+                <a:solidFill>
+                  <a:schemeClr val="accent6">
+                    <a:lumMod val="75000"/>
+                  </a:schemeClr>
+                </a:solidFill>
+              </a:rPr>
+              <a:t>Allocate DCI for RAR,SI &amp; paging.</a:t>
+            </a:r>
+          </a:p>
+          <a:p>
+            <a:r>
+              <a:rPr lang="en-US" dirty="0" smtClean="0">
+                <a:solidFill>
+                  <a:schemeClr val="accent6">
+                    <a:lumMod val="75000"/>
+                  </a:schemeClr>
+                </a:solidFill>
+              </a:rPr>
+              <a:t>Decide % of allocation between UL &amp; DL.</a:t>
+            </a:r>
+            <a:endParaRPr lang="en-US" dirty="0" smtClean="0">
+              <a:solidFill>
+                <a:srgbClr val="548235"/>
+              </a:solidFill>
+            </a:endParaRPr>
+          </a:p>
+          <a:p>
+            <a:r>
+              <a:rPr lang="en-US" dirty="0" smtClean="0">
+                <a:solidFill>
+                  <a:srgbClr val="548235"/>
+                </a:solidFill>
+              </a:rPr>
+              <a:t>Allocate DCI for UEs in UL &amp; DL scheduling list.</a:t>
+            </a:r>
+          </a:p>
+          <a:p>
+            <a:r>
+              <a:rPr lang="en-US" dirty="0" smtClean="0">
+                <a:solidFill>
+                  <a:srgbClr val="548235"/>
+                </a:solidFill>
+              </a:rPr>
+              <a:t>Send allocated list to DL-mac, DL, UL scheduler for RB allocation(FSS or non-FSS) &amp; fill DCI info.</a:t>
+            </a:r>
+          </a:p>
+          <a:p>
+            <a:r>
+              <a:rPr lang="en-US" dirty="0">
+                <a:solidFill>
+                  <a:srgbClr val="548235"/>
+                </a:solidFill>
+              </a:rPr>
+              <a:t>Ask RLC for </a:t>
+            </a:r>
+            <a:r>
+              <a:rPr lang="en-US" dirty="0" smtClean="0">
+                <a:solidFill>
+                  <a:srgbClr val="548235"/>
+                </a:solidFill>
+              </a:rPr>
+              <a:t>DL data.</a:t>
+            </a:r>
+          </a:p>
+          <a:p>
+            <a:r>
+              <a:rPr lang="en-US" dirty="0" smtClean="0">
+                <a:solidFill>
+                  <a:schemeClr val="accent5">
+                    <a:lumMod val="75000"/>
+                  </a:schemeClr>
+                </a:solidFill>
+              </a:rPr>
+              <a:t>Delete/re-schedule if multiplexing failes.</a:t>
+            </a:r>
+          </a:p>
+          <a:p>
+            <a:endParaRPr lang="en-US" dirty="0">
+              <a:solidFill>
+                <a:schemeClr val="accent6">
+                  <a:lumMod val="75000"/>
+                </a:schemeClr>
+              </a:solidFill>
+            </a:endParaRPr>
+          </a:p>
+          <a:p>
+            <a:endParaRPr lang="en-US" dirty="0" smtClean="0"/>
+          </a:p>
+          <a:p>
+            <a:endParaRPr lang="en-US" dirty="0"/>
+          </a:p>
+        </p:txBody>
+      </p:sp>
+      <p:sp>
+        <p:nvSpPr>
+          <p:cNvPr id="5" name="Hexagon 4"/>
+          <p:cNvSpPr/>
+          <p:nvPr/>
+        </p:nvSpPr>
+        <p:spPr>
+          <a:xfrm>
+            <a:off x="8779473" y="5856269"/>
+            <a:ext cx="333192" cy="273293"/>
+          </a:xfrm>
+          <a:prstGeom prst="hexagon">
+            <a:avLst/>
+          </a:prstGeom>
+          <a:solidFill>
+            <a:schemeClr val="accent5">
+              <a:lumMod val="75000"/>
+            </a:schemeClr>
+          </a:solidFill>
+        </p:spPr>
+        <p:style>
+          <a:lnRef idx="1">
+            <a:schemeClr val="accent1"/>
+          </a:lnRef>
+          <a:fillRef idx="3">
+            <a:schemeClr val="accent1"/>
+          </a:fillRef>
+          <a:effectRef idx="2">
+            <a:schemeClr val="accent1"/>
+          </a:effectRef>
+          <a:fontRef idx="minor">
+            <a:schemeClr val="lt1"/>
+          </a:fontRef>
+        </p:style>
+        <p:txBody>
+          <a:bodyPr rtlCol="0" anchor="ctr"/>
+          <a:lstStyle/>
+          <a:p>
+            <a:pPr algn="ctr"/>
+            <a:endParaRPr lang="en-US"/>
+          </a:p>
+        </p:txBody>
+      </p:sp>
+      <p:sp>
+        <p:nvSpPr>
+          <p:cNvPr id="6" name="Hexagon 5"/>
+          <p:cNvSpPr/>
+          <p:nvPr/>
+        </p:nvSpPr>
+        <p:spPr>
+          <a:xfrm>
+            <a:off x="8771573" y="5466193"/>
+            <a:ext cx="333192" cy="273293"/>
+          </a:xfrm>
+          <a:prstGeom prst="hexagon">
+            <a:avLst/>
+          </a:prstGeom>
+          <a:solidFill>
+            <a:schemeClr val="accent6">
+              <a:lumMod val="75000"/>
+            </a:schemeClr>
+          </a:solidFill>
+        </p:spPr>
+        <p:style>
+          <a:lnRef idx="1">
+            <a:schemeClr val="accent1"/>
+          </a:lnRef>
+          <a:fillRef idx="3">
+            <a:schemeClr val="accent1"/>
+          </a:fillRef>
+          <a:effectRef idx="2">
+            <a:schemeClr val="accent1"/>
+          </a:effectRef>
+          <a:fontRef idx="minor">
+            <a:schemeClr val="lt1"/>
+          </a:fontRef>
+        </p:style>
+        <p:txBody>
+          <a:bodyPr rtlCol="0" anchor="ctr"/>
+          <a:lstStyle/>
+          <a:p>
+            <a:pPr algn="ctr"/>
+            <a:endParaRPr lang="en-US">
+              <a:solidFill>
+                <a:schemeClr val="accent6">
+                  <a:lumMod val="75000"/>
+                </a:schemeClr>
+              </a:solidFill>
+            </a:endParaRPr>
+          </a:p>
+        </p:txBody>
+      </p:sp>
+      <p:sp>
+        <p:nvSpPr>
+          <p:cNvPr id="7" name="TextBox 6"/>
+          <p:cNvSpPr txBox="1"/>
+          <p:nvPr/>
+        </p:nvSpPr>
+        <p:spPr>
+          <a:xfrm>
+            <a:off x="9309693" y="5412426"/>
+            <a:ext cx="1837277" cy="369332"/>
+          </a:xfrm>
+          <a:prstGeom prst="rect">
+            <a:avLst/>
+          </a:prstGeom>
+          <a:noFill/>
+        </p:spPr>
+        <p:txBody>
+          <a:bodyPr wrap="square" rtlCol="0">
+            <a:spAutoFit/>
+          </a:bodyPr>
+          <a:lstStyle/>
+          <a:p>
+            <a:r>
+              <a:rPr lang="en-US" dirty="0" smtClean="0"/>
+              <a:t>Real Time tasks</a:t>
+            </a:r>
+            <a:endParaRPr lang="en-US" dirty="0"/>
+          </a:p>
+        </p:txBody>
+      </p:sp>
+      <p:sp>
+        <p:nvSpPr>
+          <p:cNvPr id="8" name="TextBox 7"/>
+          <p:cNvSpPr txBox="1"/>
+          <p:nvPr/>
+        </p:nvSpPr>
+        <p:spPr>
+          <a:xfrm>
+            <a:off x="9326452" y="5786747"/>
+            <a:ext cx="2252095" cy="369332"/>
+          </a:xfrm>
+          <a:prstGeom prst="rect">
+            <a:avLst/>
+          </a:prstGeom>
+          <a:noFill/>
+        </p:spPr>
+        <p:txBody>
+          <a:bodyPr wrap="square" rtlCol="0">
+            <a:spAutoFit/>
+          </a:bodyPr>
+          <a:lstStyle/>
+          <a:p>
+            <a:r>
+              <a:rPr lang="en-US" dirty="0" smtClean="0"/>
+              <a:t>Non-Real Time tasks</a:t>
+            </a:r>
+            <a:endParaRPr lang="en-US" dirty="0"/>
+          </a:p>
+        </p:txBody>
+      </p:sp>
+    </p:spTree>
+    <p:extLst>
+      <p:ext uri="{BB962C8B-B14F-4D97-AF65-F5344CB8AC3E}">
+        <p14:creationId xmlns:p14="http://schemas.microsoft.com/office/powerpoint/2010/main" val="3830224321"/>
+      </p:ext>
+    </p:extLst>
+  </p:cSld>
+  <p:clrMapOvr>
+    <a:masterClrMapping/>
+  </p:clrMapOvr>
+</p:sld>
+</file>
+
+<file path=ppt/slides/slide6.xml><?xml version="1.0" encoding="utf-8"?>
+<p:sld xmlns:a="http://schemas.openxmlformats.org/drawingml/2006/main" xmlns:r="http://schemas.openxmlformats.org/officeDocument/2006/relationships" xmlns:p="http://schemas.openxmlformats.org/presentationml/2006/main">
+  <p:cSld>
+    <p:spTree>
+      <p:nvGrpSpPr>
+        <p:cNvPr id="1" name=""/>
+        <p:cNvGrpSpPr/>
+        <p:nvPr/>
+      </p:nvGrpSpPr>
+      <p:grpSpPr>
+        <a:xfrm>
+          <a:off x="0" y="0"/>
+          <a:ext cx="0" cy="0"/>
+          <a:chOff x="0" y="0"/>
+          <a:chExt cx="0" cy="0"/>
+        </a:xfrm>
+      </p:grpSpPr>
+      <p:sp>
+        <p:nvSpPr>
+          <p:cNvPr id="2" name="Title 1"/>
+          <p:cNvSpPr>
+            <a:spLocks noGrp="1"/>
+          </p:cNvSpPr>
+          <p:nvPr>
+            <p:ph type="title"/>
+          </p:nvPr>
+        </p:nvSpPr>
+        <p:spPr/>
+        <p:txBody>
+          <a:bodyPr/>
+          <a:lstStyle/>
+          <a:p>
+            <a:r>
+              <a:rPr lang="en-US" dirty="0"/>
+              <a:t>D</a:t>
+            </a:r>
+            <a:r>
+              <a:rPr lang="en-US" dirty="0" smtClean="0"/>
+              <a:t>L-MAC Functions</a:t>
+            </a:r>
+            <a:endParaRPr lang="en-US" dirty="0"/>
+          </a:p>
+        </p:txBody>
+      </p:sp>
+      <p:sp>
+        <p:nvSpPr>
+          <p:cNvPr id="3" name="Content Placeholder 2"/>
+          <p:cNvSpPr>
+            <a:spLocks noGrp="1"/>
+          </p:cNvSpPr>
+          <p:nvPr>
+            <p:ph idx="1"/>
+          </p:nvPr>
+        </p:nvSpPr>
+        <p:spPr>
+          <a:xfrm>
+            <a:off x="838200" y="1825625"/>
+            <a:ext cx="10515600" cy="3097153"/>
+          </a:xfrm>
+        </p:spPr>
+        <p:txBody>
+          <a:bodyPr>
+            <a:normAutofit/>
+          </a:bodyPr>
+          <a:lstStyle/>
+          <a:p>
+            <a:r>
+              <a:rPr lang="en-US" dirty="0" smtClean="0">
+                <a:solidFill>
+                  <a:schemeClr val="accent6">
+                    <a:lumMod val="75000"/>
+                  </a:schemeClr>
+                </a:solidFill>
+              </a:rPr>
+              <a:t>Mux Mac-Ces &amp; DL-data based on allocation.</a:t>
+            </a:r>
+          </a:p>
+          <a:p>
+            <a:r>
+              <a:rPr lang="en-US" dirty="0" smtClean="0">
+                <a:solidFill>
+                  <a:schemeClr val="accent6">
+                    <a:lumMod val="75000"/>
+                  </a:schemeClr>
+                </a:solidFill>
+              </a:rPr>
+              <a:t>Generate RAR PDU.</a:t>
+            </a:r>
+            <a:endParaRPr lang="en-US" dirty="0" smtClean="0">
+              <a:solidFill>
+                <a:srgbClr val="548235"/>
+              </a:solidFill>
+            </a:endParaRPr>
+          </a:p>
+          <a:p>
+            <a:r>
+              <a:rPr lang="en-US" dirty="0" smtClean="0">
+                <a:solidFill>
+                  <a:srgbClr val="548235"/>
+                </a:solidFill>
+              </a:rPr>
+              <a:t>Generate PDCCH, PHICH, PCFICH, CRS, PSS/SSS &amp; MIB.</a:t>
+            </a:r>
+          </a:p>
+          <a:p>
+            <a:r>
+              <a:rPr lang="en-US" dirty="0" smtClean="0">
+                <a:solidFill>
+                  <a:schemeClr val="accent5">
+                    <a:lumMod val="75000"/>
+                  </a:schemeClr>
+                </a:solidFill>
+              </a:rPr>
+              <a:t>Update Mac-CEs allocation info to UL &amp; DL scheduler.</a:t>
+            </a:r>
+          </a:p>
+          <a:p>
+            <a:endParaRPr lang="en-US" dirty="0">
+              <a:solidFill>
+                <a:schemeClr val="accent6">
+                  <a:lumMod val="75000"/>
+                </a:schemeClr>
+              </a:solidFill>
+            </a:endParaRPr>
+          </a:p>
+          <a:p>
+            <a:endParaRPr lang="en-US" dirty="0" smtClean="0"/>
+          </a:p>
+          <a:p>
+            <a:endParaRPr lang="en-US" dirty="0"/>
+          </a:p>
+        </p:txBody>
+      </p:sp>
+      <p:sp>
+        <p:nvSpPr>
+          <p:cNvPr id="5" name="Hexagon 4"/>
+          <p:cNvSpPr/>
+          <p:nvPr/>
+        </p:nvSpPr>
+        <p:spPr>
+          <a:xfrm>
+            <a:off x="8779473" y="5856269"/>
+            <a:ext cx="333192" cy="273293"/>
+          </a:xfrm>
+          <a:prstGeom prst="hexagon">
+            <a:avLst/>
+          </a:prstGeom>
+          <a:solidFill>
+            <a:schemeClr val="accent5">
+              <a:lumMod val="75000"/>
+            </a:schemeClr>
+          </a:solidFill>
+        </p:spPr>
+        <p:style>
+          <a:lnRef idx="1">
+            <a:schemeClr val="accent1"/>
+          </a:lnRef>
+          <a:fillRef idx="3">
+            <a:schemeClr val="accent1"/>
+          </a:fillRef>
+          <a:effectRef idx="2">
+            <a:schemeClr val="accent1"/>
+          </a:effectRef>
+          <a:fontRef idx="minor">
+            <a:schemeClr val="lt1"/>
+          </a:fontRef>
+        </p:style>
+        <p:txBody>
+          <a:bodyPr rtlCol="0" anchor="ctr"/>
+          <a:lstStyle/>
+          <a:p>
+            <a:pPr algn="ctr"/>
+            <a:endParaRPr lang="en-US"/>
+          </a:p>
+        </p:txBody>
+      </p:sp>
+      <p:sp>
+        <p:nvSpPr>
+          <p:cNvPr id="6" name="Hexagon 5"/>
+          <p:cNvSpPr/>
+          <p:nvPr/>
+        </p:nvSpPr>
+        <p:spPr>
+          <a:xfrm>
+            <a:off x="8771573" y="5466193"/>
+            <a:ext cx="333192" cy="273293"/>
+          </a:xfrm>
+          <a:prstGeom prst="hexagon">
+            <a:avLst/>
+          </a:prstGeom>
+          <a:solidFill>
+            <a:schemeClr val="accent6">
+              <a:lumMod val="75000"/>
+            </a:schemeClr>
+          </a:solidFill>
+        </p:spPr>
+        <p:style>
+          <a:lnRef idx="1">
+            <a:schemeClr val="accent1"/>
+          </a:lnRef>
+          <a:fillRef idx="3">
+            <a:schemeClr val="accent1"/>
+          </a:fillRef>
+          <a:effectRef idx="2">
+            <a:schemeClr val="accent1"/>
+          </a:effectRef>
+          <a:fontRef idx="minor">
+            <a:schemeClr val="lt1"/>
+          </a:fontRef>
+        </p:style>
+        <p:txBody>
+          <a:bodyPr rtlCol="0" anchor="ctr"/>
+          <a:lstStyle/>
+          <a:p>
+            <a:pPr algn="ctr"/>
+            <a:endParaRPr lang="en-US">
+              <a:solidFill>
+                <a:schemeClr val="accent6">
+                  <a:lumMod val="75000"/>
+                </a:schemeClr>
+              </a:solidFill>
+            </a:endParaRPr>
+          </a:p>
+        </p:txBody>
+      </p:sp>
+      <p:sp>
+        <p:nvSpPr>
+          <p:cNvPr id="7" name="TextBox 6"/>
+          <p:cNvSpPr txBox="1"/>
+          <p:nvPr/>
+        </p:nvSpPr>
+        <p:spPr>
+          <a:xfrm>
+            <a:off x="9309693" y="5412426"/>
+            <a:ext cx="1837277" cy="369332"/>
+          </a:xfrm>
+          <a:prstGeom prst="rect">
+            <a:avLst/>
+          </a:prstGeom>
+          <a:noFill/>
+        </p:spPr>
+        <p:txBody>
+          <a:bodyPr wrap="square" rtlCol="0">
+            <a:spAutoFit/>
+          </a:bodyPr>
+          <a:lstStyle/>
+          <a:p>
+            <a:r>
+              <a:rPr lang="en-US" dirty="0" smtClean="0"/>
+              <a:t>Real Time tasks</a:t>
+            </a:r>
+            <a:endParaRPr lang="en-US" dirty="0"/>
+          </a:p>
+        </p:txBody>
+      </p:sp>
+      <p:sp>
+        <p:nvSpPr>
+          <p:cNvPr id="8" name="TextBox 7"/>
+          <p:cNvSpPr txBox="1"/>
+          <p:nvPr/>
+        </p:nvSpPr>
+        <p:spPr>
+          <a:xfrm>
+            <a:off x="9326452" y="5786747"/>
+            <a:ext cx="2252095" cy="369332"/>
+          </a:xfrm>
+          <a:prstGeom prst="rect">
+            <a:avLst/>
+          </a:prstGeom>
+          <a:noFill/>
+        </p:spPr>
+        <p:txBody>
+          <a:bodyPr wrap="square" rtlCol="0">
+            <a:spAutoFit/>
+          </a:bodyPr>
+          <a:lstStyle/>
+          <a:p>
+            <a:r>
+              <a:rPr lang="en-US" dirty="0" smtClean="0"/>
+              <a:t>Non-Real Time tasks</a:t>
+            </a:r>
+            <a:endParaRPr lang="en-US" dirty="0"/>
+          </a:p>
+        </p:txBody>
+      </p:sp>
+    </p:spTree>
+    <p:extLst>
+      <p:ext uri="{BB962C8B-B14F-4D97-AF65-F5344CB8AC3E}">
+        <p14:creationId xmlns:p14="http://schemas.microsoft.com/office/powerpoint/2010/main" val="2372469145"/>
+      </p:ext>
+    </p:extLst>
+  </p:cSld>
+  <p:clrMapOvr>
+    <a:masterClrMapping/>
+  </p:clrMapOvr>
+</p:sld>
+</file>
+
+<file path=ppt/slides/slide7.xml><?xml version="1.0" encoding="utf-8"?>
+<p:sld xmlns:a="http://schemas.openxmlformats.org/drawingml/2006/main" xmlns:r="http://schemas.openxmlformats.org/officeDocument/2006/relationships" xmlns:p="http://schemas.openxmlformats.org/presentationml/2006/main">
+  <p:cSld>
+    <p:spTree>
+      <p:nvGrpSpPr>
+        <p:cNvPr id="1" name=""/>
+        <p:cNvGrpSpPr/>
+        <p:nvPr/>
+      </p:nvGrpSpPr>
+      <p:grpSpPr>
+        <a:xfrm>
+          <a:off x="0" y="0"/>
+          <a:ext cx="0" cy="0"/>
+          <a:chOff x="0" y="0"/>
+          <a:chExt cx="0" cy="0"/>
+        </a:xfrm>
+      </p:grpSpPr>
+      <p:sp>
+        <p:nvSpPr>
+          <p:cNvPr id="2" name="Title 1"/>
+          <p:cNvSpPr>
+            <a:spLocks noGrp="1"/>
+          </p:cNvSpPr>
+          <p:nvPr>
+            <p:ph type="title"/>
+          </p:nvPr>
+        </p:nvSpPr>
+        <p:spPr/>
+        <p:txBody>
+          <a:bodyPr/>
+          <a:lstStyle/>
+          <a:p>
+            <a:r>
+              <a:rPr lang="en-US" dirty="0"/>
+              <a:t>D</a:t>
+            </a:r>
+            <a:r>
+              <a:rPr lang="en-US" dirty="0" smtClean="0"/>
+              <a:t>L-Scheduler Functions</a:t>
+            </a:r>
+            <a:endParaRPr lang="en-US" dirty="0"/>
+          </a:p>
+        </p:txBody>
+      </p:sp>
+      <p:sp>
+        <p:nvSpPr>
+          <p:cNvPr id="3" name="Content Placeholder 2"/>
+          <p:cNvSpPr>
+            <a:spLocks noGrp="1"/>
+          </p:cNvSpPr>
+          <p:nvPr>
+            <p:ph idx="1"/>
+          </p:nvPr>
+        </p:nvSpPr>
+        <p:spPr>
+          <a:xfrm>
+            <a:off x="838200" y="1825625"/>
+            <a:ext cx="10515600" cy="3097153"/>
+          </a:xfrm>
+        </p:spPr>
+        <p:txBody>
+          <a:bodyPr>
+            <a:normAutofit fontScale="77500" lnSpcReduction="20000"/>
+          </a:bodyPr>
+          <a:lstStyle/>
+          <a:p>
+            <a:r>
+              <a:rPr lang="en-US" dirty="0">
+                <a:solidFill>
+                  <a:schemeClr val="accent6">
+                    <a:lumMod val="75000"/>
+                  </a:schemeClr>
+                </a:solidFill>
+              </a:rPr>
+              <a:t>Scheduling of RAR</a:t>
+            </a:r>
+            <a:r>
+              <a:rPr lang="en-US" dirty="0" smtClean="0">
+                <a:solidFill>
+                  <a:schemeClr val="accent6">
+                    <a:lumMod val="75000"/>
+                  </a:schemeClr>
+                </a:solidFill>
+              </a:rPr>
+              <a:t>, SIB &amp; paging.</a:t>
+            </a:r>
+          </a:p>
+          <a:p>
+            <a:r>
+              <a:rPr lang="en-US" dirty="0" smtClean="0">
+                <a:solidFill>
+                  <a:schemeClr val="accent6">
+                    <a:lumMod val="75000"/>
+                  </a:schemeClr>
+                </a:solidFill>
+              </a:rPr>
+              <a:t>Based on Harq feedback add UE to re-scheduling list &amp; update TPC if latest TPC is received.</a:t>
+            </a:r>
+          </a:p>
+          <a:p>
+            <a:r>
+              <a:rPr lang="en-US" dirty="0" smtClean="0">
+                <a:solidFill>
+                  <a:schemeClr val="accent6">
+                    <a:lumMod val="75000"/>
+                  </a:schemeClr>
+                </a:solidFill>
+              </a:rPr>
+              <a:t>Considering pending data, QOS, Mac CEs update LC’s in scheduling list.</a:t>
+            </a:r>
+          </a:p>
+          <a:p>
+            <a:r>
+              <a:rPr lang="en-US" dirty="0" smtClean="0">
+                <a:solidFill>
+                  <a:schemeClr val="accent6">
+                    <a:lumMod val="75000"/>
+                  </a:schemeClr>
+                </a:solidFill>
+              </a:rPr>
+              <a:t>Link adaptation.</a:t>
+            </a:r>
+          </a:p>
+          <a:p>
+            <a:r>
+              <a:rPr lang="en-US" dirty="0" smtClean="0">
+                <a:solidFill>
+                  <a:schemeClr val="accent6">
+                    <a:lumMod val="75000"/>
+                  </a:schemeClr>
+                </a:solidFill>
+              </a:rPr>
+              <a:t>Power control.</a:t>
+            </a:r>
+          </a:p>
+          <a:p>
+            <a:r>
+              <a:rPr lang="en-US" dirty="0" smtClean="0">
+                <a:solidFill>
+                  <a:schemeClr val="accent6">
+                    <a:lumMod val="75000"/>
+                  </a:schemeClr>
+                </a:solidFill>
+              </a:rPr>
+              <a:t>Fill DCI.</a:t>
+            </a:r>
+          </a:p>
+          <a:p>
+            <a:r>
+              <a:rPr lang="en-US" dirty="0" smtClean="0">
+                <a:solidFill>
+                  <a:schemeClr val="accent5">
+                    <a:lumMod val="75000"/>
+                  </a:schemeClr>
+                </a:solidFill>
+              </a:rPr>
+              <a:t>Decision of feature actvation(CA,SPS).</a:t>
+            </a:r>
+          </a:p>
+          <a:p>
+            <a:r>
+              <a:rPr lang="en-US" dirty="0" smtClean="0">
+                <a:solidFill>
+                  <a:schemeClr val="accent5">
+                    <a:lumMod val="75000"/>
+                  </a:schemeClr>
+                </a:solidFill>
+              </a:rPr>
+              <a:t>Update DL data pending for scheduling.</a:t>
+            </a:r>
+          </a:p>
+          <a:p>
+            <a:endParaRPr lang="en-US" dirty="0" smtClean="0"/>
+          </a:p>
+          <a:p>
+            <a:endParaRPr lang="en-US" dirty="0" smtClean="0"/>
+          </a:p>
+          <a:p>
+            <a:endParaRPr lang="en-US" dirty="0"/>
+          </a:p>
+        </p:txBody>
+      </p:sp>
+      <p:sp>
+        <p:nvSpPr>
+          <p:cNvPr id="5" name="Hexagon 4"/>
+          <p:cNvSpPr/>
+          <p:nvPr/>
+        </p:nvSpPr>
+        <p:spPr>
+          <a:xfrm>
+            <a:off x="8779473" y="5856269"/>
+            <a:ext cx="333192" cy="273293"/>
+          </a:xfrm>
+          <a:prstGeom prst="hexagon">
+            <a:avLst/>
+          </a:prstGeom>
+          <a:solidFill>
+            <a:schemeClr val="accent5">
+              <a:lumMod val="75000"/>
+            </a:schemeClr>
+          </a:solidFill>
+        </p:spPr>
+        <p:style>
+          <a:lnRef idx="1">
+            <a:schemeClr val="accent1"/>
+          </a:lnRef>
+          <a:fillRef idx="3">
+            <a:schemeClr val="accent1"/>
+          </a:fillRef>
+          <a:effectRef idx="2">
+            <a:schemeClr val="accent1"/>
+          </a:effectRef>
+          <a:fontRef idx="minor">
+            <a:schemeClr val="lt1"/>
+          </a:fontRef>
+        </p:style>
+        <p:txBody>
+          <a:bodyPr rtlCol="0" anchor="ctr"/>
+          <a:lstStyle/>
+          <a:p>
+            <a:pPr algn="ctr"/>
+            <a:endParaRPr lang="en-US"/>
+          </a:p>
+        </p:txBody>
+      </p:sp>
+      <p:sp>
+        <p:nvSpPr>
+          <p:cNvPr id="6" name="Hexagon 5"/>
+          <p:cNvSpPr/>
+          <p:nvPr/>
+        </p:nvSpPr>
+        <p:spPr>
+          <a:xfrm>
+            <a:off x="8771573" y="5466193"/>
+            <a:ext cx="333192" cy="273293"/>
+          </a:xfrm>
+          <a:prstGeom prst="hexagon">
+            <a:avLst/>
+          </a:prstGeom>
+          <a:solidFill>
+            <a:schemeClr val="accent6">
+              <a:lumMod val="75000"/>
+            </a:schemeClr>
+          </a:solidFill>
+        </p:spPr>
+        <p:style>
+          <a:lnRef idx="1">
+            <a:schemeClr val="accent1"/>
+          </a:lnRef>
+          <a:fillRef idx="3">
+            <a:schemeClr val="accent1"/>
+          </a:fillRef>
+          <a:effectRef idx="2">
+            <a:schemeClr val="accent1"/>
+          </a:effectRef>
+          <a:fontRef idx="minor">
+            <a:schemeClr val="lt1"/>
+          </a:fontRef>
+        </p:style>
+        <p:txBody>
+          <a:bodyPr rtlCol="0" anchor="ctr"/>
+          <a:lstStyle/>
+          <a:p>
+            <a:pPr algn="ctr"/>
+            <a:endParaRPr lang="en-US">
+              <a:solidFill>
+                <a:schemeClr val="accent6">
+                  <a:lumMod val="75000"/>
+                </a:schemeClr>
+              </a:solidFill>
+            </a:endParaRPr>
+          </a:p>
+        </p:txBody>
+      </p:sp>
+      <p:sp>
+        <p:nvSpPr>
+          <p:cNvPr id="7" name="TextBox 6"/>
+          <p:cNvSpPr txBox="1"/>
+          <p:nvPr/>
+        </p:nvSpPr>
+        <p:spPr>
+          <a:xfrm>
+            <a:off x="9309693" y="5412426"/>
+            <a:ext cx="1837277" cy="369332"/>
+          </a:xfrm>
+          <a:prstGeom prst="rect">
+            <a:avLst/>
+          </a:prstGeom>
+          <a:noFill/>
+        </p:spPr>
+        <p:txBody>
+          <a:bodyPr wrap="square" rtlCol="0">
+            <a:spAutoFit/>
+          </a:bodyPr>
+          <a:lstStyle/>
+          <a:p>
+            <a:r>
+              <a:rPr lang="en-US" dirty="0" smtClean="0"/>
+              <a:t>Real Time tasks</a:t>
+            </a:r>
+            <a:endParaRPr lang="en-US" dirty="0"/>
+          </a:p>
+        </p:txBody>
+      </p:sp>
+      <p:sp>
+        <p:nvSpPr>
+          <p:cNvPr id="8" name="TextBox 7"/>
+          <p:cNvSpPr txBox="1"/>
+          <p:nvPr/>
+        </p:nvSpPr>
+        <p:spPr>
+          <a:xfrm>
+            <a:off x="9326452" y="5786747"/>
+            <a:ext cx="2252095" cy="369332"/>
+          </a:xfrm>
+          <a:prstGeom prst="rect">
+            <a:avLst/>
+          </a:prstGeom>
+          <a:noFill/>
+        </p:spPr>
+        <p:txBody>
+          <a:bodyPr wrap="square" rtlCol="0">
+            <a:spAutoFit/>
+          </a:bodyPr>
+          <a:lstStyle/>
+          <a:p>
+            <a:r>
+              <a:rPr lang="en-US" dirty="0" smtClean="0"/>
+              <a:t>Non-Real Time tasks</a:t>
+            </a:r>
+            <a:endParaRPr lang="en-US" dirty="0"/>
+          </a:p>
+        </p:txBody>
+      </p:sp>
+    </p:spTree>
+    <p:extLst>
+      <p:ext uri="{BB962C8B-B14F-4D97-AF65-F5344CB8AC3E}">
+        <p14:creationId xmlns:p14="http://schemas.microsoft.com/office/powerpoint/2010/main" val="4137314863"/>
+      </p:ext>
+    </p:extLst>
+  </p:cSld>
+  <p:clrMapOvr>
+    <a:masterClrMapping/>
+  </p:clrMapOvr>
+</p:sld>
+</file>
+
+<file path=ppt/slides/slide8.xml><?xml version="1.0" encoding="utf-8"?>
+<p:sld xmlns:a="http://schemas.openxmlformats.org/drawingml/2006/main" xmlns:r="http://schemas.openxmlformats.org/officeDocument/2006/relationships" xmlns:p="http://schemas.openxmlformats.org/presentationml/2006/main">
+  <p:cSld>
+    <p:spTree>
+      <p:nvGrpSpPr>
+        <p:cNvPr id="1" name=""/>
+        <p:cNvGrpSpPr/>
+        <p:nvPr/>
+      </p:nvGrpSpPr>
+      <p:grpSpPr>
+        <a:xfrm>
+          <a:off x="0" y="0"/>
+          <a:ext cx="0" cy="0"/>
+          <a:chOff x="0" y="0"/>
+          <a:chExt cx="0" cy="0"/>
+        </a:xfrm>
+      </p:grpSpPr>
+      <p:sp>
+        <p:nvSpPr>
+          <p:cNvPr id="2" name="Title 1"/>
+          <p:cNvSpPr>
+            <a:spLocks noGrp="1"/>
+          </p:cNvSpPr>
+          <p:nvPr>
+            <p:ph type="title"/>
+          </p:nvPr>
+        </p:nvSpPr>
+        <p:spPr/>
+        <p:txBody>
+          <a:bodyPr/>
+          <a:lstStyle/>
+          <a:p>
+            <a:r>
+              <a:rPr lang="en-US" dirty="0" smtClean="0"/>
+              <a:t>UL-MAC Functions</a:t>
+            </a:r>
+            <a:endParaRPr lang="en-US" dirty="0"/>
+          </a:p>
+        </p:txBody>
+      </p:sp>
+      <p:sp>
+        <p:nvSpPr>
+          <p:cNvPr id="3" name="Content Placeholder 2"/>
+          <p:cNvSpPr>
+            <a:spLocks noGrp="1"/>
+          </p:cNvSpPr>
+          <p:nvPr>
+            <p:ph idx="1"/>
+          </p:nvPr>
+        </p:nvSpPr>
+        <p:spPr>
+          <a:xfrm>
+            <a:off x="838200" y="1825625"/>
+            <a:ext cx="10515600" cy="3097153"/>
+          </a:xfrm>
+        </p:spPr>
+        <p:txBody>
+          <a:bodyPr>
+            <a:normAutofit/>
+          </a:bodyPr>
+          <a:lstStyle/>
+          <a:p>
+            <a:r>
+              <a:rPr lang="en-US" dirty="0" smtClean="0">
+                <a:solidFill>
+                  <a:schemeClr val="accent6">
+                    <a:lumMod val="75000"/>
+                  </a:schemeClr>
+                </a:solidFill>
+              </a:rPr>
+              <a:t>Demux LCIDs.</a:t>
+            </a:r>
+          </a:p>
+          <a:p>
+            <a:r>
+              <a:rPr lang="en-US" dirty="0" smtClean="0">
+                <a:solidFill>
+                  <a:schemeClr val="accent6">
+                    <a:lumMod val="75000"/>
+                  </a:schemeClr>
+                </a:solidFill>
+              </a:rPr>
+              <a:t>Update msg3, RACH info, TA, SR, PHR, CRNTI-CE &amp; UL-CQI info to UL scheduler immediately aftr demux.</a:t>
+            </a:r>
+          </a:p>
+          <a:p>
+            <a:r>
+              <a:rPr lang="en-US" dirty="0" smtClean="0">
+                <a:solidFill>
+                  <a:schemeClr val="accent6">
+                    <a:lumMod val="75000"/>
+                  </a:schemeClr>
+                </a:solidFill>
+              </a:rPr>
+              <a:t>Update Harq info to  DL scheduler.</a:t>
+            </a:r>
+          </a:p>
+          <a:p>
+            <a:r>
+              <a:rPr lang="en-US" dirty="0" smtClean="0">
+                <a:solidFill>
+                  <a:schemeClr val="accent5">
+                    <a:lumMod val="75000"/>
+                  </a:schemeClr>
+                </a:solidFill>
+              </a:rPr>
+              <a:t>Send UL data to RLC.</a:t>
+            </a:r>
+          </a:p>
+          <a:p>
+            <a:r>
+              <a:rPr lang="en-US" dirty="0" smtClean="0">
+                <a:solidFill>
+                  <a:schemeClr val="accent5">
+                    <a:lumMod val="75000"/>
+                  </a:schemeClr>
+                </a:solidFill>
+              </a:rPr>
+              <a:t>Update BSR to UL scheduler.</a:t>
+            </a:r>
+          </a:p>
+          <a:p>
+            <a:endParaRPr lang="en-US" dirty="0" smtClean="0"/>
+          </a:p>
+          <a:p>
+            <a:endParaRPr lang="en-US" dirty="0" smtClean="0"/>
+          </a:p>
+          <a:p>
+            <a:endParaRPr lang="en-US" dirty="0"/>
+          </a:p>
+        </p:txBody>
+      </p:sp>
+      <p:sp>
+        <p:nvSpPr>
+          <p:cNvPr id="5" name="Hexagon 4"/>
+          <p:cNvSpPr/>
+          <p:nvPr/>
+        </p:nvSpPr>
+        <p:spPr>
+          <a:xfrm>
+            <a:off x="8779473" y="5856269"/>
+            <a:ext cx="333192" cy="273293"/>
+          </a:xfrm>
+          <a:prstGeom prst="hexagon">
+            <a:avLst/>
+          </a:prstGeom>
+          <a:solidFill>
+            <a:schemeClr val="accent5">
+              <a:lumMod val="75000"/>
+            </a:schemeClr>
+          </a:solidFill>
+        </p:spPr>
+        <p:style>
+          <a:lnRef idx="1">
+            <a:schemeClr val="accent1"/>
+          </a:lnRef>
+          <a:fillRef idx="3">
+            <a:schemeClr val="accent1"/>
+          </a:fillRef>
+          <a:effectRef idx="2">
+            <a:schemeClr val="accent1"/>
+          </a:effectRef>
+          <a:fontRef idx="minor">
+            <a:schemeClr val="lt1"/>
+          </a:fontRef>
+        </p:style>
+        <p:txBody>
+          <a:bodyPr rtlCol="0" anchor="ctr"/>
+          <a:lstStyle/>
+          <a:p>
+            <a:pPr algn="ctr"/>
+            <a:endParaRPr lang="en-US"/>
+          </a:p>
+        </p:txBody>
+      </p:sp>
+      <p:sp>
+        <p:nvSpPr>
+          <p:cNvPr id="6" name="Hexagon 5"/>
+          <p:cNvSpPr/>
+          <p:nvPr/>
+        </p:nvSpPr>
+        <p:spPr>
+          <a:xfrm>
+            <a:off x="8771573" y="5466193"/>
+            <a:ext cx="333192" cy="273293"/>
+          </a:xfrm>
+          <a:prstGeom prst="hexagon">
+            <a:avLst/>
+          </a:prstGeom>
+          <a:solidFill>
+            <a:schemeClr val="accent6">
+              <a:lumMod val="75000"/>
+            </a:schemeClr>
+          </a:solidFill>
+        </p:spPr>
+        <p:style>
+          <a:lnRef idx="1">
+            <a:schemeClr val="accent1"/>
+          </a:lnRef>
+          <a:fillRef idx="3">
+            <a:schemeClr val="accent1"/>
+          </a:fillRef>
+          <a:effectRef idx="2">
+            <a:schemeClr val="accent1"/>
+          </a:effectRef>
+          <a:fontRef idx="minor">
+            <a:schemeClr val="lt1"/>
+          </a:fontRef>
+        </p:style>
+        <p:txBody>
+          <a:bodyPr rtlCol="0" anchor="ctr"/>
+          <a:lstStyle/>
+          <a:p>
+            <a:pPr algn="ctr"/>
+            <a:endParaRPr lang="en-US">
+              <a:solidFill>
+                <a:schemeClr val="accent6">
+                  <a:lumMod val="75000"/>
+                </a:schemeClr>
+              </a:solidFill>
+            </a:endParaRPr>
+          </a:p>
+        </p:txBody>
+      </p:sp>
+      <p:sp>
+        <p:nvSpPr>
+          <p:cNvPr id="7" name="TextBox 6"/>
+          <p:cNvSpPr txBox="1"/>
+          <p:nvPr/>
+        </p:nvSpPr>
+        <p:spPr>
+          <a:xfrm>
+            <a:off x="9309693" y="5412426"/>
+            <a:ext cx="1837277" cy="369332"/>
+          </a:xfrm>
+          <a:prstGeom prst="rect">
+            <a:avLst/>
+          </a:prstGeom>
+          <a:noFill/>
+        </p:spPr>
+        <p:txBody>
+          <a:bodyPr wrap="square" rtlCol="0">
+            <a:spAutoFit/>
+          </a:bodyPr>
+          <a:lstStyle/>
+          <a:p>
+            <a:r>
+              <a:rPr lang="en-US" dirty="0" smtClean="0"/>
+              <a:t>Real Time tasks</a:t>
+            </a:r>
+            <a:endParaRPr lang="en-US" dirty="0"/>
+          </a:p>
+        </p:txBody>
+      </p:sp>
+      <p:sp>
+        <p:nvSpPr>
+          <p:cNvPr id="8" name="TextBox 7"/>
+          <p:cNvSpPr txBox="1"/>
+          <p:nvPr/>
+        </p:nvSpPr>
+        <p:spPr>
+          <a:xfrm>
+            <a:off x="9326452" y="5786747"/>
+            <a:ext cx="2252095" cy="369332"/>
+          </a:xfrm>
+          <a:prstGeom prst="rect">
+            <a:avLst/>
+          </a:prstGeom>
+          <a:noFill/>
+        </p:spPr>
+        <p:txBody>
+          <a:bodyPr wrap="square" rtlCol="0">
+            <a:spAutoFit/>
+          </a:bodyPr>
+          <a:lstStyle/>
+          <a:p>
+            <a:r>
+              <a:rPr lang="en-US" dirty="0" smtClean="0"/>
+              <a:t>Non-Real Time tasks</a:t>
+            </a:r>
+            <a:endParaRPr lang="en-US" dirty="0"/>
+          </a:p>
+        </p:txBody>
+      </p:sp>
+    </p:spTree>
+    <p:extLst>
+      <p:ext uri="{BB962C8B-B14F-4D97-AF65-F5344CB8AC3E}">
+        <p14:creationId xmlns:p14="http://schemas.microsoft.com/office/powerpoint/2010/main" val="3348386798"/>
+      </p:ext>
+    </p:extLst>
+  </p:cSld>
+  <p:clrMapOvr>
+    <a:masterClrMapping/>
+  </p:clrMapOvr>
+</p:sld>
+</file>
+
+<file path=ppt/slides/slide9.xml><?xml version="1.0" encoding="utf-8"?>
+<p:sld xmlns:a="http://schemas.openxmlformats.org/drawingml/2006/main" xmlns:r="http://schemas.openxmlformats.org/officeDocument/2006/relationships" xmlns:p="http://schemas.openxmlformats.org/presentationml/2006/main">
+  <p:cSld>
+    <p:spTree>
+      <p:nvGrpSpPr>
+        <p:cNvPr id="1" name=""/>
+        <p:cNvGrpSpPr/>
+        <p:nvPr/>
+      </p:nvGrpSpPr>
+      <p:grpSpPr>
+        <a:xfrm>
+          <a:off x="0" y="0"/>
+          <a:ext cx="0" cy="0"/>
+          <a:chOff x="0" y="0"/>
+          <a:chExt cx="0" cy="0"/>
+        </a:xfrm>
+      </p:grpSpPr>
+      <p:sp>
+        <p:nvSpPr>
+          <p:cNvPr id="2" name="Title 1"/>
+          <p:cNvSpPr>
+            <a:spLocks noGrp="1"/>
+          </p:cNvSpPr>
+          <p:nvPr>
+            <p:ph type="title"/>
+          </p:nvPr>
+        </p:nvSpPr>
+        <p:spPr/>
+        <p:txBody>
+          <a:bodyPr/>
+          <a:lstStyle/>
+          <a:p>
+            <a:r>
+              <a:rPr lang="en-US" dirty="0" smtClean="0"/>
+              <a:t>UL- Scheduler Functions</a:t>
+            </a:r>
+            <a:endParaRPr lang="en-US" dirty="0"/>
+          </a:p>
+        </p:txBody>
+      </p:sp>
+      <p:sp>
+        <p:nvSpPr>
+          <p:cNvPr id="3" name="Content Placeholder 2"/>
+          <p:cNvSpPr>
+            <a:spLocks noGrp="1"/>
+          </p:cNvSpPr>
+          <p:nvPr>
+            <p:ph idx="1"/>
+          </p:nvPr>
+        </p:nvSpPr>
+        <p:spPr>
+          <a:xfrm>
+            <a:off x="838200" y="1825625"/>
+            <a:ext cx="10515600" cy="3097153"/>
+          </a:xfrm>
+        </p:spPr>
+        <p:txBody>
+          <a:bodyPr>
+            <a:normAutofit fontScale="77500" lnSpcReduction="20000"/>
+          </a:bodyPr>
+          <a:lstStyle/>
+          <a:p>
+            <a:r>
+              <a:rPr lang="en-US" dirty="0" smtClean="0">
+                <a:solidFill>
+                  <a:schemeClr val="accent6">
+                    <a:lumMod val="75000"/>
+                  </a:schemeClr>
+                </a:solidFill>
+              </a:rPr>
+              <a:t>Based on CRC results add UE to scheduling list(rescheduling list).</a:t>
+            </a:r>
+          </a:p>
+          <a:p>
+            <a:r>
+              <a:rPr lang="en-US" dirty="0" smtClean="0">
+                <a:solidFill>
+                  <a:schemeClr val="accent6">
+                    <a:lumMod val="75000"/>
+                  </a:schemeClr>
+                </a:solidFill>
+              </a:rPr>
+              <a:t>List UE to be schedueld considering BSR, periodic control information &amp; QOS (scheduling list).</a:t>
+            </a:r>
+          </a:p>
+          <a:p>
+            <a:r>
+              <a:rPr lang="en-US" dirty="0" smtClean="0">
+                <a:solidFill>
+                  <a:schemeClr val="accent6">
+                    <a:lumMod val="75000"/>
+                  </a:schemeClr>
+                </a:solidFill>
+              </a:rPr>
+              <a:t>Update RACH info to DL scheduler.</a:t>
+            </a:r>
+          </a:p>
+          <a:p>
+            <a:r>
+              <a:rPr lang="en-US" dirty="0" smtClean="0">
+                <a:solidFill>
+                  <a:schemeClr val="accent6">
+                    <a:lumMod val="75000"/>
+                  </a:schemeClr>
+                </a:solidFill>
+              </a:rPr>
+              <a:t>Power control.</a:t>
+            </a:r>
+          </a:p>
+          <a:p>
+            <a:r>
+              <a:rPr lang="en-US" dirty="0" smtClean="0">
+                <a:solidFill>
+                  <a:schemeClr val="accent6">
+                    <a:lumMod val="75000"/>
+                  </a:schemeClr>
+                </a:solidFill>
+              </a:rPr>
+              <a:t>Link adaptation.</a:t>
+            </a:r>
+          </a:p>
+          <a:p>
+            <a:r>
+              <a:rPr lang="en-US" dirty="0" smtClean="0">
+                <a:solidFill>
+                  <a:schemeClr val="accent6">
+                    <a:lumMod val="75000"/>
+                  </a:schemeClr>
+                </a:solidFill>
+              </a:rPr>
+              <a:t>Fill DCI.</a:t>
+            </a:r>
+          </a:p>
+          <a:p>
+            <a:r>
+              <a:rPr lang="en-US" dirty="0" smtClean="0">
+                <a:solidFill>
+                  <a:schemeClr val="accent5">
+                    <a:lumMod val="75000"/>
+                  </a:schemeClr>
+                </a:solidFill>
+              </a:rPr>
+              <a:t>Update BSR info.</a:t>
+            </a:r>
+          </a:p>
+          <a:p>
+            <a:r>
+              <a:rPr lang="en-US" dirty="0" smtClean="0">
+                <a:solidFill>
+                  <a:schemeClr val="accent5">
+                    <a:lumMod val="75000"/>
+                  </a:schemeClr>
+                </a:solidFill>
+              </a:rPr>
+              <a:t>Decision of feature activation(CA,SPS).</a:t>
+            </a:r>
+            <a:endParaRPr lang="en-US" dirty="0" smtClean="0"/>
+          </a:p>
+          <a:p>
+            <a:endParaRPr lang="en-US" dirty="0" smtClean="0"/>
+          </a:p>
+          <a:p>
+            <a:endParaRPr lang="en-US" dirty="0"/>
+          </a:p>
+        </p:txBody>
+      </p:sp>
+      <p:sp>
+        <p:nvSpPr>
+          <p:cNvPr id="5" name="Hexagon 4"/>
+          <p:cNvSpPr/>
+          <p:nvPr/>
+        </p:nvSpPr>
+        <p:spPr>
+          <a:xfrm>
+            <a:off x="8779473" y="5856269"/>
+            <a:ext cx="333192" cy="273293"/>
+          </a:xfrm>
+          <a:prstGeom prst="hexagon">
+            <a:avLst/>
+          </a:prstGeom>
+          <a:solidFill>
+            <a:schemeClr val="accent5">
+              <a:lumMod val="75000"/>
+            </a:schemeClr>
+          </a:solidFill>
+        </p:spPr>
+        <p:style>
+          <a:lnRef idx="1">
+            <a:schemeClr val="accent1"/>
+          </a:lnRef>
+          <a:fillRef idx="3">
+            <a:schemeClr val="accent1"/>
+          </a:fillRef>
+          <a:effectRef idx="2">
+            <a:schemeClr val="accent1"/>
+          </a:effectRef>
+          <a:fontRef idx="minor">
+            <a:schemeClr val="lt1"/>
+          </a:fontRef>
+        </p:style>
+        <p:txBody>
+          <a:bodyPr rtlCol="0" anchor="ctr"/>
+          <a:lstStyle/>
+          <a:p>
+            <a:pPr algn="ctr"/>
+            <a:endParaRPr lang="en-US"/>
+          </a:p>
+        </p:txBody>
+      </p:sp>
+      <p:sp>
+        <p:nvSpPr>
+          <p:cNvPr id="6" name="Hexagon 5"/>
+          <p:cNvSpPr/>
+          <p:nvPr/>
+        </p:nvSpPr>
+        <p:spPr>
+          <a:xfrm>
+            <a:off x="8771573" y="5466193"/>
+            <a:ext cx="333192" cy="273293"/>
+          </a:xfrm>
+          <a:prstGeom prst="hexagon">
+            <a:avLst/>
+          </a:prstGeom>
+          <a:solidFill>
+            <a:schemeClr val="accent6">
+              <a:lumMod val="75000"/>
+            </a:schemeClr>
+          </a:solidFill>
+        </p:spPr>
+        <p:style>
+          <a:lnRef idx="1">
+            <a:schemeClr val="accent1"/>
+          </a:lnRef>
+          <a:fillRef idx="3">
+            <a:schemeClr val="accent1"/>
+          </a:fillRef>
+          <a:effectRef idx="2">
+            <a:schemeClr val="accent1"/>
+          </a:effectRef>
+          <a:fontRef idx="minor">
+            <a:schemeClr val="lt1"/>
+          </a:fontRef>
+        </p:style>
+        <p:txBody>
+          <a:bodyPr rtlCol="0" anchor="ctr"/>
+          <a:lstStyle/>
+          <a:p>
+            <a:pPr algn="ctr"/>
+            <a:endParaRPr lang="en-US">
+              <a:solidFill>
+                <a:schemeClr val="accent6">
+                  <a:lumMod val="75000"/>
+                </a:schemeClr>
+              </a:solidFill>
+            </a:endParaRPr>
+          </a:p>
+        </p:txBody>
+      </p:sp>
+      <p:sp>
+        <p:nvSpPr>
+          <p:cNvPr id="7" name="TextBox 6"/>
+          <p:cNvSpPr txBox="1"/>
+          <p:nvPr/>
+        </p:nvSpPr>
+        <p:spPr>
+          <a:xfrm>
+            <a:off x="9309693" y="5412426"/>
+            <a:ext cx="1837277" cy="369332"/>
+          </a:xfrm>
+          <a:prstGeom prst="rect">
+            <a:avLst/>
+          </a:prstGeom>
+          <a:noFill/>
+        </p:spPr>
+        <p:txBody>
+          <a:bodyPr wrap="square" rtlCol="0">
+            <a:spAutoFit/>
+          </a:bodyPr>
+          <a:lstStyle/>
+          <a:p>
+            <a:r>
+              <a:rPr lang="en-US" dirty="0" smtClean="0"/>
+              <a:t>Real Time tasks</a:t>
+            </a:r>
+            <a:endParaRPr lang="en-US" dirty="0"/>
+          </a:p>
+        </p:txBody>
+      </p:sp>
+      <p:sp>
+        <p:nvSpPr>
+          <p:cNvPr id="8" name="TextBox 7"/>
+          <p:cNvSpPr txBox="1"/>
+          <p:nvPr/>
+        </p:nvSpPr>
+        <p:spPr>
+          <a:xfrm>
+            <a:off x="9326452" y="5786747"/>
+            <a:ext cx="2252095" cy="369332"/>
+          </a:xfrm>
+          <a:prstGeom prst="rect">
+            <a:avLst/>
+          </a:prstGeom>
+          <a:noFill/>
+        </p:spPr>
+        <p:txBody>
+          <a:bodyPr wrap="square" rtlCol="0">
+            <a:spAutoFit/>
+          </a:bodyPr>
+          <a:lstStyle/>
+          <a:p>
+            <a:r>
+              <a:rPr lang="en-US" dirty="0" smtClean="0"/>
+              <a:t>Non-Real Time tasks</a:t>
+            </a:r>
+            <a:endParaRPr lang="en-US" dirty="0"/>
+          </a:p>
+        </p:txBody>
+      </p:sp>
+    </p:spTree>
+    <p:extLst>
+      <p:ext uri="{BB962C8B-B14F-4D97-AF65-F5344CB8AC3E}">
+        <p14:creationId xmlns:p14="http://schemas.microsoft.com/office/powerpoint/2010/main" val="3005549630"/>
       </p:ext>
     </p:extLst>
   </p:cSld>

</xml_diff>